<commit_message>
Updated the ppt 	modified:   presentation/medicine.pptx
</commit_message>
<xml_diff>
--- a/presentation/medicine.pptx
+++ b/presentation/medicine.pptx
@@ -18624,7 +18624,7 @@
         </p:blipFill>
         <p:spPr>
           <a:xfrm>
-            <a:off x="606136" y="900000"/>
+            <a:off x="287479" y="900000"/>
             <a:ext cx="5600700" cy="5094830"/>
           </a:xfrm>
           <a:prstGeom prst="rect">
@@ -18648,7 +18648,7 @@
         </p:nvSpPr>
         <p:spPr>
           <a:xfrm>
-            <a:off x="7957734" y="5607624"/>
+            <a:off x="739516" y="6089416"/>
             <a:ext cx="4054157" cy="817167"/>
           </a:xfrm>
           <a:prstGeom prst="rect">
@@ -18866,6 +18866,232 @@
           </a:p>
         </p:txBody>
       </p:sp>
+      <p:pic>
+        <p:nvPicPr>
+          <p:cNvPr id="10" name="Picture 9">
+            <a:extLst>
+              <a:ext uri="{FF2B5EF4-FFF2-40B4-BE49-F238E27FC236}">
+                <a16:creationId xmlns:a16="http://schemas.microsoft.com/office/drawing/2014/main" id="{B8295733-BFC0-48D0-9859-F89468D2AAFF}"/>
+              </a:ext>
+            </a:extLst>
+          </p:cNvPr>
+          <p:cNvPicPr>
+            <a:picLocks noChangeAspect="1"/>
+          </p:cNvPicPr>
+          <p:nvPr/>
+        </p:nvPicPr>
+        <p:blipFill>
+          <a:blip r:embed="rId5"/>
+          <a:stretch>
+            <a:fillRect/>
+          </a:stretch>
+        </p:blipFill>
+        <p:spPr>
+          <a:xfrm>
+            <a:off x="6303823" y="5354410"/>
+            <a:ext cx="5019675" cy="1203696"/>
+          </a:xfrm>
+          <a:prstGeom prst="rect">
+            <a:avLst/>
+          </a:prstGeom>
+        </p:spPr>
+      </p:pic>
+      <p:pic>
+        <p:nvPicPr>
+          <p:cNvPr id="14" name="Picture 13">
+            <a:extLst>
+              <a:ext uri="{FF2B5EF4-FFF2-40B4-BE49-F238E27FC236}">
+                <a16:creationId xmlns:a16="http://schemas.microsoft.com/office/drawing/2014/main" id="{6758D5E3-B1B2-4EB6-88B8-43E05A89C379}"/>
+              </a:ext>
+            </a:extLst>
+          </p:cNvPr>
+          <p:cNvPicPr>
+            <a:picLocks noChangeAspect="1"/>
+          </p:cNvPicPr>
+          <p:nvPr/>
+        </p:nvPicPr>
+        <p:blipFill>
+          <a:blip r:embed="rId6"/>
+          <a:stretch>
+            <a:fillRect/>
+          </a:stretch>
+        </p:blipFill>
+        <p:spPr>
+          <a:xfrm>
+            <a:off x="6247905" y="4036509"/>
+            <a:ext cx="4429125" cy="1203696"/>
+          </a:xfrm>
+          <a:prstGeom prst="rect">
+            <a:avLst/>
+          </a:prstGeom>
+        </p:spPr>
+      </p:pic>
+      <p:pic>
+        <p:nvPicPr>
+          <p:cNvPr id="16" name="Picture 15">
+            <a:extLst>
+              <a:ext uri="{FF2B5EF4-FFF2-40B4-BE49-F238E27FC236}">
+                <a16:creationId xmlns:a16="http://schemas.microsoft.com/office/drawing/2014/main" id="{3B7468A8-7166-4ED5-86C1-622FB1CFC355}"/>
+              </a:ext>
+            </a:extLst>
+          </p:cNvPr>
+          <p:cNvPicPr>
+            <a:picLocks noChangeAspect="1"/>
+          </p:cNvPicPr>
+          <p:nvPr/>
+        </p:nvPicPr>
+        <p:blipFill>
+          <a:blip r:embed="rId7"/>
+          <a:stretch>
+            <a:fillRect/>
+          </a:stretch>
+        </p:blipFill>
+        <p:spPr>
+          <a:xfrm>
+            <a:off x="6303823" y="1340688"/>
+            <a:ext cx="2781300" cy="1257382"/>
+          </a:xfrm>
+          <a:prstGeom prst="rect">
+            <a:avLst/>
+          </a:prstGeom>
+        </p:spPr>
+      </p:pic>
+      <p:pic>
+        <p:nvPicPr>
+          <p:cNvPr id="18" name="Picture 17">
+            <a:extLst>
+              <a:ext uri="{FF2B5EF4-FFF2-40B4-BE49-F238E27FC236}">
+                <a16:creationId xmlns:a16="http://schemas.microsoft.com/office/drawing/2014/main" id="{0540FC0C-A593-432D-AD11-20B7B71B0FAB}"/>
+              </a:ext>
+            </a:extLst>
+          </p:cNvPr>
+          <p:cNvPicPr>
+            <a:picLocks noChangeAspect="1"/>
+          </p:cNvPicPr>
+          <p:nvPr/>
+        </p:nvPicPr>
+        <p:blipFill>
+          <a:blip r:embed="rId8"/>
+          <a:stretch>
+            <a:fillRect/>
+          </a:stretch>
+        </p:blipFill>
+        <p:spPr>
+          <a:xfrm>
+            <a:off x="6247905" y="54782"/>
+            <a:ext cx="2705100" cy="1315493"/>
+          </a:xfrm>
+          <a:prstGeom prst="rect">
+            <a:avLst/>
+          </a:prstGeom>
+        </p:spPr>
+      </p:pic>
+      <p:pic>
+        <p:nvPicPr>
+          <p:cNvPr id="20" name="Picture 19">
+            <a:extLst>
+              <a:ext uri="{FF2B5EF4-FFF2-40B4-BE49-F238E27FC236}">
+                <a16:creationId xmlns:a16="http://schemas.microsoft.com/office/drawing/2014/main" id="{6CAF1F62-98E0-43EC-AD48-83EBEDFF4671}"/>
+              </a:ext>
+            </a:extLst>
+          </p:cNvPr>
+          <p:cNvPicPr>
+            <a:picLocks noChangeAspect="1"/>
+          </p:cNvPicPr>
+          <p:nvPr/>
+        </p:nvPicPr>
+        <p:blipFill>
+          <a:blip r:embed="rId9"/>
+          <a:stretch>
+            <a:fillRect/>
+          </a:stretch>
+        </p:blipFill>
+        <p:spPr>
+          <a:xfrm>
+            <a:off x="9199421" y="160448"/>
+            <a:ext cx="2705100" cy="1495425"/>
+          </a:xfrm>
+          <a:prstGeom prst="rect">
+            <a:avLst/>
+          </a:prstGeom>
+        </p:spPr>
+      </p:pic>
+      <p:pic>
+        <p:nvPicPr>
+          <p:cNvPr id="22" name="Picture 21">
+            <a:extLst>
+              <a:ext uri="{FF2B5EF4-FFF2-40B4-BE49-F238E27FC236}">
+                <a16:creationId xmlns:a16="http://schemas.microsoft.com/office/drawing/2014/main" id="{D35BAABC-B086-4F28-A3AE-01626AB7D628}"/>
+              </a:ext>
+            </a:extLst>
+          </p:cNvPr>
+          <p:cNvPicPr>
+            <a:picLocks noChangeAspect="1"/>
+          </p:cNvPicPr>
+          <p:nvPr/>
+        </p:nvPicPr>
+        <p:blipFill>
+          <a:blip r:embed="rId10"/>
+          <a:stretch>
+            <a:fillRect/>
+          </a:stretch>
+        </p:blipFill>
+        <p:spPr>
+          <a:xfrm>
+            <a:off x="6247905" y="2765920"/>
+            <a:ext cx="6429375" cy="1226919"/>
+          </a:xfrm>
+          <a:prstGeom prst="rect">
+            <a:avLst/>
+          </a:prstGeom>
+        </p:spPr>
+      </p:pic>
+      <p:cxnSp>
+        <p:nvCxnSpPr>
+          <p:cNvPr id="24" name="Straight Connector 23">
+            <a:extLst>
+              <a:ext uri="{FF2B5EF4-FFF2-40B4-BE49-F238E27FC236}">
+                <a16:creationId xmlns:a16="http://schemas.microsoft.com/office/drawing/2014/main" id="{9A24396F-B460-4468-805F-D1167DAD3AA0}"/>
+              </a:ext>
+              <a:ext uri="{C183D7F6-B498-43B3-948B-1728B52AA6E4}">
+                <adec:decorative xmlns:adec="http://schemas.microsoft.com/office/drawing/2017/decorative" val="1"/>
+              </a:ext>
+            </a:extLst>
+          </p:cNvPr>
+          <p:cNvCxnSpPr>
+            <a:cxnSpLocks/>
+          </p:cNvCxnSpPr>
+          <p:nvPr/>
+        </p:nvCxnSpPr>
+        <p:spPr>
+          <a:xfrm>
+            <a:off x="5915889" y="614614"/>
+            <a:ext cx="0" cy="6074405"/>
+          </a:xfrm>
+          <a:prstGeom prst="line">
+            <a:avLst/>
+          </a:prstGeom>
+          <a:ln w="63500" cap="rnd">
+            <a:solidFill>
+              <a:schemeClr val="accent1"/>
+            </a:solidFill>
+          </a:ln>
+        </p:spPr>
+        <p:style>
+          <a:lnRef idx="1">
+            <a:schemeClr val="accent1"/>
+          </a:lnRef>
+          <a:fillRef idx="0">
+            <a:schemeClr val="accent1"/>
+          </a:fillRef>
+          <a:effectRef idx="0">
+            <a:schemeClr val="accent1"/>
+          </a:effectRef>
+          <a:fontRef idx="minor">
+            <a:schemeClr val="tx1"/>
+          </a:fontRef>
+        </p:style>
+      </p:cxnSp>
     </p:spTree>
     <p:extLst>
       <p:ext uri="{BB962C8B-B14F-4D97-AF65-F5344CB8AC3E}">
@@ -22126,7 +22352,7 @@
         </p:blipFill>
         <p:spPr>
           <a:xfrm>
-            <a:off x="151099" y="1095935"/>
+            <a:off x="109534" y="1095935"/>
             <a:ext cx="5572125" cy="1971675"/>
           </a:xfrm>
           <a:prstGeom prst="rect">
@@ -22243,7 +22469,7 @@
         </p:nvCxnSpPr>
         <p:spPr>
           <a:xfrm>
-            <a:off x="5611097" y="747595"/>
+            <a:off x="5709369" y="653439"/>
             <a:ext cx="0" cy="6074405"/>
           </a:xfrm>
           <a:prstGeom prst="line">
@@ -22502,7 +22728,7 @@
         </p:nvSpPr>
         <p:spPr>
           <a:xfrm>
-            <a:off x="8270604" y="304582"/>
+            <a:off x="6145997" y="196322"/>
             <a:ext cx="3321627" cy="540000"/>
           </a:xfrm>
         </p:spPr>

</xml_diff>

<commit_message>
Updated rhe ppt 	modified:   presentation/medicine.pptx
</commit_message>
<xml_diff>
--- a/presentation/medicine.pptx
+++ b/presentation/medicine.pptx
@@ -13023,7 +13023,7 @@
         </p:blipFill>
         <p:spPr>
           <a:xfrm>
-            <a:off x="149803" y="3202363"/>
+            <a:off x="351122" y="3124384"/>
             <a:ext cx="5295900" cy="1847850"/>
           </a:xfrm>
           <a:prstGeom prst="rect">
@@ -14593,6 +14593,227 @@
           </a:fontRef>
         </p:style>
       </p:cxnSp>
+      <p:sp>
+        <p:nvSpPr>
+          <p:cNvPr id="30" name="Content Placeholder 3">
+            <a:extLst>
+              <a:ext uri="{FF2B5EF4-FFF2-40B4-BE49-F238E27FC236}">
+                <a16:creationId xmlns:a16="http://schemas.microsoft.com/office/drawing/2014/main" id="{D52A9914-D0DC-4339-8F19-A95AD16B3BBE}"/>
+              </a:ext>
+            </a:extLst>
+          </p:cNvPr>
+          <p:cNvSpPr txBox="1">
+            <a:spLocks/>
+          </p:cNvSpPr>
+          <p:nvPr/>
+        </p:nvSpPr>
+        <p:spPr>
+          <a:xfrm>
+            <a:off x="304358" y="2245435"/>
+            <a:ext cx="5129857" cy="244638"/>
+          </a:xfrm>
+          <a:prstGeom prst="rect">
+            <a:avLst/>
+          </a:prstGeom>
+        </p:spPr>
+        <p:txBody>
+          <a:bodyPr vert="horz" lIns="0" tIns="0" rIns="0" bIns="0" rtlCol="0">
+            <a:noAutofit/>
+          </a:bodyPr>
+          <a:lstStyle>
+            <a:lvl1pPr marL="263525" indent="-263525" algn="l" defTabSz="914400" rtl="0" eaLnBrk="1" latinLnBrk="0" hangingPunct="1">
+              <a:lnSpc>
+                <a:spcPct val="90000"/>
+              </a:lnSpc>
+              <a:spcBef>
+                <a:spcPts val="1000"/>
+              </a:spcBef>
+              <a:buFont typeface="Arial" panose="020B0604020202020204" pitchFamily="34" charset="0"/>
+              <a:buChar char="•"/>
+              <a:defRPr sz="1800" kern="1200">
+                <a:solidFill>
+                  <a:schemeClr val="tx1">
+                    <a:lumMod val="75000"/>
+                    <a:lumOff val="25000"/>
+                  </a:schemeClr>
+                </a:solidFill>
+                <a:latin typeface="+mj-lt"/>
+                <a:ea typeface="+mn-ea"/>
+                <a:cs typeface="+mn-cs"/>
+              </a:defRPr>
+            </a:lvl1pPr>
+            <a:lvl2pPr marL="536575" indent="-273050" algn="l" defTabSz="914400" rtl="0" eaLnBrk="1" latinLnBrk="0" hangingPunct="1">
+              <a:lnSpc>
+                <a:spcPct val="90000"/>
+              </a:lnSpc>
+              <a:spcBef>
+                <a:spcPts val="500"/>
+              </a:spcBef>
+              <a:buFont typeface="Arial" panose="020B0604020202020204" pitchFamily="34" charset="0"/>
+              <a:buChar char="•"/>
+              <a:defRPr sz="1600" kern="1200">
+                <a:solidFill>
+                  <a:schemeClr val="tx1">
+                    <a:lumMod val="75000"/>
+                    <a:lumOff val="25000"/>
+                  </a:schemeClr>
+                </a:solidFill>
+                <a:latin typeface="+mj-lt"/>
+                <a:ea typeface="+mn-ea"/>
+                <a:cs typeface="+mn-cs"/>
+              </a:defRPr>
+            </a:lvl2pPr>
+            <a:lvl3pPr marL="811213" indent="-274638" algn="l" defTabSz="914400" rtl="0" eaLnBrk="1" latinLnBrk="0" hangingPunct="1">
+              <a:lnSpc>
+                <a:spcPct val="90000"/>
+              </a:lnSpc>
+              <a:spcBef>
+                <a:spcPts val="500"/>
+              </a:spcBef>
+              <a:buFont typeface="Arial" panose="020B0604020202020204" pitchFamily="34" charset="0"/>
+              <a:buChar char="•"/>
+              <a:defRPr sz="1400" kern="1200">
+                <a:solidFill>
+                  <a:schemeClr val="tx1">
+                    <a:lumMod val="75000"/>
+                    <a:lumOff val="25000"/>
+                  </a:schemeClr>
+                </a:solidFill>
+                <a:latin typeface="+mj-lt"/>
+                <a:ea typeface="+mn-ea"/>
+                <a:cs typeface="+mn-cs"/>
+              </a:defRPr>
+            </a:lvl3pPr>
+            <a:lvl4pPr marL="1074738" indent="-263525" algn="l" defTabSz="914400" rtl="0" eaLnBrk="1" latinLnBrk="0" hangingPunct="1">
+              <a:lnSpc>
+                <a:spcPct val="90000"/>
+              </a:lnSpc>
+              <a:spcBef>
+                <a:spcPts val="500"/>
+              </a:spcBef>
+              <a:buFont typeface="Arial" panose="020B0604020202020204" pitchFamily="34" charset="0"/>
+              <a:buChar char="•"/>
+              <a:defRPr sz="1400" kern="1200">
+                <a:solidFill>
+                  <a:schemeClr val="tx1">
+                    <a:lumMod val="75000"/>
+                    <a:lumOff val="25000"/>
+                  </a:schemeClr>
+                </a:solidFill>
+                <a:latin typeface="+mj-lt"/>
+                <a:ea typeface="+mn-ea"/>
+                <a:cs typeface="+mn-cs"/>
+              </a:defRPr>
+            </a:lvl4pPr>
+            <a:lvl5pPr marL="1347788" indent="-273050" algn="l" defTabSz="914400" rtl="0" eaLnBrk="1" latinLnBrk="0" hangingPunct="1">
+              <a:lnSpc>
+                <a:spcPct val="90000"/>
+              </a:lnSpc>
+              <a:spcBef>
+                <a:spcPts val="500"/>
+              </a:spcBef>
+              <a:buFont typeface="Arial" panose="020B0604020202020204" pitchFamily="34" charset="0"/>
+              <a:buChar char="•"/>
+              <a:defRPr sz="1400" kern="1200">
+                <a:solidFill>
+                  <a:schemeClr val="tx1">
+                    <a:lumMod val="75000"/>
+                    <a:lumOff val="25000"/>
+                  </a:schemeClr>
+                </a:solidFill>
+                <a:latin typeface="+mj-lt"/>
+                <a:ea typeface="+mn-ea"/>
+                <a:cs typeface="+mn-cs"/>
+              </a:defRPr>
+            </a:lvl5pPr>
+            <a:lvl6pPr marL="2514600" indent="-228600" algn="l" defTabSz="914400" rtl="0" eaLnBrk="1" latinLnBrk="0" hangingPunct="1">
+              <a:lnSpc>
+                <a:spcPct val="90000"/>
+              </a:lnSpc>
+              <a:spcBef>
+                <a:spcPts val="500"/>
+              </a:spcBef>
+              <a:buFont typeface="Arial" panose="020B0604020202020204" pitchFamily="34" charset="0"/>
+              <a:buChar char="•"/>
+              <a:defRPr sz="1800" kern="1200">
+                <a:solidFill>
+                  <a:schemeClr val="tx1"/>
+                </a:solidFill>
+                <a:latin typeface="+mn-lt"/>
+                <a:ea typeface="+mn-ea"/>
+                <a:cs typeface="+mn-cs"/>
+              </a:defRPr>
+            </a:lvl6pPr>
+            <a:lvl7pPr marL="2971800" indent="-228600" algn="l" defTabSz="914400" rtl="0" eaLnBrk="1" latinLnBrk="0" hangingPunct="1">
+              <a:lnSpc>
+                <a:spcPct val="90000"/>
+              </a:lnSpc>
+              <a:spcBef>
+                <a:spcPts val="500"/>
+              </a:spcBef>
+              <a:buFont typeface="Arial" panose="020B0604020202020204" pitchFamily="34" charset="0"/>
+              <a:buChar char="•"/>
+              <a:defRPr sz="1800" kern="1200">
+                <a:solidFill>
+                  <a:schemeClr val="tx1"/>
+                </a:solidFill>
+                <a:latin typeface="+mn-lt"/>
+                <a:ea typeface="+mn-ea"/>
+                <a:cs typeface="+mn-cs"/>
+              </a:defRPr>
+            </a:lvl7pPr>
+            <a:lvl8pPr marL="3429000" indent="-228600" algn="l" defTabSz="914400" rtl="0" eaLnBrk="1" latinLnBrk="0" hangingPunct="1">
+              <a:lnSpc>
+                <a:spcPct val="90000"/>
+              </a:lnSpc>
+              <a:spcBef>
+                <a:spcPts val="500"/>
+              </a:spcBef>
+              <a:buFont typeface="Arial" panose="020B0604020202020204" pitchFamily="34" charset="0"/>
+              <a:buChar char="•"/>
+              <a:defRPr sz="1800" kern="1200">
+                <a:solidFill>
+                  <a:schemeClr val="tx1"/>
+                </a:solidFill>
+                <a:latin typeface="+mn-lt"/>
+                <a:ea typeface="+mn-ea"/>
+                <a:cs typeface="+mn-cs"/>
+              </a:defRPr>
+            </a:lvl8pPr>
+            <a:lvl9pPr marL="3886200" indent="-228600" algn="l" defTabSz="914400" rtl="0" eaLnBrk="1" latinLnBrk="0" hangingPunct="1">
+              <a:lnSpc>
+                <a:spcPct val="90000"/>
+              </a:lnSpc>
+              <a:spcBef>
+                <a:spcPts val="500"/>
+              </a:spcBef>
+              <a:buFont typeface="Arial" panose="020B0604020202020204" pitchFamily="34" charset="0"/>
+              <a:buChar char="•"/>
+              <a:defRPr sz="1800" kern="1200">
+                <a:solidFill>
+                  <a:schemeClr val="tx1"/>
+                </a:solidFill>
+                <a:latin typeface="+mn-lt"/>
+                <a:ea typeface="+mn-ea"/>
+                <a:cs typeface="+mn-cs"/>
+              </a:defRPr>
+            </a:lvl9pPr>
+          </a:lstStyle>
+          <a:p>
+            <a:pPr marL="0" indent="0">
+              <a:buNone/>
+            </a:pPr>
+            <a:r>
+              <a:rPr lang="en-US" noProof="1">
+                <a:solidFill>
+                  <a:srgbClr val="C00000"/>
+                </a:solidFill>
+              </a:rPr>
+              <a:t>Which Doctors have less patients than average? </a:t>
+            </a:r>
+          </a:p>
+        </p:txBody>
+      </p:sp>
     </p:spTree>
     <p:extLst>
       <p:ext uri="{BB962C8B-B14F-4D97-AF65-F5344CB8AC3E}">

</xml_diff>

<commit_message>
Added the final ppt:wq 	modified:   presentation/medicine.pptx
</commit_message>
<xml_diff>
--- a/presentation/medicine.pptx
+++ b/presentation/medicine.pptx
@@ -6151,7 +6151,31 @@
           <a:p>
             <a:r>
               <a:rPr lang="en-US" noProof="1"/>
-              <a:t>Team Members List</a:t>
+              <a:t>Charithra Chandrashekar</a:t>
+            </a:r>
+          </a:p>
+          <a:p>
+            <a:r>
+              <a:rPr lang="en-US" noProof="1"/>
+              <a:t>Dinu Thomas</a:t>
+            </a:r>
+          </a:p>
+          <a:p>
+            <a:r>
+              <a:rPr lang="en-US" noProof="1"/>
+              <a:t>Fathima Hafeez</a:t>
+            </a:r>
+          </a:p>
+          <a:p>
+            <a:r>
+              <a:rPr lang="en-US" noProof="1"/>
+              <a:t>Kashyap Bhargav Ram</a:t>
+            </a:r>
+          </a:p>
+          <a:p>
+            <a:r>
+              <a:rPr lang="en-US" noProof="1"/>
+              <a:t>Sharath</a:t>
             </a:r>
           </a:p>
         </p:txBody>

</xml_diff>

<commit_message>
Modified the pppt footers 	modified:   presentation/medicine.pptx
</commit_message>
<xml_diff>
--- a/presentation/medicine.pptx
+++ b/presentation/medicine.pptx
@@ -124,10 +124,21 @@
   </p:defaultTextStyle>
   <p:extLst>
     <p:ext uri="{EFAFB233-063F-42B5-8137-9DF3F51BA10A}">
-      <p15:sldGuideLst xmlns:p15="http://schemas.microsoft.com/office/powerpoint/2012/main" xmlns=""/>
+      <p15:sldGuideLst xmlns:p15="http://schemas.microsoft.com/office/powerpoint/2012/main">
+        <p15:guide id="1" orient="horz" pos="2160">
+          <p15:clr>
+            <a:srgbClr val="A4A3A4"/>
+          </p15:clr>
+        </p15:guide>
+        <p15:guide id="2" pos="3840">
+          <p15:clr>
+            <a:srgbClr val="A4A3A4"/>
+          </p15:clr>
+        </p15:guide>
+      </p15:sldGuideLst>
     </p:ext>
     <p:ext uri="{2D200454-40CA-4A62-9FC3-DE9A4176ACB9}">
-      <p15:notesGuideLst xmlns:p15="http://schemas.microsoft.com/office/powerpoint/2012/main" xmlns=""/>
+      <p15:notesGuideLst xmlns:p15="http://schemas.microsoft.com/office/powerpoint/2012/main"/>
     </p:ext>
   </p:extLst>
 </p:presentation>
@@ -160,7 +171,7 @@
           <p:cNvPr id="2" name="Header Placeholder 1">
             <a:extLst>
               <a:ext uri="{FF2B5EF4-FFF2-40B4-BE49-F238E27FC236}">
-                <a16:creationId xmlns:a16="http://schemas.microsoft.com/office/drawing/2014/main" xmlns="" id="{D2873B9F-50A0-4622-8B27-9EA7B86E7C9B}"/>
+                <a16:creationId xmlns:a16="http://schemas.microsoft.com/office/drawing/2014/main" id="{D2873B9F-50A0-4622-8B27-9EA7B86E7C9B}"/>
               </a:ext>
             </a:extLst>
           </p:cNvPr>
@@ -197,7 +208,7 @@
           <p:cNvPr id="3" name="Date Placeholder 2">
             <a:extLst>
               <a:ext uri="{FF2B5EF4-FFF2-40B4-BE49-F238E27FC236}">
-                <a16:creationId xmlns:a16="http://schemas.microsoft.com/office/drawing/2014/main" xmlns="" id="{AD217B71-78E5-4F1B-8D85-573B8AAD3E43}"/>
+                <a16:creationId xmlns:a16="http://schemas.microsoft.com/office/drawing/2014/main" id="{AD217B71-78E5-4F1B-8D85-573B8AAD3E43}"/>
               </a:ext>
             </a:extLst>
           </p:cNvPr>
@@ -239,7 +250,7 @@
           <p:cNvPr id="4" name="Footer Placeholder 3">
             <a:extLst>
               <a:ext uri="{FF2B5EF4-FFF2-40B4-BE49-F238E27FC236}">
-                <a16:creationId xmlns:a16="http://schemas.microsoft.com/office/drawing/2014/main" xmlns="" id="{E2A5D993-102A-4921-A12E-E8E8D0285AF0}"/>
+                <a16:creationId xmlns:a16="http://schemas.microsoft.com/office/drawing/2014/main" id="{E2A5D993-102A-4921-A12E-E8E8D0285AF0}"/>
               </a:ext>
             </a:extLst>
           </p:cNvPr>
@@ -276,7 +287,7 @@
           <p:cNvPr id="5" name="Slide Number Placeholder 4">
             <a:extLst>
               <a:ext uri="{FF2B5EF4-FFF2-40B4-BE49-F238E27FC236}">
-                <a16:creationId xmlns:a16="http://schemas.microsoft.com/office/drawing/2014/main" xmlns="" id="{63F94975-3B91-4B9C-9498-7DA766AE146B}"/>
+                <a16:creationId xmlns:a16="http://schemas.microsoft.com/office/drawing/2014/main" id="{63F94975-3B91-4B9C-9498-7DA766AE146B}"/>
               </a:ext>
             </a:extLst>
           </p:cNvPr>
@@ -316,7 +327,7 @@
     </p:spTree>
     <p:extLst>
       <p:ext uri="{BB962C8B-B14F-4D97-AF65-F5344CB8AC3E}">
-        <p14:creationId xmlns:p14="http://schemas.microsoft.com/office/powerpoint/2010/main" xmlns="" val="2936642979"/>
+        <p14:creationId xmlns:p14="http://schemas.microsoft.com/office/powerpoint/2010/main" val="2936642979"/>
       </p:ext>
     </p:extLst>
   </p:cSld>
@@ -575,7 +586,7 @@
     </p:spTree>
     <p:extLst>
       <p:ext uri="{BB962C8B-B14F-4D97-AF65-F5344CB8AC3E}">
-        <p14:creationId xmlns:p14="http://schemas.microsoft.com/office/powerpoint/2010/main" xmlns="" val="906497170"/>
+        <p14:creationId xmlns:p14="http://schemas.microsoft.com/office/powerpoint/2010/main" val="906497170"/>
       </p:ext>
     </p:extLst>
   </p:cSld>
@@ -697,7 +708,7 @@
           <p:cNvPr id="13" name="Picture 12">
             <a:extLst>
               <a:ext uri="{FF2B5EF4-FFF2-40B4-BE49-F238E27FC236}">
-                <a16:creationId xmlns:a16="http://schemas.microsoft.com/office/drawing/2014/main" xmlns="" id="{0945AC3A-7D9B-423E-A2BF-B883C9B2D241}"/>
+                <a16:creationId xmlns:a16="http://schemas.microsoft.com/office/drawing/2014/main" id="{0945AC3A-7D9B-423E-A2BF-B883C9B2D241}"/>
               </a:ext>
             </a:extLst>
           </p:cNvPr>
@@ -717,7 +728,7 @@
             </a:duotone>
             <a:extLst>
               <a:ext uri="{28A0092B-C50C-407E-A947-70E740481C1C}">
-                <a14:useLocalDpi xmlns:a14="http://schemas.microsoft.com/office/drawing/2010/main" xmlns=""/>
+                <a14:useLocalDpi xmlns:a14="http://schemas.microsoft.com/office/drawing/2010/main"/>
               </a:ext>
             </a:extLst>
           </a:blip>
@@ -739,7 +750,7 @@
           <p:cNvPr id="5" name="Rectangle 4">
             <a:extLst>
               <a:ext uri="{FF2B5EF4-FFF2-40B4-BE49-F238E27FC236}">
-                <a16:creationId xmlns:a16="http://schemas.microsoft.com/office/drawing/2014/main" xmlns="" id="{C7524B29-B525-4E47-862B-FD57B403D539}"/>
+                <a16:creationId xmlns:a16="http://schemas.microsoft.com/office/drawing/2014/main" id="{C7524B29-B525-4E47-862B-FD57B403D539}"/>
               </a:ext>
             </a:extLst>
           </p:cNvPr>
@@ -793,7 +804,7 @@
           <p:cNvPr id="10" name="Picture Placeholder 9">
             <a:extLst>
               <a:ext uri="{FF2B5EF4-FFF2-40B4-BE49-F238E27FC236}">
-                <a16:creationId xmlns:a16="http://schemas.microsoft.com/office/drawing/2014/main" xmlns="" id="{140927D5-AE1A-4ABD-BD8F-2F78723FF0D6}"/>
+                <a16:creationId xmlns:a16="http://schemas.microsoft.com/office/drawing/2014/main" id="{140927D5-AE1A-4ABD-BD8F-2F78723FF0D6}"/>
               </a:ext>
             </a:extLst>
           </p:cNvPr>
@@ -840,7 +851,7 @@
           <p:cNvPr id="11" name="Rectangle 10">
             <a:extLst>
               <a:ext uri="{FF2B5EF4-FFF2-40B4-BE49-F238E27FC236}">
-                <a16:creationId xmlns:a16="http://schemas.microsoft.com/office/drawing/2014/main" xmlns="" id="{F94C333A-735B-44F8-99E4-E73D8172DE35}"/>
+                <a16:creationId xmlns:a16="http://schemas.microsoft.com/office/drawing/2014/main" id="{F94C333A-735B-44F8-99E4-E73D8172DE35}"/>
               </a:ext>
             </a:extLst>
           </p:cNvPr>
@@ -894,7 +905,7 @@
           <p:cNvPr id="12" name="Rectangle 11">
             <a:extLst>
               <a:ext uri="{FF2B5EF4-FFF2-40B4-BE49-F238E27FC236}">
-                <a16:creationId xmlns:a16="http://schemas.microsoft.com/office/drawing/2014/main" xmlns="" id="{CC69AA83-848B-4DFD-A644-A5D9CEFF95E3}"/>
+                <a16:creationId xmlns:a16="http://schemas.microsoft.com/office/drawing/2014/main" id="{CC69AA83-848B-4DFD-A644-A5D9CEFF95E3}"/>
               </a:ext>
             </a:extLst>
           </p:cNvPr>
@@ -951,7 +962,7 @@
           <p:cNvPr id="15" name="Slide Number Placeholder 5">
             <a:extLst>
               <a:ext uri="{FF2B5EF4-FFF2-40B4-BE49-F238E27FC236}">
-                <a16:creationId xmlns:a16="http://schemas.microsoft.com/office/drawing/2014/main" xmlns="" id="{42880EF2-ACF9-4D66-99FF-99CB3F61BE99}"/>
+                <a16:creationId xmlns:a16="http://schemas.microsoft.com/office/drawing/2014/main" id="{42880EF2-ACF9-4D66-99FF-99CB3F61BE99}"/>
               </a:ext>
             </a:extLst>
           </p:cNvPr>
@@ -1079,7 +1090,7 @@
           <p:cNvPr id="2" name="Title 1">
             <a:extLst>
               <a:ext uri="{FF2B5EF4-FFF2-40B4-BE49-F238E27FC236}">
-                <a16:creationId xmlns:a16="http://schemas.microsoft.com/office/drawing/2014/main" xmlns="" id="{8487E03C-DE68-4CE8-A7F1-B9DD28846BC8}"/>
+                <a16:creationId xmlns:a16="http://schemas.microsoft.com/office/drawing/2014/main" id="{8487E03C-DE68-4CE8-A7F1-B9DD28846BC8}"/>
               </a:ext>
             </a:extLst>
           </p:cNvPr>
@@ -1124,7 +1135,7 @@
           <p:cNvPr id="3" name="Subtitle 2">
             <a:extLst>
               <a:ext uri="{FF2B5EF4-FFF2-40B4-BE49-F238E27FC236}">
-                <a16:creationId xmlns:a16="http://schemas.microsoft.com/office/drawing/2014/main" xmlns="" id="{7EEE8855-FE55-4351-B21B-FE33CB8050C1}"/>
+                <a16:creationId xmlns:a16="http://schemas.microsoft.com/office/drawing/2014/main" id="{7EEE8855-FE55-4351-B21B-FE33CB8050C1}"/>
               </a:ext>
             </a:extLst>
           </p:cNvPr>
@@ -1200,7 +1211,7 @@
           <p:cNvPr id="7" name="Graphic 11">
             <a:extLst>
               <a:ext uri="{FF2B5EF4-FFF2-40B4-BE49-F238E27FC236}">
-                <a16:creationId xmlns:a16="http://schemas.microsoft.com/office/drawing/2014/main" xmlns="" id="{54BAE1D8-3DF8-48CA-92C4-2E2064E4A3C5}"/>
+                <a16:creationId xmlns:a16="http://schemas.microsoft.com/office/drawing/2014/main" id="{54BAE1D8-3DF8-48CA-92C4-2E2064E4A3C5}"/>
               </a:ext>
             </a:extLst>
           </p:cNvPr>
@@ -1403,7 +1414,7 @@
           <p:cNvPr id="14" name="Rectangle 13">
             <a:extLst>
               <a:ext uri="{FF2B5EF4-FFF2-40B4-BE49-F238E27FC236}">
-                <a16:creationId xmlns:a16="http://schemas.microsoft.com/office/drawing/2014/main" xmlns="" id="{974E860F-437F-442E-898C-244A0DD5D765}"/>
+                <a16:creationId xmlns:a16="http://schemas.microsoft.com/office/drawing/2014/main" id="{974E860F-437F-442E-898C-244A0DD5D765}"/>
               </a:ext>
             </a:extLst>
           </p:cNvPr>
@@ -1472,7 +1483,7 @@
     </p:spTree>
     <p:extLst>
       <p:ext uri="{BB962C8B-B14F-4D97-AF65-F5344CB8AC3E}">
-        <p14:creationId xmlns:p14="http://schemas.microsoft.com/office/powerpoint/2010/main" xmlns="" val="80426409"/>
+        <p14:creationId xmlns:p14="http://schemas.microsoft.com/office/powerpoint/2010/main" val="80426409"/>
       </p:ext>
     </p:extLst>
   </p:cSld>
@@ -1504,7 +1515,7 @@
           <p:cNvPr id="2" name="Title 1">
             <a:extLst>
               <a:ext uri="{FF2B5EF4-FFF2-40B4-BE49-F238E27FC236}">
-                <a16:creationId xmlns:a16="http://schemas.microsoft.com/office/drawing/2014/main" xmlns="" id="{1DBF7CBC-CC93-4AB3-9D46-61075505816B}"/>
+                <a16:creationId xmlns:a16="http://schemas.microsoft.com/office/drawing/2014/main" id="{1DBF7CBC-CC93-4AB3-9D46-61075505816B}"/>
               </a:ext>
             </a:extLst>
           </p:cNvPr>
@@ -1537,7 +1548,7 @@
           <p:cNvPr id="16" name="Subtitle">
             <a:extLst>
               <a:ext uri="{FF2B5EF4-FFF2-40B4-BE49-F238E27FC236}">
-                <a16:creationId xmlns:a16="http://schemas.microsoft.com/office/drawing/2014/main" xmlns="" id="{152317FE-88B5-4D1F-AECF-DA69D6779BEA}"/>
+                <a16:creationId xmlns:a16="http://schemas.microsoft.com/office/drawing/2014/main" id="{152317FE-88B5-4D1F-AECF-DA69D6779BEA}"/>
               </a:ext>
             </a:extLst>
           </p:cNvPr>
@@ -1576,7 +1587,7 @@
           <p:cNvPr id="3" name="Left Col">
             <a:extLst>
               <a:ext uri="{FF2B5EF4-FFF2-40B4-BE49-F238E27FC236}">
-                <a16:creationId xmlns:a16="http://schemas.microsoft.com/office/drawing/2014/main" xmlns="" id="{49529B8D-BAD9-4E6D-82F7-0275D8195AA9}"/>
+                <a16:creationId xmlns:a16="http://schemas.microsoft.com/office/drawing/2014/main" id="{49529B8D-BAD9-4E6D-82F7-0275D8195AA9}"/>
               </a:ext>
             </a:extLst>
           </p:cNvPr>
@@ -1638,7 +1649,7 @@
           <p:cNvPr id="4" name="Right Col">
             <a:extLst>
               <a:ext uri="{FF2B5EF4-FFF2-40B4-BE49-F238E27FC236}">
-                <a16:creationId xmlns:a16="http://schemas.microsoft.com/office/drawing/2014/main" xmlns="" id="{0AAD114E-6BCC-4476-8E44-12E87D4675E2}"/>
+                <a16:creationId xmlns:a16="http://schemas.microsoft.com/office/drawing/2014/main" id="{0AAD114E-6BCC-4476-8E44-12E87D4675E2}"/>
               </a:ext>
             </a:extLst>
           </p:cNvPr>
@@ -1700,7 +1711,7 @@
           <p:cNvPr id="5" name="Footer Placeholder 4">
             <a:extLst>
               <a:ext uri="{FF2B5EF4-FFF2-40B4-BE49-F238E27FC236}">
-                <a16:creationId xmlns:a16="http://schemas.microsoft.com/office/drawing/2014/main" xmlns="" id="{3CFF9123-1F0C-4BD2-8233-FEE5B2A46612}"/>
+                <a16:creationId xmlns:a16="http://schemas.microsoft.com/office/drawing/2014/main" id="{3CFF9123-1F0C-4BD2-8233-FEE5B2A46612}"/>
               </a:ext>
             </a:extLst>
           </p:cNvPr>
@@ -1728,7 +1739,7 @@
           <p:cNvPr id="6" name="Slide Number Placeholder 5">
             <a:extLst>
               <a:ext uri="{FF2B5EF4-FFF2-40B4-BE49-F238E27FC236}">
-                <a16:creationId xmlns:a16="http://schemas.microsoft.com/office/drawing/2014/main" xmlns="" id="{111E8981-59A6-4480-80A6-5619C2201789}"/>
+                <a16:creationId xmlns:a16="http://schemas.microsoft.com/office/drawing/2014/main" id="{111E8981-59A6-4480-80A6-5619C2201789}"/>
               </a:ext>
             </a:extLst>
           </p:cNvPr>
@@ -1756,7 +1767,7 @@
     </p:spTree>
     <p:extLst>
       <p:ext uri="{BB962C8B-B14F-4D97-AF65-F5344CB8AC3E}">
-        <p14:creationId xmlns:p14="http://schemas.microsoft.com/office/powerpoint/2010/main" xmlns="" val="1311923911"/>
+        <p14:creationId xmlns:p14="http://schemas.microsoft.com/office/powerpoint/2010/main" val="1311923911"/>
       </p:ext>
     </p:extLst>
   </p:cSld>
@@ -1788,7 +1799,7 @@
           <p:cNvPr id="2" name="Title 1">
             <a:extLst>
               <a:ext uri="{FF2B5EF4-FFF2-40B4-BE49-F238E27FC236}">
-                <a16:creationId xmlns:a16="http://schemas.microsoft.com/office/drawing/2014/main" xmlns="" id="{0A9DDDF3-2E7E-4175-ACE9-B214DCE40C6E}"/>
+                <a16:creationId xmlns:a16="http://schemas.microsoft.com/office/drawing/2014/main" id="{0A9DDDF3-2E7E-4175-ACE9-B214DCE40C6E}"/>
               </a:ext>
             </a:extLst>
           </p:cNvPr>
@@ -1816,7 +1827,7 @@
           <p:cNvPr id="8" name="Subtitle">
             <a:extLst>
               <a:ext uri="{FF2B5EF4-FFF2-40B4-BE49-F238E27FC236}">
-                <a16:creationId xmlns:a16="http://schemas.microsoft.com/office/drawing/2014/main" xmlns="" id="{5302A3D4-CF60-41AF-924C-B30D3FD99751}"/>
+                <a16:creationId xmlns:a16="http://schemas.microsoft.com/office/drawing/2014/main" id="{5302A3D4-CF60-41AF-924C-B30D3FD99751}"/>
               </a:ext>
             </a:extLst>
           </p:cNvPr>
@@ -1855,7 +1866,7 @@
           <p:cNvPr id="3" name="Footer Placeholder 2">
             <a:extLst>
               <a:ext uri="{FF2B5EF4-FFF2-40B4-BE49-F238E27FC236}">
-                <a16:creationId xmlns:a16="http://schemas.microsoft.com/office/drawing/2014/main" xmlns="" id="{2E0E8FCF-8FC7-49D2-9516-7662294E35B7}"/>
+                <a16:creationId xmlns:a16="http://schemas.microsoft.com/office/drawing/2014/main" id="{2E0E8FCF-8FC7-49D2-9516-7662294E35B7}"/>
               </a:ext>
             </a:extLst>
           </p:cNvPr>
@@ -1883,7 +1894,7 @@
           <p:cNvPr id="4" name="Slide Number Placeholder 3">
             <a:extLst>
               <a:ext uri="{FF2B5EF4-FFF2-40B4-BE49-F238E27FC236}">
-                <a16:creationId xmlns:a16="http://schemas.microsoft.com/office/drawing/2014/main" xmlns="" id="{216208B4-CFD5-4FAE-9519-74EFAC0B0368}"/>
+                <a16:creationId xmlns:a16="http://schemas.microsoft.com/office/drawing/2014/main" id="{216208B4-CFD5-4FAE-9519-74EFAC0B0368}"/>
               </a:ext>
             </a:extLst>
           </p:cNvPr>
@@ -1911,7 +1922,7 @@
     </p:spTree>
     <p:extLst>
       <p:ext uri="{BB962C8B-B14F-4D97-AF65-F5344CB8AC3E}">
-        <p14:creationId xmlns:p14="http://schemas.microsoft.com/office/powerpoint/2010/main" xmlns="" val="242122361"/>
+        <p14:creationId xmlns:p14="http://schemas.microsoft.com/office/powerpoint/2010/main" val="242122361"/>
       </p:ext>
     </p:extLst>
   </p:cSld>
@@ -1943,7 +1954,7 @@
           <p:cNvPr id="2" name="Footer Placeholder 1">
             <a:extLst>
               <a:ext uri="{FF2B5EF4-FFF2-40B4-BE49-F238E27FC236}">
-                <a16:creationId xmlns:a16="http://schemas.microsoft.com/office/drawing/2014/main" xmlns="" id="{BAED074E-AB07-44D1-8B4E-189EAEF798D6}"/>
+                <a16:creationId xmlns:a16="http://schemas.microsoft.com/office/drawing/2014/main" id="{BAED074E-AB07-44D1-8B4E-189EAEF798D6}"/>
               </a:ext>
             </a:extLst>
           </p:cNvPr>
@@ -1971,7 +1982,7 @@
           <p:cNvPr id="3" name="Slide Number Placeholder 2">
             <a:extLst>
               <a:ext uri="{FF2B5EF4-FFF2-40B4-BE49-F238E27FC236}">
-                <a16:creationId xmlns:a16="http://schemas.microsoft.com/office/drawing/2014/main" xmlns="" id="{2801D44B-9877-40D1-B788-EE3BFD57C5AB}"/>
+                <a16:creationId xmlns:a16="http://schemas.microsoft.com/office/drawing/2014/main" id="{2801D44B-9877-40D1-B788-EE3BFD57C5AB}"/>
               </a:ext>
             </a:extLst>
           </p:cNvPr>
@@ -1999,7 +2010,7 @@
     </p:spTree>
     <p:extLst>
       <p:ext uri="{BB962C8B-B14F-4D97-AF65-F5344CB8AC3E}">
-        <p14:creationId xmlns:p14="http://schemas.microsoft.com/office/powerpoint/2010/main" xmlns="" val="2946637460"/>
+        <p14:creationId xmlns:p14="http://schemas.microsoft.com/office/powerpoint/2010/main" val="2946637460"/>
       </p:ext>
     </p:extLst>
   </p:cSld>
@@ -2042,10 +2053,9 @@
           <a:lstStyle/>
           <a:p>
             <a:r>
-              <a:rPr lang="en-US" smtClean="0"/>
+              <a:rPr lang="en-US"/>
               <a:t>Click to edit Master title style</a:t>
             </a:r>
-            <a:endParaRPr lang="en-US"/>
           </a:p>
         </p:txBody>
       </p:sp>
@@ -2066,38 +2076,37 @@
           <a:p>
             <a:pPr lvl="0"/>
             <a:r>
-              <a:rPr lang="en-US" smtClean="0"/>
+              <a:rPr lang="en-US"/>
               <a:t>Click to edit Master text styles</a:t>
             </a:r>
           </a:p>
           <a:p>
             <a:pPr lvl="1"/>
             <a:r>
-              <a:rPr lang="en-US" smtClean="0"/>
+              <a:rPr lang="en-US"/>
               <a:t>Second level</a:t>
             </a:r>
           </a:p>
           <a:p>
             <a:pPr lvl="2"/>
             <a:r>
-              <a:rPr lang="en-US" smtClean="0"/>
+              <a:rPr lang="en-US"/>
               <a:t>Third level</a:t>
             </a:r>
           </a:p>
           <a:p>
             <a:pPr lvl="3"/>
             <a:r>
-              <a:rPr lang="en-US" smtClean="0"/>
+              <a:rPr lang="en-US"/>
               <a:t>Fourth level</a:t>
             </a:r>
           </a:p>
           <a:p>
             <a:pPr lvl="4"/>
             <a:r>
-              <a:rPr lang="en-US" smtClean="0"/>
+              <a:rPr lang="en-US"/>
               <a:t>Fifth level</a:t>
             </a:r>
-            <a:endParaRPr lang="en-US"/>
           </a:p>
         </p:txBody>
       </p:sp>
@@ -2127,7 +2136,7 @@
             <a:fld id="{19E57B73-8FD1-4EDE-B28F-BA840850BD05}" type="datetimeFigureOut">
               <a:rPr lang="en-US" smtClean="0"/>
               <a:pPr/>
-              <a:t>5/14/2021</a:t>
+              <a:t>5/15/2021</a:t>
             </a:fld>
             <a:endParaRPr lang="en-US"/>
           </a:p>
@@ -2206,7 +2215,7 @@
           <p:cNvPr id="15" name="Picture 14">
             <a:extLst>
               <a:ext uri="{FF2B5EF4-FFF2-40B4-BE49-F238E27FC236}">
-                <a16:creationId xmlns:a16="http://schemas.microsoft.com/office/drawing/2014/main" xmlns="" id="{9FB83C35-D975-48B4-8E79-AB7A1A80DFCE}"/>
+                <a16:creationId xmlns:a16="http://schemas.microsoft.com/office/drawing/2014/main" id="{9FB83C35-D975-48B4-8E79-AB7A1A80DFCE}"/>
               </a:ext>
             </a:extLst>
           </p:cNvPr>
@@ -2219,7 +2228,7 @@
           <a:blip r:embed="rId2" cstate="screen">
             <a:extLst>
               <a:ext uri="{28A0092B-C50C-407E-A947-70E740481C1C}">
-                <a14:useLocalDpi xmlns:a14="http://schemas.microsoft.com/office/drawing/2010/main" xmlns=""/>
+                <a14:useLocalDpi xmlns:a14="http://schemas.microsoft.com/office/drawing/2010/main"/>
               </a:ext>
             </a:extLst>
           </a:blip>
@@ -2241,7 +2250,7 @@
           <p:cNvPr id="11" name="Rectangle 10">
             <a:extLst>
               <a:ext uri="{FF2B5EF4-FFF2-40B4-BE49-F238E27FC236}">
-                <a16:creationId xmlns:a16="http://schemas.microsoft.com/office/drawing/2014/main" xmlns="" id="{DD7E187E-6082-49C3-B795-CC4321FE39F8}"/>
+                <a16:creationId xmlns:a16="http://schemas.microsoft.com/office/drawing/2014/main" id="{DD7E187E-6082-49C3-B795-CC4321FE39F8}"/>
               </a:ext>
             </a:extLst>
           </p:cNvPr>
@@ -2295,7 +2304,7 @@
           <p:cNvPr id="12" name="Picture Placeholder 9">
             <a:extLst>
               <a:ext uri="{FF2B5EF4-FFF2-40B4-BE49-F238E27FC236}">
-                <a16:creationId xmlns:a16="http://schemas.microsoft.com/office/drawing/2014/main" xmlns="" id="{8FBFF6A8-5ABD-4191-81E4-C9F86380A56D}"/>
+                <a16:creationId xmlns:a16="http://schemas.microsoft.com/office/drawing/2014/main" id="{8FBFF6A8-5ABD-4191-81E4-C9F86380A56D}"/>
               </a:ext>
             </a:extLst>
           </p:cNvPr>
@@ -2341,7 +2350,7 @@
           <p:cNvPr id="5" name="Footer Placeholder 4">
             <a:extLst>
               <a:ext uri="{FF2B5EF4-FFF2-40B4-BE49-F238E27FC236}">
-                <a16:creationId xmlns:a16="http://schemas.microsoft.com/office/drawing/2014/main" xmlns="" id="{16E27D1E-1708-4D17-AB85-058EE0C34776}"/>
+                <a16:creationId xmlns:a16="http://schemas.microsoft.com/office/drawing/2014/main" id="{16E27D1E-1708-4D17-AB85-058EE0C34776}"/>
               </a:ext>
             </a:extLst>
           </p:cNvPr>
@@ -2391,7 +2400,7 @@
           <p:cNvPr id="9" name="Slide Number Placeholder 8">
             <a:extLst>
               <a:ext uri="{FF2B5EF4-FFF2-40B4-BE49-F238E27FC236}">
-                <a16:creationId xmlns:a16="http://schemas.microsoft.com/office/drawing/2014/main" xmlns="" id="{69529A18-E6EB-4081-B804-B2FCF5287DFF}"/>
+                <a16:creationId xmlns:a16="http://schemas.microsoft.com/office/drawing/2014/main" id="{69529A18-E6EB-4081-B804-B2FCF5287DFF}"/>
               </a:ext>
             </a:extLst>
           </p:cNvPr>
@@ -2426,7 +2435,7 @@
           <p:cNvPr id="13" name="Title 1">
             <a:extLst>
               <a:ext uri="{FF2B5EF4-FFF2-40B4-BE49-F238E27FC236}">
-                <a16:creationId xmlns:a16="http://schemas.microsoft.com/office/drawing/2014/main" xmlns="" id="{C6A78464-8D00-4B94-90C7-90F1B54C8AA0}"/>
+                <a16:creationId xmlns:a16="http://schemas.microsoft.com/office/drawing/2014/main" id="{C6A78464-8D00-4B94-90C7-90F1B54C8AA0}"/>
               </a:ext>
             </a:extLst>
           </p:cNvPr>
@@ -2470,7 +2479,7 @@
           <p:cNvPr id="14" name="Subtitle 2">
             <a:extLst>
               <a:ext uri="{FF2B5EF4-FFF2-40B4-BE49-F238E27FC236}">
-                <a16:creationId xmlns:a16="http://schemas.microsoft.com/office/drawing/2014/main" xmlns="" id="{3CDBDF0B-F377-47FD-9DA1-C3BDA7C1DEDE}"/>
+                <a16:creationId xmlns:a16="http://schemas.microsoft.com/office/drawing/2014/main" id="{3CDBDF0B-F377-47FD-9DA1-C3BDA7C1DEDE}"/>
               </a:ext>
             </a:extLst>
           </p:cNvPr>
@@ -2545,7 +2554,7 @@
           <p:cNvPr id="18" name="Graphic 15">
             <a:extLst>
               <a:ext uri="{FF2B5EF4-FFF2-40B4-BE49-F238E27FC236}">
-                <a16:creationId xmlns:a16="http://schemas.microsoft.com/office/drawing/2014/main" xmlns="" id="{F50292C9-54F6-4F7B-A885-34CE1E3B0351}"/>
+                <a16:creationId xmlns:a16="http://schemas.microsoft.com/office/drawing/2014/main" id="{F50292C9-54F6-4F7B-A885-34CE1E3B0351}"/>
               </a:ext>
             </a:extLst>
           </p:cNvPr>
@@ -2830,7 +2839,7 @@
     </p:spTree>
     <p:extLst>
       <p:ext uri="{BB962C8B-B14F-4D97-AF65-F5344CB8AC3E}">
-        <p14:creationId xmlns:p14="http://schemas.microsoft.com/office/powerpoint/2010/main" xmlns="" val="2120236244"/>
+        <p14:creationId xmlns:p14="http://schemas.microsoft.com/office/powerpoint/2010/main" val="2120236244"/>
       </p:ext>
     </p:extLst>
   </p:cSld>
@@ -2862,7 +2871,7 @@
           <p:cNvPr id="2" name="Title 1">
             <a:extLst>
               <a:ext uri="{FF2B5EF4-FFF2-40B4-BE49-F238E27FC236}">
-                <a16:creationId xmlns:a16="http://schemas.microsoft.com/office/drawing/2014/main" xmlns="" id="{1DBF7CBC-CC93-4AB3-9D46-61075505816B}"/>
+                <a16:creationId xmlns:a16="http://schemas.microsoft.com/office/drawing/2014/main" id="{1DBF7CBC-CC93-4AB3-9D46-61075505816B}"/>
               </a:ext>
             </a:extLst>
           </p:cNvPr>
@@ -2895,7 +2904,7 @@
           <p:cNvPr id="16" name="Subtitle">
             <a:extLst>
               <a:ext uri="{FF2B5EF4-FFF2-40B4-BE49-F238E27FC236}">
-                <a16:creationId xmlns:a16="http://schemas.microsoft.com/office/drawing/2014/main" xmlns="" id="{152317FE-88B5-4D1F-AECF-DA69D6779BEA}"/>
+                <a16:creationId xmlns:a16="http://schemas.microsoft.com/office/drawing/2014/main" id="{152317FE-88B5-4D1F-AECF-DA69D6779BEA}"/>
               </a:ext>
             </a:extLst>
           </p:cNvPr>
@@ -2934,7 +2943,7 @@
           <p:cNvPr id="3" name="Left Col">
             <a:extLst>
               <a:ext uri="{FF2B5EF4-FFF2-40B4-BE49-F238E27FC236}">
-                <a16:creationId xmlns:a16="http://schemas.microsoft.com/office/drawing/2014/main" xmlns="" id="{49529B8D-BAD9-4E6D-82F7-0275D8195AA9}"/>
+                <a16:creationId xmlns:a16="http://schemas.microsoft.com/office/drawing/2014/main" id="{49529B8D-BAD9-4E6D-82F7-0275D8195AA9}"/>
               </a:ext>
             </a:extLst>
           </p:cNvPr>
@@ -2996,7 +3005,7 @@
           <p:cNvPr id="6" name="Picture Placeholder 5">
             <a:extLst>
               <a:ext uri="{FF2B5EF4-FFF2-40B4-BE49-F238E27FC236}">
-                <a16:creationId xmlns:a16="http://schemas.microsoft.com/office/drawing/2014/main" xmlns="" id="{3B63572F-04A5-456D-9066-1A65AFF5E685}"/>
+                <a16:creationId xmlns:a16="http://schemas.microsoft.com/office/drawing/2014/main" id="{3B63572F-04A5-456D-9066-1A65AFF5E685}"/>
               </a:ext>
             </a:extLst>
           </p:cNvPr>
@@ -3042,7 +3051,7 @@
           <p:cNvPr id="4" name="Footer Placeholder 3">
             <a:extLst>
               <a:ext uri="{FF2B5EF4-FFF2-40B4-BE49-F238E27FC236}">
-                <a16:creationId xmlns:a16="http://schemas.microsoft.com/office/drawing/2014/main" xmlns="" id="{BC263EBA-2C46-40FB-9D48-819ED0C8994F}"/>
+                <a16:creationId xmlns:a16="http://schemas.microsoft.com/office/drawing/2014/main" id="{BC263EBA-2C46-40FB-9D48-819ED0C8994F}"/>
               </a:ext>
             </a:extLst>
           </p:cNvPr>
@@ -3070,7 +3079,7 @@
           <p:cNvPr id="5" name="Slide Number Placeholder 4">
             <a:extLst>
               <a:ext uri="{FF2B5EF4-FFF2-40B4-BE49-F238E27FC236}">
-                <a16:creationId xmlns:a16="http://schemas.microsoft.com/office/drawing/2014/main" xmlns="" id="{719230BC-20AB-4DD9-AF5C-47BA72E56986}"/>
+                <a16:creationId xmlns:a16="http://schemas.microsoft.com/office/drawing/2014/main" id="{719230BC-20AB-4DD9-AF5C-47BA72E56986}"/>
               </a:ext>
             </a:extLst>
           </p:cNvPr>
@@ -3098,7 +3107,7 @@
     </p:spTree>
     <p:extLst>
       <p:ext uri="{BB962C8B-B14F-4D97-AF65-F5344CB8AC3E}">
-        <p14:creationId xmlns:p14="http://schemas.microsoft.com/office/powerpoint/2010/main" xmlns="" val="1642857815"/>
+        <p14:creationId xmlns:p14="http://schemas.microsoft.com/office/powerpoint/2010/main" val="1642857815"/>
       </p:ext>
     </p:extLst>
   </p:cSld>
@@ -3130,7 +3139,7 @@
           <p:cNvPr id="13" name="Rectangle 12">
             <a:extLst>
               <a:ext uri="{FF2B5EF4-FFF2-40B4-BE49-F238E27FC236}">
-                <a16:creationId xmlns:a16="http://schemas.microsoft.com/office/drawing/2014/main" xmlns="" id="{95A87C21-15CD-48D8-B583-89B110156879}"/>
+                <a16:creationId xmlns:a16="http://schemas.microsoft.com/office/drawing/2014/main" id="{95A87C21-15CD-48D8-B583-89B110156879}"/>
               </a:ext>
             </a:extLst>
           </p:cNvPr>
@@ -3185,7 +3194,7 @@
           <p:cNvPr id="2" name="Title 1">
             <a:extLst>
               <a:ext uri="{FF2B5EF4-FFF2-40B4-BE49-F238E27FC236}">
-                <a16:creationId xmlns:a16="http://schemas.microsoft.com/office/drawing/2014/main" xmlns="" id="{1DBF7CBC-CC93-4AB3-9D46-61075505816B}"/>
+                <a16:creationId xmlns:a16="http://schemas.microsoft.com/office/drawing/2014/main" id="{1DBF7CBC-CC93-4AB3-9D46-61075505816B}"/>
               </a:ext>
             </a:extLst>
           </p:cNvPr>
@@ -3218,7 +3227,7 @@
           <p:cNvPr id="16" name="Subtitle">
             <a:extLst>
               <a:ext uri="{FF2B5EF4-FFF2-40B4-BE49-F238E27FC236}">
-                <a16:creationId xmlns:a16="http://schemas.microsoft.com/office/drawing/2014/main" xmlns="" id="{152317FE-88B5-4D1F-AECF-DA69D6779BEA}"/>
+                <a16:creationId xmlns:a16="http://schemas.microsoft.com/office/drawing/2014/main" id="{152317FE-88B5-4D1F-AECF-DA69D6779BEA}"/>
               </a:ext>
             </a:extLst>
           </p:cNvPr>
@@ -3257,7 +3266,7 @@
           <p:cNvPr id="3" name="Left Col">
             <a:extLst>
               <a:ext uri="{FF2B5EF4-FFF2-40B4-BE49-F238E27FC236}">
-                <a16:creationId xmlns:a16="http://schemas.microsoft.com/office/drawing/2014/main" xmlns="" id="{49529B8D-BAD9-4E6D-82F7-0275D8195AA9}"/>
+                <a16:creationId xmlns:a16="http://schemas.microsoft.com/office/drawing/2014/main" id="{49529B8D-BAD9-4E6D-82F7-0275D8195AA9}"/>
               </a:ext>
             </a:extLst>
           </p:cNvPr>
@@ -3319,7 +3328,7 @@
           <p:cNvPr id="6" name="Picture Placeholder 5">
             <a:extLst>
               <a:ext uri="{FF2B5EF4-FFF2-40B4-BE49-F238E27FC236}">
-                <a16:creationId xmlns:a16="http://schemas.microsoft.com/office/drawing/2014/main" xmlns="" id="{3B63572F-04A5-456D-9066-1A65AFF5E685}"/>
+                <a16:creationId xmlns:a16="http://schemas.microsoft.com/office/drawing/2014/main" id="{3B63572F-04A5-456D-9066-1A65AFF5E685}"/>
               </a:ext>
             </a:extLst>
           </p:cNvPr>
@@ -3363,7 +3372,7 @@
           <p:cNvPr id="4" name="Footer Placeholder 3">
             <a:extLst>
               <a:ext uri="{FF2B5EF4-FFF2-40B4-BE49-F238E27FC236}">
-                <a16:creationId xmlns:a16="http://schemas.microsoft.com/office/drawing/2014/main" xmlns="" id="{BC263EBA-2C46-40FB-9D48-819ED0C8994F}"/>
+                <a16:creationId xmlns:a16="http://schemas.microsoft.com/office/drawing/2014/main" id="{BC263EBA-2C46-40FB-9D48-819ED0C8994F}"/>
               </a:ext>
             </a:extLst>
           </p:cNvPr>
@@ -3391,7 +3400,7 @@
           <p:cNvPr id="5" name="Slide Number Placeholder 4">
             <a:extLst>
               <a:ext uri="{FF2B5EF4-FFF2-40B4-BE49-F238E27FC236}">
-                <a16:creationId xmlns:a16="http://schemas.microsoft.com/office/drawing/2014/main" xmlns="" id="{719230BC-20AB-4DD9-AF5C-47BA72E56986}"/>
+                <a16:creationId xmlns:a16="http://schemas.microsoft.com/office/drawing/2014/main" id="{719230BC-20AB-4DD9-AF5C-47BA72E56986}"/>
               </a:ext>
             </a:extLst>
           </p:cNvPr>
@@ -3421,7 +3430,7 @@
           <p:cNvPr id="8" name="Picture Placeholder 5">
             <a:extLst>
               <a:ext uri="{FF2B5EF4-FFF2-40B4-BE49-F238E27FC236}">
-                <a16:creationId xmlns:a16="http://schemas.microsoft.com/office/drawing/2014/main" xmlns="" id="{5092E684-C621-4F92-A05A-A167EEF46270}"/>
+                <a16:creationId xmlns:a16="http://schemas.microsoft.com/office/drawing/2014/main" id="{5092E684-C621-4F92-A05A-A167EEF46270}"/>
               </a:ext>
             </a:extLst>
           </p:cNvPr>
@@ -3467,7 +3476,7 @@
           <p:cNvPr id="9" name="Picture Placeholder 5">
             <a:extLst>
               <a:ext uri="{FF2B5EF4-FFF2-40B4-BE49-F238E27FC236}">
-                <a16:creationId xmlns:a16="http://schemas.microsoft.com/office/drawing/2014/main" xmlns="" id="{6958D132-F2A9-41E1-BDD8-067D52CE5FEB}"/>
+                <a16:creationId xmlns:a16="http://schemas.microsoft.com/office/drawing/2014/main" id="{6958D132-F2A9-41E1-BDD8-067D52CE5FEB}"/>
               </a:ext>
             </a:extLst>
           </p:cNvPr>
@@ -3511,7 +3520,7 @@
           <p:cNvPr id="10" name="Picture Placeholder 5">
             <a:extLst>
               <a:ext uri="{FF2B5EF4-FFF2-40B4-BE49-F238E27FC236}">
-                <a16:creationId xmlns:a16="http://schemas.microsoft.com/office/drawing/2014/main" xmlns="" id="{B88FD4DB-5089-4686-B4F7-A26163146C9A}"/>
+                <a16:creationId xmlns:a16="http://schemas.microsoft.com/office/drawing/2014/main" id="{B88FD4DB-5089-4686-B4F7-A26163146C9A}"/>
               </a:ext>
             </a:extLst>
           </p:cNvPr>
@@ -3561,7 +3570,7 @@
           <p:cNvPr id="11" name="Picture Placeholder 5">
             <a:extLst>
               <a:ext uri="{FF2B5EF4-FFF2-40B4-BE49-F238E27FC236}">
-                <a16:creationId xmlns:a16="http://schemas.microsoft.com/office/drawing/2014/main" xmlns="" id="{324023AF-AB97-4B60-86FA-5DC8DA1B5C49}"/>
+                <a16:creationId xmlns:a16="http://schemas.microsoft.com/office/drawing/2014/main" id="{324023AF-AB97-4B60-86FA-5DC8DA1B5C49}"/>
               </a:ext>
             </a:extLst>
           </p:cNvPr>
@@ -3605,7 +3614,7 @@
           <p:cNvPr id="12" name="Picture Placeholder 5">
             <a:extLst>
               <a:ext uri="{FF2B5EF4-FFF2-40B4-BE49-F238E27FC236}">
-                <a16:creationId xmlns:a16="http://schemas.microsoft.com/office/drawing/2014/main" xmlns="" id="{8210F231-568A-4348-B33F-9EBB4A5CF9EB}"/>
+                <a16:creationId xmlns:a16="http://schemas.microsoft.com/office/drawing/2014/main" id="{8210F231-568A-4348-B33F-9EBB4A5CF9EB}"/>
               </a:ext>
             </a:extLst>
           </p:cNvPr>
@@ -3649,7 +3658,7 @@
     </p:spTree>
     <p:extLst>
       <p:ext uri="{BB962C8B-B14F-4D97-AF65-F5344CB8AC3E}">
-        <p14:creationId xmlns:p14="http://schemas.microsoft.com/office/powerpoint/2010/main" xmlns="" val="2445114381"/>
+        <p14:creationId xmlns:p14="http://schemas.microsoft.com/office/powerpoint/2010/main" val="2445114381"/>
       </p:ext>
     </p:extLst>
   </p:cSld>
@@ -3681,7 +3690,7 @@
           <p:cNvPr id="2" name="Title 1">
             <a:extLst>
               <a:ext uri="{FF2B5EF4-FFF2-40B4-BE49-F238E27FC236}">
-                <a16:creationId xmlns:a16="http://schemas.microsoft.com/office/drawing/2014/main" xmlns="" id="{1DBF7CBC-CC93-4AB3-9D46-61075505816B}"/>
+                <a16:creationId xmlns:a16="http://schemas.microsoft.com/office/drawing/2014/main" id="{1DBF7CBC-CC93-4AB3-9D46-61075505816B}"/>
               </a:ext>
             </a:extLst>
           </p:cNvPr>
@@ -3714,7 +3723,7 @@
           <p:cNvPr id="3" name="Left Col">
             <a:extLst>
               <a:ext uri="{FF2B5EF4-FFF2-40B4-BE49-F238E27FC236}">
-                <a16:creationId xmlns:a16="http://schemas.microsoft.com/office/drawing/2014/main" xmlns="" id="{49529B8D-BAD9-4E6D-82F7-0275D8195AA9}"/>
+                <a16:creationId xmlns:a16="http://schemas.microsoft.com/office/drawing/2014/main" id="{49529B8D-BAD9-4E6D-82F7-0275D8195AA9}"/>
               </a:ext>
             </a:extLst>
           </p:cNvPr>
@@ -3776,7 +3785,7 @@
           <p:cNvPr id="13" name="Left Header">
             <a:extLst>
               <a:ext uri="{FF2B5EF4-FFF2-40B4-BE49-F238E27FC236}">
-                <a16:creationId xmlns:a16="http://schemas.microsoft.com/office/drawing/2014/main" xmlns="" id="{2241B0A0-0033-49FF-89B8-142165C8E93C}"/>
+                <a16:creationId xmlns:a16="http://schemas.microsoft.com/office/drawing/2014/main" id="{2241B0A0-0033-49FF-89B8-142165C8E93C}"/>
               </a:ext>
             </a:extLst>
           </p:cNvPr>
@@ -3815,7 +3824,7 @@
           <p:cNvPr id="4" name="Right Col">
             <a:extLst>
               <a:ext uri="{FF2B5EF4-FFF2-40B4-BE49-F238E27FC236}">
-                <a16:creationId xmlns:a16="http://schemas.microsoft.com/office/drawing/2014/main" xmlns="" id="{0AAD114E-6BCC-4476-8E44-12E87D4675E2}"/>
+                <a16:creationId xmlns:a16="http://schemas.microsoft.com/office/drawing/2014/main" id="{0AAD114E-6BCC-4476-8E44-12E87D4675E2}"/>
               </a:ext>
             </a:extLst>
           </p:cNvPr>
@@ -3877,7 +3886,7 @@
           <p:cNvPr id="15" name="Right Header">
             <a:extLst>
               <a:ext uri="{FF2B5EF4-FFF2-40B4-BE49-F238E27FC236}">
-                <a16:creationId xmlns:a16="http://schemas.microsoft.com/office/drawing/2014/main" xmlns="" id="{069A9930-1B94-49BC-B4A6-B597F155D2DD}"/>
+                <a16:creationId xmlns:a16="http://schemas.microsoft.com/office/drawing/2014/main" id="{069A9930-1B94-49BC-B4A6-B597F155D2DD}"/>
               </a:ext>
             </a:extLst>
           </p:cNvPr>
@@ -3916,7 +3925,7 @@
           <p:cNvPr id="5" name="Footer Placeholder 4">
             <a:extLst>
               <a:ext uri="{FF2B5EF4-FFF2-40B4-BE49-F238E27FC236}">
-                <a16:creationId xmlns:a16="http://schemas.microsoft.com/office/drawing/2014/main" xmlns="" id="{7C7AC535-CCE6-472A-BA3D-DDE92DFF0EDA}"/>
+                <a16:creationId xmlns:a16="http://schemas.microsoft.com/office/drawing/2014/main" id="{7C7AC535-CCE6-472A-BA3D-DDE92DFF0EDA}"/>
               </a:ext>
             </a:extLst>
           </p:cNvPr>
@@ -3944,7 +3953,7 @@
           <p:cNvPr id="6" name="Slide Number Placeholder 5">
             <a:extLst>
               <a:ext uri="{FF2B5EF4-FFF2-40B4-BE49-F238E27FC236}">
-                <a16:creationId xmlns:a16="http://schemas.microsoft.com/office/drawing/2014/main" xmlns="" id="{6A32F890-EB29-4A5B-A499-BB0FC04447A7}"/>
+                <a16:creationId xmlns:a16="http://schemas.microsoft.com/office/drawing/2014/main" id="{6A32F890-EB29-4A5B-A499-BB0FC04447A7}"/>
               </a:ext>
             </a:extLst>
           </p:cNvPr>
@@ -3972,7 +3981,7 @@
     </p:spTree>
     <p:extLst>
       <p:ext uri="{BB962C8B-B14F-4D97-AF65-F5344CB8AC3E}">
-        <p14:creationId xmlns:p14="http://schemas.microsoft.com/office/powerpoint/2010/main" xmlns="" val="2488888923"/>
+        <p14:creationId xmlns:p14="http://schemas.microsoft.com/office/powerpoint/2010/main" val="2488888923"/>
       </p:ext>
     </p:extLst>
   </p:cSld>
@@ -4004,7 +4013,7 @@
           <p:cNvPr id="6" name="Picture Placeholder 5">
             <a:extLst>
               <a:ext uri="{FF2B5EF4-FFF2-40B4-BE49-F238E27FC236}">
-                <a16:creationId xmlns:a16="http://schemas.microsoft.com/office/drawing/2014/main" xmlns="" id="{3B63572F-04A5-456D-9066-1A65AFF5E685}"/>
+                <a16:creationId xmlns:a16="http://schemas.microsoft.com/office/drawing/2014/main" id="{3B63572F-04A5-456D-9066-1A65AFF5E685}"/>
               </a:ext>
             </a:extLst>
           </p:cNvPr>
@@ -4050,7 +4059,7 @@
           <p:cNvPr id="3" name="Slide Number Placeholder 2">
             <a:extLst>
               <a:ext uri="{FF2B5EF4-FFF2-40B4-BE49-F238E27FC236}">
-                <a16:creationId xmlns:a16="http://schemas.microsoft.com/office/drawing/2014/main" xmlns="" id="{719A41AC-399F-4B25-A28A-F7679843C36E}"/>
+                <a16:creationId xmlns:a16="http://schemas.microsoft.com/office/drawing/2014/main" id="{719A41AC-399F-4B25-A28A-F7679843C36E}"/>
               </a:ext>
             </a:extLst>
           </p:cNvPr>
@@ -4080,7 +4089,7 @@
           <p:cNvPr id="10" name="Caption">
             <a:extLst>
               <a:ext uri="{FF2B5EF4-FFF2-40B4-BE49-F238E27FC236}">
-                <a16:creationId xmlns:a16="http://schemas.microsoft.com/office/drawing/2014/main" xmlns="" id="{E1C65CF6-B529-468F-B46C-1D1C2E71A116}"/>
+                <a16:creationId xmlns:a16="http://schemas.microsoft.com/office/drawing/2014/main" id="{E1C65CF6-B529-468F-B46C-1D1C2E71A116}"/>
               </a:ext>
             </a:extLst>
           </p:cNvPr>
@@ -4142,7 +4151,7 @@
           <p:cNvPr id="2" name="Title 1">
             <a:extLst>
               <a:ext uri="{FF2B5EF4-FFF2-40B4-BE49-F238E27FC236}">
-                <a16:creationId xmlns:a16="http://schemas.microsoft.com/office/drawing/2014/main" xmlns="" id="{FC5845FB-DCB7-4844-B346-98986ADFCE02}"/>
+                <a16:creationId xmlns:a16="http://schemas.microsoft.com/office/drawing/2014/main" id="{FC5845FB-DCB7-4844-B346-98986ADFCE02}"/>
               </a:ext>
             </a:extLst>
           </p:cNvPr>
@@ -4168,7 +4177,7 @@
     </p:spTree>
     <p:extLst>
       <p:ext uri="{BB962C8B-B14F-4D97-AF65-F5344CB8AC3E}">
-        <p14:creationId xmlns:p14="http://schemas.microsoft.com/office/powerpoint/2010/main" xmlns="" val="4218807737"/>
+        <p14:creationId xmlns:p14="http://schemas.microsoft.com/office/powerpoint/2010/main" val="4218807737"/>
       </p:ext>
     </p:extLst>
   </p:cSld>
@@ -4200,7 +4209,7 @@
           <p:cNvPr id="3" name="Media Placeholder 2">
             <a:extLst>
               <a:ext uri="{FF2B5EF4-FFF2-40B4-BE49-F238E27FC236}">
-                <a16:creationId xmlns:a16="http://schemas.microsoft.com/office/drawing/2014/main" xmlns="" id="{FB784EBA-F0C5-4F6F-9426-185FBA239203}"/>
+                <a16:creationId xmlns:a16="http://schemas.microsoft.com/office/drawing/2014/main" id="{FB784EBA-F0C5-4F6F-9426-185FBA239203}"/>
               </a:ext>
             </a:extLst>
           </p:cNvPr>
@@ -4253,7 +4262,7 @@
           <p:cNvPr id="5" name="Caption">
             <a:extLst>
               <a:ext uri="{FF2B5EF4-FFF2-40B4-BE49-F238E27FC236}">
-                <a16:creationId xmlns:a16="http://schemas.microsoft.com/office/drawing/2014/main" xmlns="" id="{172090C5-61AC-430F-AA33-8EF3902C4669}"/>
+                <a16:creationId xmlns:a16="http://schemas.microsoft.com/office/drawing/2014/main" id="{172090C5-61AC-430F-AA33-8EF3902C4669}"/>
               </a:ext>
             </a:extLst>
           </p:cNvPr>
@@ -4315,7 +4324,7 @@
           <p:cNvPr id="4" name="Slide Number Placeholder 3">
             <a:extLst>
               <a:ext uri="{FF2B5EF4-FFF2-40B4-BE49-F238E27FC236}">
-                <a16:creationId xmlns:a16="http://schemas.microsoft.com/office/drawing/2014/main" xmlns="" id="{8377EBDA-221D-4CBD-8DBF-E03A370015DB}"/>
+                <a16:creationId xmlns:a16="http://schemas.microsoft.com/office/drawing/2014/main" id="{8377EBDA-221D-4CBD-8DBF-E03A370015DB}"/>
               </a:ext>
             </a:extLst>
           </p:cNvPr>
@@ -4345,7 +4354,7 @@
           <p:cNvPr id="2" name="Title 1">
             <a:extLst>
               <a:ext uri="{FF2B5EF4-FFF2-40B4-BE49-F238E27FC236}">
-                <a16:creationId xmlns:a16="http://schemas.microsoft.com/office/drawing/2014/main" xmlns="" id="{882508FC-366E-44DA-80A8-28048E1E4AEF}"/>
+                <a16:creationId xmlns:a16="http://schemas.microsoft.com/office/drawing/2014/main" id="{882508FC-366E-44DA-80A8-28048E1E4AEF}"/>
               </a:ext>
             </a:extLst>
           </p:cNvPr>
@@ -4371,7 +4380,7 @@
     </p:spTree>
     <p:extLst>
       <p:ext uri="{BB962C8B-B14F-4D97-AF65-F5344CB8AC3E}">
-        <p14:creationId xmlns:p14="http://schemas.microsoft.com/office/powerpoint/2010/main" xmlns="" val="2321580128"/>
+        <p14:creationId xmlns:p14="http://schemas.microsoft.com/office/powerpoint/2010/main" val="2321580128"/>
       </p:ext>
     </p:extLst>
   </p:cSld>
@@ -4403,7 +4412,7 @@
           <p:cNvPr id="26" name="Picture 25">
             <a:extLst>
               <a:ext uri="{FF2B5EF4-FFF2-40B4-BE49-F238E27FC236}">
-                <a16:creationId xmlns:a16="http://schemas.microsoft.com/office/drawing/2014/main" xmlns="" id="{111E4563-E2FC-4D6F-B759-AB4FB77D2704}"/>
+                <a16:creationId xmlns:a16="http://schemas.microsoft.com/office/drawing/2014/main" id="{111E4563-E2FC-4D6F-B759-AB4FB77D2704}"/>
               </a:ext>
             </a:extLst>
           </p:cNvPr>
@@ -4416,7 +4425,7 @@
           <a:blip r:embed="rId2" cstate="screen">
             <a:extLst>
               <a:ext uri="{28A0092B-C50C-407E-A947-70E740481C1C}">
-                <a14:useLocalDpi xmlns:a14="http://schemas.microsoft.com/office/drawing/2010/main" xmlns=""/>
+                <a14:useLocalDpi xmlns:a14="http://schemas.microsoft.com/office/drawing/2010/main"/>
               </a:ext>
             </a:extLst>
           </a:blip>
@@ -4438,7 +4447,7 @@
           <p:cNvPr id="24" name="Rectangle 23">
             <a:extLst>
               <a:ext uri="{FF2B5EF4-FFF2-40B4-BE49-F238E27FC236}">
-                <a16:creationId xmlns:a16="http://schemas.microsoft.com/office/drawing/2014/main" xmlns="" id="{92FE8913-A018-418C-99FB-2DF342B9B5A0}"/>
+                <a16:creationId xmlns:a16="http://schemas.microsoft.com/office/drawing/2014/main" id="{92FE8913-A018-418C-99FB-2DF342B9B5A0}"/>
               </a:ext>
             </a:extLst>
           </p:cNvPr>
@@ -4492,7 +4501,7 @@
           <p:cNvPr id="25" name="Picture Placeholder 9">
             <a:extLst>
               <a:ext uri="{FF2B5EF4-FFF2-40B4-BE49-F238E27FC236}">
-                <a16:creationId xmlns:a16="http://schemas.microsoft.com/office/drawing/2014/main" xmlns="" id="{AF7702AD-1968-4CE6-BC7C-02C0637069A8}"/>
+                <a16:creationId xmlns:a16="http://schemas.microsoft.com/office/drawing/2014/main" id="{AF7702AD-1968-4CE6-BC7C-02C0637069A8}"/>
               </a:ext>
             </a:extLst>
           </p:cNvPr>
@@ -4539,7 +4548,7 @@
           <p:cNvPr id="13" name="Title 1">
             <a:extLst>
               <a:ext uri="{FF2B5EF4-FFF2-40B4-BE49-F238E27FC236}">
-                <a16:creationId xmlns:a16="http://schemas.microsoft.com/office/drawing/2014/main" xmlns="" id="{C6A78464-8D00-4B94-90C7-90F1B54C8AA0}"/>
+                <a16:creationId xmlns:a16="http://schemas.microsoft.com/office/drawing/2014/main" id="{C6A78464-8D00-4B94-90C7-90F1B54C8AA0}"/>
               </a:ext>
             </a:extLst>
           </p:cNvPr>
@@ -4584,7 +4593,7 @@
           <p:cNvPr id="18" name="Graphic 15">
             <a:extLst>
               <a:ext uri="{FF2B5EF4-FFF2-40B4-BE49-F238E27FC236}">
-                <a16:creationId xmlns:a16="http://schemas.microsoft.com/office/drawing/2014/main" xmlns="" id="{F50292C9-54F6-4F7B-A885-34CE1E3B0351}"/>
+                <a16:creationId xmlns:a16="http://schemas.microsoft.com/office/drawing/2014/main" id="{F50292C9-54F6-4F7B-A885-34CE1E3B0351}"/>
               </a:ext>
             </a:extLst>
           </p:cNvPr>
@@ -4871,7 +4880,7 @@
           <p:cNvPr id="15" name="Name">
             <a:extLst>
               <a:ext uri="{FF2B5EF4-FFF2-40B4-BE49-F238E27FC236}">
-                <a16:creationId xmlns:a16="http://schemas.microsoft.com/office/drawing/2014/main" xmlns="" id="{B8C48821-0D90-416C-873E-50587E8A0C8E}"/>
+                <a16:creationId xmlns:a16="http://schemas.microsoft.com/office/drawing/2014/main" id="{B8C48821-0D90-416C-873E-50587E8A0C8E}"/>
               </a:ext>
             </a:extLst>
           </p:cNvPr>
@@ -4916,7 +4925,7 @@
           <p:cNvPr id="16" name="Email">
             <a:extLst>
               <a:ext uri="{FF2B5EF4-FFF2-40B4-BE49-F238E27FC236}">
-                <a16:creationId xmlns:a16="http://schemas.microsoft.com/office/drawing/2014/main" xmlns="" id="{42450180-8D19-405E-97F0-2A309B58D01C}"/>
+                <a16:creationId xmlns:a16="http://schemas.microsoft.com/office/drawing/2014/main" id="{42450180-8D19-405E-97F0-2A309B58D01C}"/>
               </a:ext>
             </a:extLst>
           </p:cNvPr>
@@ -4961,7 +4970,7 @@
           <p:cNvPr id="19" name="Rectangle 18">
             <a:extLst>
               <a:ext uri="{FF2B5EF4-FFF2-40B4-BE49-F238E27FC236}">
-                <a16:creationId xmlns:a16="http://schemas.microsoft.com/office/drawing/2014/main" xmlns="" id="{C837F23B-0C4D-4D27-BF83-0B10D1CFFDCD}"/>
+                <a16:creationId xmlns:a16="http://schemas.microsoft.com/office/drawing/2014/main" id="{C837F23B-0C4D-4D27-BF83-0B10D1CFFDCD}"/>
               </a:ext>
             </a:extLst>
           </p:cNvPr>
@@ -5015,7 +5024,7 @@
           <p:cNvPr id="21" name="Rectangle 20">
             <a:extLst>
               <a:ext uri="{FF2B5EF4-FFF2-40B4-BE49-F238E27FC236}">
-                <a16:creationId xmlns:a16="http://schemas.microsoft.com/office/drawing/2014/main" xmlns="" id="{D39551A1-FBAD-4CC8-AA99-F9F4D4281782}"/>
+                <a16:creationId xmlns:a16="http://schemas.microsoft.com/office/drawing/2014/main" id="{D39551A1-FBAD-4CC8-AA99-F9F4D4281782}"/>
               </a:ext>
             </a:extLst>
           </p:cNvPr>
@@ -5072,7 +5081,7 @@
           <p:cNvPr id="14" name="Slide Number Placeholder 5">
             <a:extLst>
               <a:ext uri="{FF2B5EF4-FFF2-40B4-BE49-F238E27FC236}">
-                <a16:creationId xmlns:a16="http://schemas.microsoft.com/office/drawing/2014/main" xmlns="" id="{5F695C6B-DBEE-447E-B106-7351E00BD0AF}"/>
+                <a16:creationId xmlns:a16="http://schemas.microsoft.com/office/drawing/2014/main" id="{5F695C6B-DBEE-447E-B106-7351E00BD0AF}"/>
               </a:ext>
             </a:extLst>
           </p:cNvPr>
@@ -5200,7 +5209,7 @@
           <p:cNvPr id="23" name="Rectangle 22">
             <a:extLst>
               <a:ext uri="{FF2B5EF4-FFF2-40B4-BE49-F238E27FC236}">
-                <a16:creationId xmlns:a16="http://schemas.microsoft.com/office/drawing/2014/main" xmlns="" id="{E1A38929-6316-4332-83F8-9E95386C7C42}"/>
+                <a16:creationId xmlns:a16="http://schemas.microsoft.com/office/drawing/2014/main" id="{E1A38929-6316-4332-83F8-9E95386C7C42}"/>
               </a:ext>
             </a:extLst>
           </p:cNvPr>
@@ -5269,7 +5278,7 @@
     </p:spTree>
     <p:extLst>
       <p:ext uri="{BB962C8B-B14F-4D97-AF65-F5344CB8AC3E}">
-        <p14:creationId xmlns:p14="http://schemas.microsoft.com/office/powerpoint/2010/main" xmlns="" val="3277472792"/>
+        <p14:creationId xmlns:p14="http://schemas.microsoft.com/office/powerpoint/2010/main" val="3277472792"/>
       </p:ext>
     </p:extLst>
   </p:cSld>
@@ -5301,7 +5310,7 @@
           <p:cNvPr id="2" name="Title 1">
             <a:extLst>
               <a:ext uri="{FF2B5EF4-FFF2-40B4-BE49-F238E27FC236}">
-                <a16:creationId xmlns:a16="http://schemas.microsoft.com/office/drawing/2014/main" xmlns="" id="{5C5921DB-2DD6-4869-9104-BE40FBBCCE31}"/>
+                <a16:creationId xmlns:a16="http://schemas.microsoft.com/office/drawing/2014/main" id="{5C5921DB-2DD6-4869-9104-BE40FBBCCE31}"/>
               </a:ext>
             </a:extLst>
           </p:cNvPr>
@@ -5329,7 +5338,7 @@
           <p:cNvPr id="10" name="Subtitle">
             <a:extLst>
               <a:ext uri="{FF2B5EF4-FFF2-40B4-BE49-F238E27FC236}">
-                <a16:creationId xmlns:a16="http://schemas.microsoft.com/office/drawing/2014/main" xmlns="" id="{1CC9B96F-1A0A-4B16-BDF7-48B289CD533E}"/>
+                <a16:creationId xmlns:a16="http://schemas.microsoft.com/office/drawing/2014/main" id="{1CC9B96F-1A0A-4B16-BDF7-48B289CD533E}"/>
               </a:ext>
             </a:extLst>
           </p:cNvPr>
@@ -5368,7 +5377,7 @@
           <p:cNvPr id="3" name="Content Placeholder 2">
             <a:extLst>
               <a:ext uri="{FF2B5EF4-FFF2-40B4-BE49-F238E27FC236}">
-                <a16:creationId xmlns:a16="http://schemas.microsoft.com/office/drawing/2014/main" xmlns="" id="{D69A7081-42C5-4F4E-8A26-E7788CCF4FE5}"/>
+                <a16:creationId xmlns:a16="http://schemas.microsoft.com/office/drawing/2014/main" id="{D69A7081-42C5-4F4E-8A26-E7788CCF4FE5}"/>
               </a:ext>
             </a:extLst>
           </p:cNvPr>
@@ -5430,7 +5439,7 @@
           <p:cNvPr id="4" name="Footer Placeholder 3">
             <a:extLst>
               <a:ext uri="{FF2B5EF4-FFF2-40B4-BE49-F238E27FC236}">
-                <a16:creationId xmlns:a16="http://schemas.microsoft.com/office/drawing/2014/main" xmlns="" id="{9038FCAA-94B1-47BD-AD46-123D3404BBB2}"/>
+                <a16:creationId xmlns:a16="http://schemas.microsoft.com/office/drawing/2014/main" id="{9038FCAA-94B1-47BD-AD46-123D3404BBB2}"/>
               </a:ext>
             </a:extLst>
           </p:cNvPr>
@@ -5458,7 +5467,7 @@
           <p:cNvPr id="5" name="Slide Number Placeholder 4">
             <a:extLst>
               <a:ext uri="{FF2B5EF4-FFF2-40B4-BE49-F238E27FC236}">
-                <a16:creationId xmlns:a16="http://schemas.microsoft.com/office/drawing/2014/main" xmlns="" id="{81A11CEA-C130-40E5-A858-8D4FE6E58641}"/>
+                <a16:creationId xmlns:a16="http://schemas.microsoft.com/office/drawing/2014/main" id="{81A11CEA-C130-40E5-A858-8D4FE6E58641}"/>
               </a:ext>
             </a:extLst>
           </p:cNvPr>
@@ -5486,7 +5495,7 @@
     </p:spTree>
     <p:extLst>
       <p:ext uri="{BB962C8B-B14F-4D97-AF65-F5344CB8AC3E}">
-        <p14:creationId xmlns:p14="http://schemas.microsoft.com/office/powerpoint/2010/main" xmlns="" val="2708772212"/>
+        <p14:creationId xmlns:p14="http://schemas.microsoft.com/office/powerpoint/2010/main" val="2708772212"/>
       </p:ext>
     </p:extLst>
   </p:cSld>
@@ -5523,7 +5532,7 @@
           <p:cNvPr id="8" name="Rectangle 7">
             <a:extLst>
               <a:ext uri="{FF2B5EF4-FFF2-40B4-BE49-F238E27FC236}">
-                <a16:creationId xmlns:a16="http://schemas.microsoft.com/office/drawing/2014/main" xmlns="" id="{BE99CE02-8616-40B2-85FF-B06E192752AB}"/>
+                <a16:creationId xmlns:a16="http://schemas.microsoft.com/office/drawing/2014/main" id="{BE99CE02-8616-40B2-85FF-B06E192752AB}"/>
               </a:ext>
             </a:extLst>
           </p:cNvPr>
@@ -5577,7 +5586,7 @@
           <p:cNvPr id="9" name="Rectangle 8">
             <a:extLst>
               <a:ext uri="{FF2B5EF4-FFF2-40B4-BE49-F238E27FC236}">
-                <a16:creationId xmlns:a16="http://schemas.microsoft.com/office/drawing/2014/main" xmlns="" id="{FE3DF8E0-6324-45B7-8B0A-24383EF1B915}"/>
+                <a16:creationId xmlns:a16="http://schemas.microsoft.com/office/drawing/2014/main" id="{FE3DF8E0-6324-45B7-8B0A-24383EF1B915}"/>
               </a:ext>
             </a:extLst>
           </p:cNvPr>
@@ -5637,7 +5646,7 @@
           <p:cNvPr id="11" name="Rectangle 10">
             <a:extLst>
               <a:ext uri="{FF2B5EF4-FFF2-40B4-BE49-F238E27FC236}">
-                <a16:creationId xmlns:a16="http://schemas.microsoft.com/office/drawing/2014/main" xmlns="" id="{1A9E718F-2F10-41F1-8E9F-18DD53EF065F}"/>
+                <a16:creationId xmlns:a16="http://schemas.microsoft.com/office/drawing/2014/main" id="{1A9E718F-2F10-41F1-8E9F-18DD53EF065F}"/>
               </a:ext>
             </a:extLst>
           </p:cNvPr>
@@ -5708,7 +5717,7 @@
           <p:cNvPr id="2" name="Title Placeholder 1">
             <a:extLst>
               <a:ext uri="{FF2B5EF4-FFF2-40B4-BE49-F238E27FC236}">
-                <a16:creationId xmlns:a16="http://schemas.microsoft.com/office/drawing/2014/main" xmlns="" id="{331581A5-A75E-41FB-A68A-70BA1AB54B28}"/>
+                <a16:creationId xmlns:a16="http://schemas.microsoft.com/office/drawing/2014/main" id="{331581A5-A75E-41FB-A68A-70BA1AB54B28}"/>
               </a:ext>
             </a:extLst>
           </p:cNvPr>
@@ -5747,7 +5756,7 @@
           <p:cNvPr id="3" name="Text Placeholder 2">
             <a:extLst>
               <a:ext uri="{FF2B5EF4-FFF2-40B4-BE49-F238E27FC236}">
-                <a16:creationId xmlns:a16="http://schemas.microsoft.com/office/drawing/2014/main" xmlns="" id="{06BA9B02-6E3D-4037-BE18-E02B786633E9}"/>
+                <a16:creationId xmlns:a16="http://schemas.microsoft.com/office/drawing/2014/main" id="{06BA9B02-6E3D-4037-BE18-E02B786633E9}"/>
               </a:ext>
             </a:extLst>
           </p:cNvPr>
@@ -5815,7 +5824,7 @@
           <p:cNvPr id="5" name="Footer Placeholder 4">
             <a:extLst>
               <a:ext uri="{FF2B5EF4-FFF2-40B4-BE49-F238E27FC236}">
-                <a16:creationId xmlns:a16="http://schemas.microsoft.com/office/drawing/2014/main" xmlns="" id="{BA954C2B-6B0B-4286-BFA4-F6131386B0E3}"/>
+                <a16:creationId xmlns:a16="http://schemas.microsoft.com/office/drawing/2014/main" id="{BA954C2B-6B0B-4286-BFA4-F6131386B0E3}"/>
               </a:ext>
             </a:extLst>
           </p:cNvPr>
@@ -5879,7 +5888,7 @@
           <p:cNvPr id="6" name="Slide Number Placeholder 5">
             <a:extLst>
               <a:ext uri="{FF2B5EF4-FFF2-40B4-BE49-F238E27FC236}">
-                <a16:creationId xmlns:a16="http://schemas.microsoft.com/office/drawing/2014/main" xmlns="" id="{D245D258-5720-4517-B8DE-EB5AA5C4FAE1}"/>
+                <a16:creationId xmlns:a16="http://schemas.microsoft.com/office/drawing/2014/main" id="{D245D258-5720-4517-B8DE-EB5AA5C4FAE1}"/>
               </a:ext>
             </a:extLst>
           </p:cNvPr>
@@ -5946,7 +5955,7 @@
     </p:spTree>
     <p:extLst>
       <p:ext uri="{BB962C8B-B14F-4D97-AF65-F5344CB8AC3E}">
-        <p14:creationId xmlns:p14="http://schemas.microsoft.com/office/powerpoint/2010/main" xmlns="" val="3117711249"/>
+        <p14:creationId xmlns:p14="http://schemas.microsoft.com/office/powerpoint/2010/main" val="3117711249"/>
       </p:ext>
     </p:extLst>
   </p:cSld>
@@ -6290,7 +6299,7 @@
           <p:cNvPr id="4" name="Title 3">
             <a:extLst>
               <a:ext uri="{FF2B5EF4-FFF2-40B4-BE49-F238E27FC236}">
-                <a16:creationId xmlns:a16="http://schemas.microsoft.com/office/drawing/2014/main" xmlns="" id="{D65A836F-346F-4099-BC7B-0D8F3B27F395}"/>
+                <a16:creationId xmlns:a16="http://schemas.microsoft.com/office/drawing/2014/main" id="{D65A836F-346F-4099-BC7B-0D8F3B27F395}"/>
               </a:ext>
             </a:extLst>
           </p:cNvPr>
@@ -6318,7 +6327,7 @@
           <p:cNvPr id="5" name="Subtitle 4">
             <a:extLst>
               <a:ext uri="{FF2B5EF4-FFF2-40B4-BE49-F238E27FC236}">
-                <a16:creationId xmlns:a16="http://schemas.microsoft.com/office/drawing/2014/main" xmlns="" id="{1FF39718-6251-4A5A-AAC7-767229317836}"/>
+                <a16:creationId xmlns:a16="http://schemas.microsoft.com/office/drawing/2014/main" id="{1FF39718-6251-4A5A-AAC7-767229317836}"/>
               </a:ext>
             </a:extLst>
           </p:cNvPr>
@@ -6370,10 +6379,10 @@
           <p:cNvPr id="6" name="Group 5">
             <a:extLst>
               <a:ext uri="{FF2B5EF4-FFF2-40B4-BE49-F238E27FC236}">
-                <a16:creationId xmlns:a16="http://schemas.microsoft.com/office/drawing/2014/main" xmlns="" id="{25C384BA-0032-4FE7-AC29-2F9F931970D5}"/>
+                <a16:creationId xmlns:a16="http://schemas.microsoft.com/office/drawing/2014/main" id="{25C384BA-0032-4FE7-AC29-2F9F931970D5}"/>
               </a:ext>
               <a:ext uri="{C183D7F6-B498-43B3-948B-1728B52AA6E4}">
-                <adec:decorative xmlns:adec="http://schemas.microsoft.com/office/drawing/2017/decorative" xmlns="" val="1"/>
+                <adec:decorative xmlns:adec="http://schemas.microsoft.com/office/drawing/2017/decorative" val="1"/>
               </a:ext>
             </a:extLst>
           </p:cNvPr>
@@ -6398,7 +6407,7 @@
             <p:cNvPr id="7" name="Freeform: Shape 6">
               <a:extLst>
                 <a:ext uri="{FF2B5EF4-FFF2-40B4-BE49-F238E27FC236}">
-                  <a16:creationId xmlns:a16="http://schemas.microsoft.com/office/drawing/2014/main" xmlns="" id="{D5C429C1-62E8-4B3E-A0C7-6003B138652C}"/>
+                  <a16:creationId xmlns:a16="http://schemas.microsoft.com/office/drawing/2014/main" id="{D5C429C1-62E8-4B3E-A0C7-6003B138652C}"/>
                 </a:ext>
               </a:extLst>
             </p:cNvPr>
@@ -6580,7 +6589,7 @@
             <p:cNvPr id="9" name="Freeform: Shape 8">
               <a:extLst>
                 <a:ext uri="{FF2B5EF4-FFF2-40B4-BE49-F238E27FC236}">
-                  <a16:creationId xmlns:a16="http://schemas.microsoft.com/office/drawing/2014/main" xmlns="" id="{A4E105F6-D01D-4A16-9172-E05D1F34B154}"/>
+                  <a16:creationId xmlns:a16="http://schemas.microsoft.com/office/drawing/2014/main" id="{A4E105F6-D01D-4A16-9172-E05D1F34B154}"/>
                 </a:ext>
               </a:extLst>
             </p:cNvPr>
@@ -6723,7 +6732,7 @@
             <p:cNvPr id="10" name="Freeform: Shape 9">
               <a:extLst>
                 <a:ext uri="{FF2B5EF4-FFF2-40B4-BE49-F238E27FC236}">
-                  <a16:creationId xmlns:a16="http://schemas.microsoft.com/office/drawing/2014/main" xmlns="" id="{351DF594-8FA0-4AC6-B165-BBF1184B2997}"/>
+                  <a16:creationId xmlns:a16="http://schemas.microsoft.com/office/drawing/2014/main" id="{351DF594-8FA0-4AC6-B165-BBF1184B2997}"/>
                 </a:ext>
               </a:extLst>
             </p:cNvPr>
@@ -6866,7 +6875,7 @@
             <p:cNvPr id="11" name="Freeform: Shape 10">
               <a:extLst>
                 <a:ext uri="{FF2B5EF4-FFF2-40B4-BE49-F238E27FC236}">
-                  <a16:creationId xmlns:a16="http://schemas.microsoft.com/office/drawing/2014/main" xmlns="" id="{5818DD9E-AD36-4BB3-9A58-F259F54EE1EB}"/>
+                  <a16:creationId xmlns:a16="http://schemas.microsoft.com/office/drawing/2014/main" id="{5818DD9E-AD36-4BB3-9A58-F259F54EE1EB}"/>
                 </a:ext>
               </a:extLst>
             </p:cNvPr>
@@ -6990,7 +6999,7 @@
             <p:cNvPr id="12" name="Freeform: Shape 11">
               <a:extLst>
                 <a:ext uri="{FF2B5EF4-FFF2-40B4-BE49-F238E27FC236}">
-                  <a16:creationId xmlns:a16="http://schemas.microsoft.com/office/drawing/2014/main" xmlns="" id="{F5CBD23E-8804-44C0-AB72-94DBDD7B129F}"/>
+                  <a16:creationId xmlns:a16="http://schemas.microsoft.com/office/drawing/2014/main" id="{F5CBD23E-8804-44C0-AB72-94DBDD7B129F}"/>
                 </a:ext>
               </a:extLst>
             </p:cNvPr>
@@ -7133,7 +7142,7 @@
             <p:cNvPr id="13" name="Freeform: Shape 12">
               <a:extLst>
                 <a:ext uri="{FF2B5EF4-FFF2-40B4-BE49-F238E27FC236}">
-                  <a16:creationId xmlns:a16="http://schemas.microsoft.com/office/drawing/2014/main" xmlns="" id="{706AAF1B-AA49-4254-BF37-5EB5EDF12E66}"/>
+                  <a16:creationId xmlns:a16="http://schemas.microsoft.com/office/drawing/2014/main" id="{706AAF1B-AA49-4254-BF37-5EB5EDF12E66}"/>
                 </a:ext>
               </a:extLst>
             </p:cNvPr>
@@ -7257,7 +7266,7 @@
             <p:cNvPr id="14" name="Freeform: Shape 13">
               <a:extLst>
                 <a:ext uri="{FF2B5EF4-FFF2-40B4-BE49-F238E27FC236}">
-                  <a16:creationId xmlns:a16="http://schemas.microsoft.com/office/drawing/2014/main" xmlns="" id="{24E9E9DD-9221-402A-971F-66BD33A0EB10}"/>
+                  <a16:creationId xmlns:a16="http://schemas.microsoft.com/office/drawing/2014/main" id="{24E9E9DD-9221-402A-971F-66BD33A0EB10}"/>
                 </a:ext>
               </a:extLst>
             </p:cNvPr>
@@ -7372,7 +7381,7 @@
           <p:cNvPr id="2" name="Graphic 14" descr="dinosaur outline">
             <a:extLst>
               <a:ext uri="{FF2B5EF4-FFF2-40B4-BE49-F238E27FC236}">
-                <a16:creationId xmlns:a16="http://schemas.microsoft.com/office/drawing/2014/main" xmlns="" id="{5D5220C7-9B33-41C8-B3CF-8E1B542EF301}"/>
+                <a16:creationId xmlns:a16="http://schemas.microsoft.com/office/drawing/2014/main" id="{5D5220C7-9B33-41C8-B3CF-8E1B542EF301}"/>
               </a:ext>
             </a:extLst>
           </p:cNvPr>
@@ -8228,10 +8237,10 @@
           <p:cNvPr id="16" name="Straight Connector 15">
             <a:extLst>
               <a:ext uri="{FF2B5EF4-FFF2-40B4-BE49-F238E27FC236}">
-                <a16:creationId xmlns:a16="http://schemas.microsoft.com/office/drawing/2014/main" xmlns="" id="{B029E30A-660C-4C6A-8C17-E7A3B2E1C4BD}"/>
+                <a16:creationId xmlns:a16="http://schemas.microsoft.com/office/drawing/2014/main" id="{B029E30A-660C-4C6A-8C17-E7A3B2E1C4BD}"/>
               </a:ext>
               <a:ext uri="{C183D7F6-B498-43B3-948B-1728B52AA6E4}">
-                <adec:decorative xmlns:adec="http://schemas.microsoft.com/office/drawing/2017/decorative" xmlns="" val="1"/>
+                <adec:decorative xmlns:adec="http://schemas.microsoft.com/office/drawing/2017/decorative" val="1"/>
               </a:ext>
             </a:extLst>
           </p:cNvPr>
@@ -8272,7 +8281,7 @@
           <p:cNvPr id="18" name="Picture Placeholder 17" descr="books on a shelf with pages showing out">
             <a:extLst>
               <a:ext uri="{FF2B5EF4-FFF2-40B4-BE49-F238E27FC236}">
-                <a16:creationId xmlns:a16="http://schemas.microsoft.com/office/drawing/2014/main" xmlns="" id="{E183FABE-66AB-4434-B5CC-BC7BD9DB75B1}"/>
+                <a16:creationId xmlns:a16="http://schemas.microsoft.com/office/drawing/2014/main" id="{E183FABE-66AB-4434-B5CC-BC7BD9DB75B1}"/>
               </a:ext>
             </a:extLst>
           </p:cNvPr>
@@ -8287,7 +8296,7 @@
           <a:blip r:embed="rId2" cstate="screen">
             <a:extLst>
               <a:ext uri="{28A0092B-C50C-407E-A947-70E740481C1C}">
-                <a14:useLocalDpi xmlns:a14="http://schemas.microsoft.com/office/drawing/2010/main" xmlns=""/>
+                <a14:useLocalDpi xmlns:a14="http://schemas.microsoft.com/office/drawing/2010/main"/>
               </a:ext>
             </a:extLst>
           </a:blip>
@@ -8308,7 +8317,7 @@
           <p:cNvPr id="3" name="Slide Number Placeholder 2">
             <a:extLst>
               <a:ext uri="{FF2B5EF4-FFF2-40B4-BE49-F238E27FC236}">
-                <a16:creationId xmlns:a16="http://schemas.microsoft.com/office/drawing/2014/main" xmlns="" id="{FA5F0145-EFD7-49DA-AD14-17BB0BE45561}"/>
+                <a16:creationId xmlns:a16="http://schemas.microsoft.com/office/drawing/2014/main" id="{FA5F0145-EFD7-49DA-AD14-17BB0BE45561}"/>
               </a:ext>
             </a:extLst>
           </p:cNvPr>
@@ -8338,7 +8347,7 @@
           <p:cNvPr id="19" name="Slide Number Placeholder 7">
             <a:extLst>
               <a:ext uri="{FF2B5EF4-FFF2-40B4-BE49-F238E27FC236}">
-                <a16:creationId xmlns:a16="http://schemas.microsoft.com/office/drawing/2014/main" xmlns="" id="{31037E8F-4462-4E6A-8213-3A1F9B3FEEC5}"/>
+                <a16:creationId xmlns:a16="http://schemas.microsoft.com/office/drawing/2014/main" id="{31037E8F-4462-4E6A-8213-3A1F9B3FEEC5}"/>
               </a:ext>
             </a:extLst>
           </p:cNvPr>
@@ -8490,7 +8499,7 @@
     </p:spTree>
     <p:extLst>
       <p:ext uri="{BB962C8B-B14F-4D97-AF65-F5344CB8AC3E}">
-        <p14:creationId xmlns:p14="http://schemas.microsoft.com/office/powerpoint/2010/main" xmlns="" val="2013043270"/>
+        <p14:creationId xmlns:p14="http://schemas.microsoft.com/office/powerpoint/2010/main" val="2013043270"/>
       </p:ext>
     </p:extLst>
   </p:cSld>
@@ -8708,11 +8717,11 @@
           <a:p>
             <a:pPr algn="ctr"/>
             <a:r>
-              <a:rPr lang="en-US" dirty="0" smtClean="0"/>
+              <a:rPr lang="en-US" dirty="0"/>
               <a:t>ROW_NUMBER()  </a:t>
             </a:r>
             <a:r>
-              <a:rPr lang="en-US" dirty="0" err="1" smtClean="0"/>
+              <a:rPr lang="en-US" dirty="0" err="1"/>
               <a:t>total_rows</a:t>
             </a:r>
             <a:endParaRPr lang="en-US" dirty="0"/>
@@ -8777,7 +8786,7 @@
           <a:lstStyle/>
           <a:p>
             <a:r>
-              <a:rPr lang="en-US" dirty="0" smtClean="0"/>
+              <a:rPr lang="en-US" dirty="0"/>
               <a:t>CUME_DIST()</a:t>
             </a:r>
           </a:p>
@@ -8786,6 +8795,160 @@
             <a:r>
               <a:rPr lang="en-US" b="1" dirty="0"/>
               <a:t>=</a:t>
+            </a:r>
+          </a:p>
+        </p:txBody>
+      </p:sp>
+      <p:sp>
+        <p:nvSpPr>
+          <p:cNvPr id="9" name="Slide Number Placeholder 7">
+            <a:extLst>
+              <a:ext uri="{FF2B5EF4-FFF2-40B4-BE49-F238E27FC236}">
+                <a16:creationId xmlns:a16="http://schemas.microsoft.com/office/drawing/2014/main" id="{76C4D3FB-2911-4CE1-A22D-4A5384C09E4A}"/>
+              </a:ext>
+            </a:extLst>
+          </p:cNvPr>
+          <p:cNvSpPr txBox="1">
+            <a:spLocks/>
+          </p:cNvSpPr>
+          <p:nvPr/>
+        </p:nvSpPr>
+        <p:spPr>
+          <a:xfrm>
+            <a:off x="7806812" y="6689019"/>
+            <a:ext cx="3785419" cy="155729"/>
+          </a:xfrm>
+          <a:prstGeom prst="rect">
+            <a:avLst/>
+          </a:prstGeom>
+          <a:gradFill>
+            <a:gsLst>
+              <a:gs pos="87598">
+                <a:schemeClr val="accent5">
+                  <a:lumMod val="75000"/>
+                </a:schemeClr>
+              </a:gs>
+              <a:gs pos="0">
+                <a:schemeClr val="accent4">
+                  <a:lumMod val="60000"/>
+                  <a:lumOff val="40000"/>
+                </a:schemeClr>
+              </a:gs>
+              <a:gs pos="47000">
+                <a:schemeClr val="accent2">
+                  <a:lumMod val="75000"/>
+                  <a:shade val="67500"/>
+                  <a:satMod val="115000"/>
+                </a:schemeClr>
+              </a:gs>
+              <a:gs pos="100000">
+                <a:schemeClr val="accent1"/>
+              </a:gs>
+            </a:gsLst>
+            <a:lin ang="10800000" scaled="0"/>
+          </a:gradFill>
+        </p:spPr>
+        <p:txBody>
+          <a:bodyPr vert="horz" lIns="0" tIns="0" rIns="72000" bIns="0" rtlCol="0" anchor="ctr"/>
+          <a:lstStyle>
+            <a:defPPr>
+              <a:defRPr lang="en-US"/>
+            </a:defPPr>
+            <a:lvl1pPr marL="0" algn="r" defTabSz="914400" rtl="0" eaLnBrk="1" latinLnBrk="0" hangingPunct="1">
+              <a:defRPr sz="1200" kern="1200">
+                <a:solidFill>
+                  <a:schemeClr val="bg1"/>
+                </a:solidFill>
+                <a:latin typeface="+mj-lt"/>
+                <a:ea typeface="+mn-ea"/>
+                <a:cs typeface="+mn-cs"/>
+              </a:defRPr>
+            </a:lvl1pPr>
+            <a:lvl2pPr marL="457200" algn="l" defTabSz="914400" rtl="0" eaLnBrk="1" latinLnBrk="0" hangingPunct="1">
+              <a:defRPr sz="1800" kern="1200">
+                <a:solidFill>
+                  <a:schemeClr val="tx1"/>
+                </a:solidFill>
+                <a:latin typeface="+mn-lt"/>
+                <a:ea typeface="+mn-ea"/>
+                <a:cs typeface="+mn-cs"/>
+              </a:defRPr>
+            </a:lvl2pPr>
+            <a:lvl3pPr marL="914400" algn="l" defTabSz="914400" rtl="0" eaLnBrk="1" latinLnBrk="0" hangingPunct="1">
+              <a:defRPr sz="1800" kern="1200">
+                <a:solidFill>
+                  <a:schemeClr val="tx1"/>
+                </a:solidFill>
+                <a:latin typeface="+mn-lt"/>
+                <a:ea typeface="+mn-ea"/>
+                <a:cs typeface="+mn-cs"/>
+              </a:defRPr>
+            </a:lvl3pPr>
+            <a:lvl4pPr marL="1371600" algn="l" defTabSz="914400" rtl="0" eaLnBrk="1" latinLnBrk="0" hangingPunct="1">
+              <a:defRPr sz="1800" kern="1200">
+                <a:solidFill>
+                  <a:schemeClr val="tx1"/>
+                </a:solidFill>
+                <a:latin typeface="+mn-lt"/>
+                <a:ea typeface="+mn-ea"/>
+                <a:cs typeface="+mn-cs"/>
+              </a:defRPr>
+            </a:lvl4pPr>
+            <a:lvl5pPr marL="1828800" algn="l" defTabSz="914400" rtl="0" eaLnBrk="1" latinLnBrk="0" hangingPunct="1">
+              <a:defRPr sz="1800" kern="1200">
+                <a:solidFill>
+                  <a:schemeClr val="tx1"/>
+                </a:solidFill>
+                <a:latin typeface="+mn-lt"/>
+                <a:ea typeface="+mn-ea"/>
+                <a:cs typeface="+mn-cs"/>
+              </a:defRPr>
+            </a:lvl5pPr>
+            <a:lvl6pPr marL="2286000" algn="l" defTabSz="914400" rtl="0" eaLnBrk="1" latinLnBrk="0" hangingPunct="1">
+              <a:defRPr sz="1800" kern="1200">
+                <a:solidFill>
+                  <a:schemeClr val="tx1"/>
+                </a:solidFill>
+                <a:latin typeface="+mn-lt"/>
+                <a:ea typeface="+mn-ea"/>
+                <a:cs typeface="+mn-cs"/>
+              </a:defRPr>
+            </a:lvl6pPr>
+            <a:lvl7pPr marL="2743200" algn="l" defTabSz="914400" rtl="0" eaLnBrk="1" latinLnBrk="0" hangingPunct="1">
+              <a:defRPr sz="1800" kern="1200">
+                <a:solidFill>
+                  <a:schemeClr val="tx1"/>
+                </a:solidFill>
+                <a:latin typeface="+mn-lt"/>
+                <a:ea typeface="+mn-ea"/>
+                <a:cs typeface="+mn-cs"/>
+              </a:defRPr>
+            </a:lvl7pPr>
+            <a:lvl8pPr marL="3200400" algn="l" defTabSz="914400" rtl="0" eaLnBrk="1" latinLnBrk="0" hangingPunct="1">
+              <a:defRPr sz="1800" kern="1200">
+                <a:solidFill>
+                  <a:schemeClr val="tx1"/>
+                </a:solidFill>
+                <a:latin typeface="+mn-lt"/>
+                <a:ea typeface="+mn-ea"/>
+                <a:cs typeface="+mn-cs"/>
+              </a:defRPr>
+            </a:lvl8pPr>
+            <a:lvl9pPr marL="3657600" algn="l" defTabSz="914400" rtl="0" eaLnBrk="1" latinLnBrk="0" hangingPunct="1">
+              <a:defRPr sz="1800" kern="1200">
+                <a:solidFill>
+                  <a:schemeClr val="tx1"/>
+                </a:solidFill>
+                <a:latin typeface="+mn-lt"/>
+                <a:ea typeface="+mn-ea"/>
+                <a:cs typeface="+mn-cs"/>
+              </a:defRPr>
+            </a:lvl9pPr>
+          </a:lstStyle>
+          <a:p>
+            <a:r>
+              <a:rPr lang="en-US" dirty="0"/>
+              <a:t>PES Data Science Presentation</a:t>
             </a:r>
           </a:p>
         </p:txBody>
@@ -8795,13 +8958,6 @@
   <p:clrMapOvr>
     <a:masterClrMapping/>
   </p:clrMapOvr>
-  <p:timing>
-    <p:tnLst>
-      <p:par>
-        <p:cTn id="1" dur="indefinite" restart="never" nodeType="tmRoot"/>
-      </p:par>
-    </p:tnLst>
-  </p:timing>
 </p:sld>
 </file>
 
@@ -8845,7 +9001,7 @@
           <a:lstStyle/>
           <a:p>
             <a:r>
-              <a:rPr lang="en-IN" dirty="0" smtClean="0">
+              <a:rPr lang="en-IN" dirty="0">
                 <a:solidFill>
                   <a:schemeClr val="tx1"/>
                 </a:solidFill>
@@ -8888,18 +9044,13 @@
           <a:lstStyle/>
           <a:p>
             <a:r>
-              <a:rPr lang="en-US" dirty="0" smtClean="0">
+              <a:rPr lang="en-US" dirty="0">
                 <a:solidFill>
                   <a:schemeClr val="tx1"/>
                 </a:solidFill>
               </a:rPr>
               <a:t>To find the patient distribution over doctors</a:t>
             </a:r>
-            <a:endParaRPr lang="en-US" dirty="0">
-              <a:solidFill>
-                <a:schemeClr val="tx1"/>
-              </a:solidFill>
-            </a:endParaRPr>
           </a:p>
         </p:txBody>
       </p:sp>
@@ -8934,18 +9085,13 @@
           <a:lstStyle/>
           <a:p>
             <a:r>
-              <a:rPr lang="en-US" dirty="0" smtClean="0">
+              <a:rPr lang="en-US" dirty="0">
                 <a:solidFill>
                   <a:schemeClr val="tx1"/>
                 </a:solidFill>
               </a:rPr>
               <a:t>Get the cumulative distribution of gender of patients visiting a particular doctor</a:t>
             </a:r>
-            <a:endParaRPr lang="en-US" dirty="0">
-              <a:solidFill>
-                <a:schemeClr val="tx1"/>
-              </a:solidFill>
-            </a:endParaRPr>
           </a:p>
         </p:txBody>
       </p:sp>
@@ -9123,18 +9269,165 @@
           </a:fontRef>
         </p:style>
       </p:pic>
+      <p:sp>
+        <p:nvSpPr>
+          <p:cNvPr id="10" name="Slide Number Placeholder 7">
+            <a:extLst>
+              <a:ext uri="{FF2B5EF4-FFF2-40B4-BE49-F238E27FC236}">
+                <a16:creationId xmlns:a16="http://schemas.microsoft.com/office/drawing/2014/main" id="{6BE37A31-84BE-44D8-8D99-F04D3EDCEDE9}"/>
+              </a:ext>
+            </a:extLst>
+          </p:cNvPr>
+          <p:cNvSpPr txBox="1">
+            <a:spLocks/>
+          </p:cNvSpPr>
+          <p:nvPr/>
+        </p:nvSpPr>
+        <p:spPr>
+          <a:xfrm>
+            <a:off x="7806812" y="6689019"/>
+            <a:ext cx="3785419" cy="155729"/>
+          </a:xfrm>
+          <a:prstGeom prst="rect">
+            <a:avLst/>
+          </a:prstGeom>
+          <a:gradFill>
+            <a:gsLst>
+              <a:gs pos="87598">
+                <a:schemeClr val="accent5">
+                  <a:lumMod val="75000"/>
+                </a:schemeClr>
+              </a:gs>
+              <a:gs pos="0">
+                <a:schemeClr val="accent4">
+                  <a:lumMod val="60000"/>
+                  <a:lumOff val="40000"/>
+                </a:schemeClr>
+              </a:gs>
+              <a:gs pos="47000">
+                <a:schemeClr val="accent2">
+                  <a:lumMod val="75000"/>
+                  <a:shade val="67500"/>
+                  <a:satMod val="115000"/>
+                </a:schemeClr>
+              </a:gs>
+              <a:gs pos="100000">
+                <a:schemeClr val="accent1"/>
+              </a:gs>
+            </a:gsLst>
+            <a:lin ang="10800000" scaled="0"/>
+          </a:gradFill>
+        </p:spPr>
+        <p:txBody>
+          <a:bodyPr vert="horz" lIns="0" tIns="0" rIns="72000" bIns="0" rtlCol="0" anchor="ctr"/>
+          <a:lstStyle>
+            <a:defPPr>
+              <a:defRPr lang="en-US"/>
+            </a:defPPr>
+            <a:lvl1pPr marL="0" algn="r" defTabSz="914400" rtl="0" eaLnBrk="1" latinLnBrk="0" hangingPunct="1">
+              <a:defRPr sz="1200" kern="1200">
+                <a:solidFill>
+                  <a:schemeClr val="bg1"/>
+                </a:solidFill>
+                <a:latin typeface="+mj-lt"/>
+                <a:ea typeface="+mn-ea"/>
+                <a:cs typeface="+mn-cs"/>
+              </a:defRPr>
+            </a:lvl1pPr>
+            <a:lvl2pPr marL="457200" algn="l" defTabSz="914400" rtl="0" eaLnBrk="1" latinLnBrk="0" hangingPunct="1">
+              <a:defRPr sz="1800" kern="1200">
+                <a:solidFill>
+                  <a:schemeClr val="tx1"/>
+                </a:solidFill>
+                <a:latin typeface="+mn-lt"/>
+                <a:ea typeface="+mn-ea"/>
+                <a:cs typeface="+mn-cs"/>
+              </a:defRPr>
+            </a:lvl2pPr>
+            <a:lvl3pPr marL="914400" algn="l" defTabSz="914400" rtl="0" eaLnBrk="1" latinLnBrk="0" hangingPunct="1">
+              <a:defRPr sz="1800" kern="1200">
+                <a:solidFill>
+                  <a:schemeClr val="tx1"/>
+                </a:solidFill>
+                <a:latin typeface="+mn-lt"/>
+                <a:ea typeface="+mn-ea"/>
+                <a:cs typeface="+mn-cs"/>
+              </a:defRPr>
+            </a:lvl3pPr>
+            <a:lvl4pPr marL="1371600" algn="l" defTabSz="914400" rtl="0" eaLnBrk="1" latinLnBrk="0" hangingPunct="1">
+              <a:defRPr sz="1800" kern="1200">
+                <a:solidFill>
+                  <a:schemeClr val="tx1"/>
+                </a:solidFill>
+                <a:latin typeface="+mn-lt"/>
+                <a:ea typeface="+mn-ea"/>
+                <a:cs typeface="+mn-cs"/>
+              </a:defRPr>
+            </a:lvl4pPr>
+            <a:lvl5pPr marL="1828800" algn="l" defTabSz="914400" rtl="0" eaLnBrk="1" latinLnBrk="0" hangingPunct="1">
+              <a:defRPr sz="1800" kern="1200">
+                <a:solidFill>
+                  <a:schemeClr val="tx1"/>
+                </a:solidFill>
+                <a:latin typeface="+mn-lt"/>
+                <a:ea typeface="+mn-ea"/>
+                <a:cs typeface="+mn-cs"/>
+              </a:defRPr>
+            </a:lvl5pPr>
+            <a:lvl6pPr marL="2286000" algn="l" defTabSz="914400" rtl="0" eaLnBrk="1" latinLnBrk="0" hangingPunct="1">
+              <a:defRPr sz="1800" kern="1200">
+                <a:solidFill>
+                  <a:schemeClr val="tx1"/>
+                </a:solidFill>
+                <a:latin typeface="+mn-lt"/>
+                <a:ea typeface="+mn-ea"/>
+                <a:cs typeface="+mn-cs"/>
+              </a:defRPr>
+            </a:lvl6pPr>
+            <a:lvl7pPr marL="2743200" algn="l" defTabSz="914400" rtl="0" eaLnBrk="1" latinLnBrk="0" hangingPunct="1">
+              <a:defRPr sz="1800" kern="1200">
+                <a:solidFill>
+                  <a:schemeClr val="tx1"/>
+                </a:solidFill>
+                <a:latin typeface="+mn-lt"/>
+                <a:ea typeface="+mn-ea"/>
+                <a:cs typeface="+mn-cs"/>
+              </a:defRPr>
+            </a:lvl7pPr>
+            <a:lvl8pPr marL="3200400" algn="l" defTabSz="914400" rtl="0" eaLnBrk="1" latinLnBrk="0" hangingPunct="1">
+              <a:defRPr sz="1800" kern="1200">
+                <a:solidFill>
+                  <a:schemeClr val="tx1"/>
+                </a:solidFill>
+                <a:latin typeface="+mn-lt"/>
+                <a:ea typeface="+mn-ea"/>
+                <a:cs typeface="+mn-cs"/>
+              </a:defRPr>
+            </a:lvl8pPr>
+            <a:lvl9pPr marL="3657600" algn="l" defTabSz="914400" rtl="0" eaLnBrk="1" latinLnBrk="0" hangingPunct="1">
+              <a:defRPr sz="1800" kern="1200">
+                <a:solidFill>
+                  <a:schemeClr val="tx1"/>
+                </a:solidFill>
+                <a:latin typeface="+mn-lt"/>
+                <a:ea typeface="+mn-ea"/>
+                <a:cs typeface="+mn-cs"/>
+              </a:defRPr>
+            </a:lvl9pPr>
+          </a:lstStyle>
+          <a:p>
+            <a:r>
+              <a:rPr lang="en-US" dirty="0"/>
+              <a:t>PES Data Science Presentation</a:t>
+            </a:r>
+          </a:p>
+        </p:txBody>
+      </p:sp>
     </p:spTree>
   </p:cSld>
   <p:clrMapOvr>
     <a:masterClrMapping/>
   </p:clrMapOvr>
-  <p:timing>
-    <p:tnLst>
-      <p:par>
-        <p:cTn id="1" dur="indefinite" restart="never" nodeType="tmRoot"/>
-      </p:par>
-    </p:tnLst>
-  </p:timing>
 </p:sld>
 </file>
 
@@ -9222,24 +9515,14 @@
           <a:lstStyle/>
           <a:p>
             <a:r>
-              <a:rPr lang="en-US" dirty="0" smtClean="0">
+              <a:rPr lang="en-US" dirty="0">
                 <a:solidFill>
                   <a:schemeClr val="tx2">
                     <a:lumMod val="50000"/>
                   </a:schemeClr>
                 </a:solidFill>
               </a:rPr>
-              <a:t>Find </a:t>
-            </a:r>
-            <a:r>
-              <a:rPr lang="en-US" dirty="0" smtClean="0">
-                <a:solidFill>
-                  <a:schemeClr val="tx2">
-                    <a:lumMod val="50000"/>
-                  </a:schemeClr>
-                </a:solidFill>
-              </a:rPr>
-              <a:t>specialization which has highest number of patients</a:t>
+              <a:t>Find specialization which has highest number of patients</a:t>
             </a:r>
           </a:p>
           <a:p>
@@ -9296,6 +9579,160 @@
           </a:fontRef>
         </p:style>
       </p:pic>
+      <p:sp>
+        <p:nvSpPr>
+          <p:cNvPr id="5" name="Slide Number Placeholder 7">
+            <a:extLst>
+              <a:ext uri="{FF2B5EF4-FFF2-40B4-BE49-F238E27FC236}">
+                <a16:creationId xmlns:a16="http://schemas.microsoft.com/office/drawing/2014/main" id="{10280916-1D7D-4356-817E-0F96958B8403}"/>
+              </a:ext>
+            </a:extLst>
+          </p:cNvPr>
+          <p:cNvSpPr txBox="1">
+            <a:spLocks/>
+          </p:cNvSpPr>
+          <p:nvPr/>
+        </p:nvSpPr>
+        <p:spPr>
+          <a:xfrm>
+            <a:off x="7806812" y="6689019"/>
+            <a:ext cx="3785419" cy="155729"/>
+          </a:xfrm>
+          <a:prstGeom prst="rect">
+            <a:avLst/>
+          </a:prstGeom>
+          <a:gradFill>
+            <a:gsLst>
+              <a:gs pos="87598">
+                <a:schemeClr val="accent5">
+                  <a:lumMod val="75000"/>
+                </a:schemeClr>
+              </a:gs>
+              <a:gs pos="0">
+                <a:schemeClr val="accent4">
+                  <a:lumMod val="60000"/>
+                  <a:lumOff val="40000"/>
+                </a:schemeClr>
+              </a:gs>
+              <a:gs pos="47000">
+                <a:schemeClr val="accent2">
+                  <a:lumMod val="75000"/>
+                  <a:shade val="67500"/>
+                  <a:satMod val="115000"/>
+                </a:schemeClr>
+              </a:gs>
+              <a:gs pos="100000">
+                <a:schemeClr val="accent1"/>
+              </a:gs>
+            </a:gsLst>
+            <a:lin ang="10800000" scaled="0"/>
+          </a:gradFill>
+        </p:spPr>
+        <p:txBody>
+          <a:bodyPr vert="horz" lIns="0" tIns="0" rIns="72000" bIns="0" rtlCol="0" anchor="ctr"/>
+          <a:lstStyle>
+            <a:defPPr>
+              <a:defRPr lang="en-US"/>
+            </a:defPPr>
+            <a:lvl1pPr marL="0" algn="r" defTabSz="914400" rtl="0" eaLnBrk="1" latinLnBrk="0" hangingPunct="1">
+              <a:defRPr sz="1200" kern="1200">
+                <a:solidFill>
+                  <a:schemeClr val="bg1"/>
+                </a:solidFill>
+                <a:latin typeface="+mj-lt"/>
+                <a:ea typeface="+mn-ea"/>
+                <a:cs typeface="+mn-cs"/>
+              </a:defRPr>
+            </a:lvl1pPr>
+            <a:lvl2pPr marL="457200" algn="l" defTabSz="914400" rtl="0" eaLnBrk="1" latinLnBrk="0" hangingPunct="1">
+              <a:defRPr sz="1800" kern="1200">
+                <a:solidFill>
+                  <a:schemeClr val="tx1"/>
+                </a:solidFill>
+                <a:latin typeface="+mn-lt"/>
+                <a:ea typeface="+mn-ea"/>
+                <a:cs typeface="+mn-cs"/>
+              </a:defRPr>
+            </a:lvl2pPr>
+            <a:lvl3pPr marL="914400" algn="l" defTabSz="914400" rtl="0" eaLnBrk="1" latinLnBrk="0" hangingPunct="1">
+              <a:defRPr sz="1800" kern="1200">
+                <a:solidFill>
+                  <a:schemeClr val="tx1"/>
+                </a:solidFill>
+                <a:latin typeface="+mn-lt"/>
+                <a:ea typeface="+mn-ea"/>
+                <a:cs typeface="+mn-cs"/>
+              </a:defRPr>
+            </a:lvl3pPr>
+            <a:lvl4pPr marL="1371600" algn="l" defTabSz="914400" rtl="0" eaLnBrk="1" latinLnBrk="0" hangingPunct="1">
+              <a:defRPr sz="1800" kern="1200">
+                <a:solidFill>
+                  <a:schemeClr val="tx1"/>
+                </a:solidFill>
+                <a:latin typeface="+mn-lt"/>
+                <a:ea typeface="+mn-ea"/>
+                <a:cs typeface="+mn-cs"/>
+              </a:defRPr>
+            </a:lvl4pPr>
+            <a:lvl5pPr marL="1828800" algn="l" defTabSz="914400" rtl="0" eaLnBrk="1" latinLnBrk="0" hangingPunct="1">
+              <a:defRPr sz="1800" kern="1200">
+                <a:solidFill>
+                  <a:schemeClr val="tx1"/>
+                </a:solidFill>
+                <a:latin typeface="+mn-lt"/>
+                <a:ea typeface="+mn-ea"/>
+                <a:cs typeface="+mn-cs"/>
+              </a:defRPr>
+            </a:lvl5pPr>
+            <a:lvl6pPr marL="2286000" algn="l" defTabSz="914400" rtl="0" eaLnBrk="1" latinLnBrk="0" hangingPunct="1">
+              <a:defRPr sz="1800" kern="1200">
+                <a:solidFill>
+                  <a:schemeClr val="tx1"/>
+                </a:solidFill>
+                <a:latin typeface="+mn-lt"/>
+                <a:ea typeface="+mn-ea"/>
+                <a:cs typeface="+mn-cs"/>
+              </a:defRPr>
+            </a:lvl6pPr>
+            <a:lvl7pPr marL="2743200" algn="l" defTabSz="914400" rtl="0" eaLnBrk="1" latinLnBrk="0" hangingPunct="1">
+              <a:defRPr sz="1800" kern="1200">
+                <a:solidFill>
+                  <a:schemeClr val="tx1"/>
+                </a:solidFill>
+                <a:latin typeface="+mn-lt"/>
+                <a:ea typeface="+mn-ea"/>
+                <a:cs typeface="+mn-cs"/>
+              </a:defRPr>
+            </a:lvl7pPr>
+            <a:lvl8pPr marL="3200400" algn="l" defTabSz="914400" rtl="0" eaLnBrk="1" latinLnBrk="0" hangingPunct="1">
+              <a:defRPr sz="1800" kern="1200">
+                <a:solidFill>
+                  <a:schemeClr val="tx1"/>
+                </a:solidFill>
+                <a:latin typeface="+mn-lt"/>
+                <a:ea typeface="+mn-ea"/>
+                <a:cs typeface="+mn-cs"/>
+              </a:defRPr>
+            </a:lvl8pPr>
+            <a:lvl9pPr marL="3657600" algn="l" defTabSz="914400" rtl="0" eaLnBrk="1" latinLnBrk="0" hangingPunct="1">
+              <a:defRPr sz="1800" kern="1200">
+                <a:solidFill>
+                  <a:schemeClr val="tx1"/>
+                </a:solidFill>
+                <a:latin typeface="+mn-lt"/>
+                <a:ea typeface="+mn-ea"/>
+                <a:cs typeface="+mn-cs"/>
+              </a:defRPr>
+            </a:lvl9pPr>
+          </a:lstStyle>
+          <a:p>
+            <a:r>
+              <a:rPr lang="en-US" dirty="0"/>
+              <a:t>PES Data Science Presentation</a:t>
+            </a:r>
+          </a:p>
+        </p:txBody>
+      </p:sp>
     </p:spTree>
   </p:cSld>
   <p:clrMapOvr>
@@ -9326,7 +9763,7 @@
           <p:cNvPr id="3" name="Title 2">
             <a:extLst>
               <a:ext uri="{FF2B5EF4-FFF2-40B4-BE49-F238E27FC236}">
-                <a16:creationId xmlns:a16="http://schemas.microsoft.com/office/drawing/2014/main" xmlns="" id="{209C8CAF-97DF-4086-B081-EAFD83FAC05C}"/>
+                <a16:creationId xmlns:a16="http://schemas.microsoft.com/office/drawing/2014/main" id="{209C8CAF-97DF-4086-B081-EAFD83FAC05C}"/>
               </a:ext>
             </a:extLst>
           </p:cNvPr>
@@ -9354,7 +9791,7 @@
           <p:cNvPr id="4" name="Text Placeholder 3">
             <a:extLst>
               <a:ext uri="{FF2B5EF4-FFF2-40B4-BE49-F238E27FC236}">
-                <a16:creationId xmlns:a16="http://schemas.microsoft.com/office/drawing/2014/main" xmlns="" id="{72F23033-2528-4D88-8804-06C90619DF85}"/>
+                <a16:creationId xmlns:a16="http://schemas.microsoft.com/office/drawing/2014/main" id="{72F23033-2528-4D88-8804-06C90619DF85}"/>
               </a:ext>
             </a:extLst>
           </p:cNvPr>
@@ -9382,7 +9819,7 @@
           <p:cNvPr id="18" name="Graphic 17" descr="Envelope icon">
             <a:extLst>
               <a:ext uri="{FF2B5EF4-FFF2-40B4-BE49-F238E27FC236}">
-                <a16:creationId xmlns:a16="http://schemas.microsoft.com/office/drawing/2014/main" xmlns="" id="{6D49048B-2AA4-42B7-9454-4E76924BCC57}"/>
+                <a16:creationId xmlns:a16="http://schemas.microsoft.com/office/drawing/2014/main" id="{6D49048B-2AA4-42B7-9454-4E76924BCC57}"/>
               </a:ext>
             </a:extLst>
           </p:cNvPr>
@@ -9395,10 +9832,10 @@
           <a:blip r:embed="rId2" cstate="screen">
             <a:extLst>
               <a:ext uri="{28A0092B-C50C-407E-A947-70E740481C1C}">
-                <a14:useLocalDpi xmlns:a14="http://schemas.microsoft.com/office/drawing/2010/main" xmlns=""/>
+                <a14:useLocalDpi xmlns:a14="http://schemas.microsoft.com/office/drawing/2010/main"/>
               </a:ext>
               <a:ext uri="{96DAC541-7B7A-43D3-8B79-37D633B846F1}">
-                <asvg:svgBlip xmlns:asvg="http://schemas.microsoft.com/office/drawing/2016/SVG/main" xmlns="" r:embed="rId3"/>
+                <asvg:svgBlip xmlns:asvg="http://schemas.microsoft.com/office/drawing/2016/SVG/main" r:embed="rId3"/>
               </a:ext>
             </a:extLst>
           </a:blip>
@@ -9421,7 +9858,7 @@
           <p:cNvPr id="5" name="Text Placeholder 4">
             <a:extLst>
               <a:ext uri="{FF2B5EF4-FFF2-40B4-BE49-F238E27FC236}">
-                <a16:creationId xmlns:a16="http://schemas.microsoft.com/office/drawing/2014/main" xmlns="" id="{136F567F-B255-41F7-B5B6-1BEB6722D476}"/>
+                <a16:creationId xmlns:a16="http://schemas.microsoft.com/office/drawing/2014/main" id="{136F567F-B255-41F7-B5B6-1BEB6722D476}"/>
               </a:ext>
             </a:extLst>
           </p:cNvPr>
@@ -9446,10 +9883,10 @@
           <p:cNvPr id="25" name="Group 24">
             <a:extLst>
               <a:ext uri="{FF2B5EF4-FFF2-40B4-BE49-F238E27FC236}">
-                <a16:creationId xmlns:a16="http://schemas.microsoft.com/office/drawing/2014/main" xmlns="" id="{F0F12597-AABE-455F-AE27-B788519B2040}"/>
+                <a16:creationId xmlns:a16="http://schemas.microsoft.com/office/drawing/2014/main" id="{F0F12597-AABE-455F-AE27-B788519B2040}"/>
               </a:ext>
               <a:ext uri="{C183D7F6-B498-43B3-948B-1728B52AA6E4}">
-                <adec:decorative xmlns:adec="http://schemas.microsoft.com/office/drawing/2017/decorative" xmlns="" val="1"/>
+                <adec:decorative xmlns:adec="http://schemas.microsoft.com/office/drawing/2017/decorative" val="1"/>
               </a:ext>
             </a:extLst>
           </p:cNvPr>
@@ -9471,7 +9908,7 @@
             <p:cNvPr id="15" name="Freeform: Shape 14">
               <a:extLst>
                 <a:ext uri="{FF2B5EF4-FFF2-40B4-BE49-F238E27FC236}">
-                  <a16:creationId xmlns:a16="http://schemas.microsoft.com/office/drawing/2014/main" xmlns="" id="{559EE1F1-B897-408A-A84B-C550FFD08D48}"/>
+                  <a16:creationId xmlns:a16="http://schemas.microsoft.com/office/drawing/2014/main" id="{559EE1F1-B897-408A-A84B-C550FFD08D48}"/>
                 </a:ext>
               </a:extLst>
             </p:cNvPr>
@@ -9616,7 +10053,7 @@
             <p:cNvPr id="16" name="Freeform: Shape 15">
               <a:extLst>
                 <a:ext uri="{FF2B5EF4-FFF2-40B4-BE49-F238E27FC236}">
-                  <a16:creationId xmlns:a16="http://schemas.microsoft.com/office/drawing/2014/main" xmlns="" id="{033469D8-D3DC-4362-8C73-DB3F504C5B01}"/>
+                  <a16:creationId xmlns:a16="http://schemas.microsoft.com/office/drawing/2014/main" id="{033469D8-D3DC-4362-8C73-DB3F504C5B01}"/>
                 </a:ext>
               </a:extLst>
             </p:cNvPr>
@@ -9802,7 +10239,7 @@
             <p:cNvPr id="20" name="Freeform: Shape 19">
               <a:extLst>
                 <a:ext uri="{FF2B5EF4-FFF2-40B4-BE49-F238E27FC236}">
-                  <a16:creationId xmlns:a16="http://schemas.microsoft.com/office/drawing/2014/main" xmlns="" id="{56D60673-90C1-4A3B-B705-02383760807C}"/>
+                  <a16:creationId xmlns:a16="http://schemas.microsoft.com/office/drawing/2014/main" id="{56D60673-90C1-4A3B-B705-02383760807C}"/>
                 </a:ext>
               </a:extLst>
             </p:cNvPr>
@@ -9978,7 +10415,7 @@
             <p:cNvPr id="21" name="Freeform: Shape 20">
               <a:extLst>
                 <a:ext uri="{FF2B5EF4-FFF2-40B4-BE49-F238E27FC236}">
-                  <a16:creationId xmlns:a16="http://schemas.microsoft.com/office/drawing/2014/main" xmlns="" id="{941908B8-1FD7-4EE4-AE25-1C45D34F1498}"/>
+                  <a16:creationId xmlns:a16="http://schemas.microsoft.com/office/drawing/2014/main" id="{941908B8-1FD7-4EE4-AE25-1C45D34F1498}"/>
                 </a:ext>
               </a:extLst>
             </p:cNvPr>
@@ -10174,7 +10611,7 @@
             <p:cNvPr id="22" name="Freeform: Shape 21">
               <a:extLst>
                 <a:ext uri="{FF2B5EF4-FFF2-40B4-BE49-F238E27FC236}">
-                  <a16:creationId xmlns:a16="http://schemas.microsoft.com/office/drawing/2014/main" xmlns="" id="{4B17393E-C1C4-43DA-A6B1-3ABA77082A89}"/>
+                  <a16:creationId xmlns:a16="http://schemas.microsoft.com/office/drawing/2014/main" id="{4B17393E-C1C4-43DA-A6B1-3ABA77082A89}"/>
                 </a:ext>
               </a:extLst>
             </p:cNvPr>
@@ -10296,7 +10733,7 @@
             <p:cNvPr id="23" name="Freeform: Shape 22">
               <a:extLst>
                 <a:ext uri="{FF2B5EF4-FFF2-40B4-BE49-F238E27FC236}">
-                  <a16:creationId xmlns:a16="http://schemas.microsoft.com/office/drawing/2014/main" xmlns="" id="{2C0F054A-6FFE-4012-93EE-568C5B1B2A42}"/>
+                  <a16:creationId xmlns:a16="http://schemas.microsoft.com/office/drawing/2014/main" id="{2C0F054A-6FFE-4012-93EE-568C5B1B2A42}"/>
                 </a:ext>
               </a:extLst>
             </p:cNvPr>
@@ -10418,7 +10855,7 @@
             <p:cNvPr id="24" name="Freeform: Shape 23">
               <a:extLst>
                 <a:ext uri="{FF2B5EF4-FFF2-40B4-BE49-F238E27FC236}">
-                  <a16:creationId xmlns:a16="http://schemas.microsoft.com/office/drawing/2014/main" xmlns="" id="{811AA75F-0393-4B2E-96E1-F088CC6A12EF}"/>
+                  <a16:creationId xmlns:a16="http://schemas.microsoft.com/office/drawing/2014/main" id="{811AA75F-0393-4B2E-96E1-F088CC6A12EF}"/>
                 </a:ext>
               </a:extLst>
             </p:cNvPr>
@@ -10541,7 +10978,7 @@
           <p:cNvPr id="9" name="Graphic 14" descr="dinosaur outline">
             <a:extLst>
               <a:ext uri="{FF2B5EF4-FFF2-40B4-BE49-F238E27FC236}">
-                <a16:creationId xmlns:a16="http://schemas.microsoft.com/office/drawing/2014/main" xmlns="" id="{0DE3B922-950A-4A58-AAB9-38FDAD1D42F5}"/>
+                <a16:creationId xmlns:a16="http://schemas.microsoft.com/office/drawing/2014/main" id="{0DE3B922-950A-4A58-AAB9-38FDAD1D42F5}"/>
               </a:ext>
             </a:extLst>
           </p:cNvPr>
@@ -11397,10 +11834,10 @@
           <p:cNvPr id="14" name="Straight Connector 13">
             <a:extLst>
               <a:ext uri="{FF2B5EF4-FFF2-40B4-BE49-F238E27FC236}">
-                <a16:creationId xmlns:a16="http://schemas.microsoft.com/office/drawing/2014/main" xmlns="" id="{61DCE69A-183E-4D92-928A-CEE76B9E5241}"/>
+                <a16:creationId xmlns:a16="http://schemas.microsoft.com/office/drawing/2014/main" id="{61DCE69A-183E-4D92-928A-CEE76B9E5241}"/>
               </a:ext>
               <a:ext uri="{C183D7F6-B498-43B3-948B-1728B52AA6E4}">
-                <adec:decorative xmlns:adec="http://schemas.microsoft.com/office/drawing/2017/decorative" xmlns="" val="1"/>
+                <adec:decorative xmlns:adec="http://schemas.microsoft.com/office/drawing/2017/decorative" val="1"/>
               </a:ext>
             </a:extLst>
           </p:cNvPr>
@@ -11449,7 +11886,7 @@
           <p:cNvPr id="8" name="Picture Placeholder 7" descr="girl with pigtails raising her hand with chalkboard in background">
             <a:extLst>
               <a:ext uri="{FF2B5EF4-FFF2-40B4-BE49-F238E27FC236}">
-                <a16:creationId xmlns:a16="http://schemas.microsoft.com/office/drawing/2014/main" xmlns="" id="{A8A29F18-9B4E-4798-8043-A88568C47F1E}"/>
+                <a16:creationId xmlns:a16="http://schemas.microsoft.com/office/drawing/2014/main" id="{A8A29F18-9B4E-4798-8043-A88568C47F1E}"/>
               </a:ext>
             </a:extLst>
           </p:cNvPr>
@@ -11464,7 +11901,7 @@
           <a:blip r:embed="rId4" cstate="screen">
             <a:extLst>
               <a:ext uri="{28A0092B-C50C-407E-A947-70E740481C1C}">
-                <a14:useLocalDpi xmlns:a14="http://schemas.microsoft.com/office/drawing/2010/main" xmlns=""/>
+                <a14:useLocalDpi xmlns:a14="http://schemas.microsoft.com/office/drawing/2010/main"/>
               </a:ext>
             </a:extLst>
           </a:blip>
@@ -11483,7 +11920,7 @@
           <p:cNvPr id="17" name="Slide Number Placeholder 7">
             <a:extLst>
               <a:ext uri="{FF2B5EF4-FFF2-40B4-BE49-F238E27FC236}">
-                <a16:creationId xmlns:a16="http://schemas.microsoft.com/office/drawing/2014/main" xmlns="" id="{628D9633-680F-4F03-ABD7-56E597389712}"/>
+                <a16:creationId xmlns:a16="http://schemas.microsoft.com/office/drawing/2014/main" id="{628D9633-680F-4F03-ABD7-56E597389712}"/>
               </a:ext>
             </a:extLst>
           </p:cNvPr>
@@ -11635,7 +12072,7 @@
     </p:spTree>
     <p:extLst>
       <p:ext uri="{BB962C8B-B14F-4D97-AF65-F5344CB8AC3E}">
-        <p14:creationId xmlns:p14="http://schemas.microsoft.com/office/powerpoint/2010/main" xmlns="" val="268675344"/>
+        <p14:creationId xmlns:p14="http://schemas.microsoft.com/office/powerpoint/2010/main" val="268675344"/>
       </p:ext>
     </p:extLst>
   </p:cSld>
@@ -11667,7 +12104,7 @@
           <p:cNvPr id="2" name="Title 1">
             <a:extLst>
               <a:ext uri="{FF2B5EF4-FFF2-40B4-BE49-F238E27FC236}">
-                <a16:creationId xmlns:a16="http://schemas.microsoft.com/office/drawing/2014/main" xmlns="" id="{A6BA76B3-D03C-4451-8EB4-18D3076077B3}"/>
+                <a16:creationId xmlns:a16="http://schemas.microsoft.com/office/drawing/2014/main" id="{A6BA76B3-D03C-4451-8EB4-18D3076077B3}"/>
               </a:ext>
             </a:extLst>
           </p:cNvPr>
@@ -11695,7 +12132,7 @@
           <p:cNvPr id="5" name="Slide Number Placeholder 4">
             <a:extLst>
               <a:ext uri="{FF2B5EF4-FFF2-40B4-BE49-F238E27FC236}">
-                <a16:creationId xmlns:a16="http://schemas.microsoft.com/office/drawing/2014/main" xmlns="" id="{3619E243-D955-4AE4-B703-304B0F84084C}"/>
+                <a16:creationId xmlns:a16="http://schemas.microsoft.com/office/drawing/2014/main" id="{3619E243-D955-4AE4-B703-304B0F84084C}"/>
               </a:ext>
             </a:extLst>
           </p:cNvPr>
@@ -11725,7 +12162,7 @@
           <p:cNvPr id="8" name="Slide Number Placeholder 7">
             <a:extLst>
               <a:ext uri="{FF2B5EF4-FFF2-40B4-BE49-F238E27FC236}">
-                <a16:creationId xmlns:a16="http://schemas.microsoft.com/office/drawing/2014/main" xmlns="" id="{0236769E-456C-43C6-A61C-40F4605FF104}"/>
+                <a16:creationId xmlns:a16="http://schemas.microsoft.com/office/drawing/2014/main" id="{0236769E-456C-43C6-A61C-40F4605FF104}"/>
               </a:ext>
             </a:extLst>
           </p:cNvPr>
@@ -11879,7 +12316,7 @@
           <p:cNvPr id="28" name="Picture 27" descr="Diagram&#10;&#10;Description automatically generated">
             <a:extLst>
               <a:ext uri="{FF2B5EF4-FFF2-40B4-BE49-F238E27FC236}">
-                <a16:creationId xmlns:a16="http://schemas.microsoft.com/office/drawing/2014/main" xmlns="" id="{F34EE1EA-0E6F-40C1-A4A4-A1D65AACAECF}"/>
+                <a16:creationId xmlns:a16="http://schemas.microsoft.com/office/drawing/2014/main" id="{F34EE1EA-0E6F-40C1-A4A4-A1D65AACAECF}"/>
               </a:ext>
             </a:extLst>
           </p:cNvPr>
@@ -11909,7 +12346,7 @@
           <p:cNvPr id="9" name="Content Placeholder 3">
             <a:extLst>
               <a:ext uri="{FF2B5EF4-FFF2-40B4-BE49-F238E27FC236}">
-                <a16:creationId xmlns:a16="http://schemas.microsoft.com/office/drawing/2014/main" xmlns="" id="{A8D282C9-8A17-4584-B0AD-B391F5964F41}"/>
+                <a16:creationId xmlns:a16="http://schemas.microsoft.com/office/drawing/2014/main" id="{A8D282C9-8A17-4584-B0AD-B391F5964F41}"/>
               </a:ext>
             </a:extLst>
           </p:cNvPr>
@@ -12143,7 +12580,7 @@
           <p:cNvPr id="10" name="Picture 9">
             <a:extLst>
               <a:ext uri="{FF2B5EF4-FFF2-40B4-BE49-F238E27FC236}">
-                <a16:creationId xmlns:a16="http://schemas.microsoft.com/office/drawing/2014/main" xmlns="" id="{B8295733-BFC0-48D0-9859-F89468D2AAFF}"/>
+                <a16:creationId xmlns:a16="http://schemas.microsoft.com/office/drawing/2014/main" id="{B8295733-BFC0-48D0-9859-F89468D2AAFF}"/>
               </a:ext>
             </a:extLst>
           </p:cNvPr>
@@ -12173,7 +12610,7 @@
           <p:cNvPr id="14" name="Picture 13">
             <a:extLst>
               <a:ext uri="{FF2B5EF4-FFF2-40B4-BE49-F238E27FC236}">
-                <a16:creationId xmlns:a16="http://schemas.microsoft.com/office/drawing/2014/main" xmlns="" id="{6758D5E3-B1B2-4EB6-88B8-43E05A89C379}"/>
+                <a16:creationId xmlns:a16="http://schemas.microsoft.com/office/drawing/2014/main" id="{6758D5E3-B1B2-4EB6-88B8-43E05A89C379}"/>
               </a:ext>
             </a:extLst>
           </p:cNvPr>
@@ -12203,7 +12640,7 @@
           <p:cNvPr id="16" name="Picture 15">
             <a:extLst>
               <a:ext uri="{FF2B5EF4-FFF2-40B4-BE49-F238E27FC236}">
-                <a16:creationId xmlns:a16="http://schemas.microsoft.com/office/drawing/2014/main" xmlns="" id="{3B7468A8-7166-4ED5-86C1-622FB1CFC355}"/>
+                <a16:creationId xmlns:a16="http://schemas.microsoft.com/office/drawing/2014/main" id="{3B7468A8-7166-4ED5-86C1-622FB1CFC355}"/>
               </a:ext>
             </a:extLst>
           </p:cNvPr>
@@ -12233,7 +12670,7 @@
           <p:cNvPr id="18" name="Picture 17">
             <a:extLst>
               <a:ext uri="{FF2B5EF4-FFF2-40B4-BE49-F238E27FC236}">
-                <a16:creationId xmlns:a16="http://schemas.microsoft.com/office/drawing/2014/main" xmlns="" id="{0540FC0C-A593-432D-AD11-20B7B71B0FAB}"/>
+                <a16:creationId xmlns:a16="http://schemas.microsoft.com/office/drawing/2014/main" id="{0540FC0C-A593-432D-AD11-20B7B71B0FAB}"/>
               </a:ext>
             </a:extLst>
           </p:cNvPr>
@@ -12263,7 +12700,7 @@
           <p:cNvPr id="20" name="Picture 19">
             <a:extLst>
               <a:ext uri="{FF2B5EF4-FFF2-40B4-BE49-F238E27FC236}">
-                <a16:creationId xmlns:a16="http://schemas.microsoft.com/office/drawing/2014/main" xmlns="" id="{6CAF1F62-98E0-43EC-AD48-83EBEDFF4671}"/>
+                <a16:creationId xmlns:a16="http://schemas.microsoft.com/office/drawing/2014/main" id="{6CAF1F62-98E0-43EC-AD48-83EBEDFF4671}"/>
               </a:ext>
             </a:extLst>
           </p:cNvPr>
@@ -12293,7 +12730,7 @@
           <p:cNvPr id="22" name="Picture 21">
             <a:extLst>
               <a:ext uri="{FF2B5EF4-FFF2-40B4-BE49-F238E27FC236}">
-                <a16:creationId xmlns:a16="http://schemas.microsoft.com/office/drawing/2014/main" xmlns="" id="{D35BAABC-B086-4F28-A3AE-01626AB7D628}"/>
+                <a16:creationId xmlns:a16="http://schemas.microsoft.com/office/drawing/2014/main" id="{D35BAABC-B086-4F28-A3AE-01626AB7D628}"/>
               </a:ext>
             </a:extLst>
           </p:cNvPr>
@@ -12323,10 +12760,10 @@
           <p:cNvPr id="24" name="Straight Connector 23">
             <a:extLst>
               <a:ext uri="{FF2B5EF4-FFF2-40B4-BE49-F238E27FC236}">
-                <a16:creationId xmlns:a16="http://schemas.microsoft.com/office/drawing/2014/main" xmlns="" id="{9A24396F-B460-4468-805F-D1167DAD3AA0}"/>
+                <a16:creationId xmlns:a16="http://schemas.microsoft.com/office/drawing/2014/main" id="{9A24396F-B460-4468-805F-D1167DAD3AA0}"/>
               </a:ext>
               <a:ext uri="{C183D7F6-B498-43B3-948B-1728B52AA6E4}">
-                <adec:decorative xmlns:adec="http://schemas.microsoft.com/office/drawing/2017/decorative" xmlns="" val="1"/>
+                <adec:decorative xmlns:adec="http://schemas.microsoft.com/office/drawing/2017/decorative" val="1"/>
               </a:ext>
             </a:extLst>
           </p:cNvPr>
@@ -12367,7 +12804,7 @@
     </p:spTree>
     <p:extLst>
       <p:ext uri="{BB962C8B-B14F-4D97-AF65-F5344CB8AC3E}">
-        <p14:creationId xmlns:p14="http://schemas.microsoft.com/office/powerpoint/2010/main" xmlns="" val="851971294"/>
+        <p14:creationId xmlns:p14="http://schemas.microsoft.com/office/powerpoint/2010/main" val="851971294"/>
       </p:ext>
     </p:extLst>
   </p:cSld>
@@ -12399,7 +12836,7 @@
           <p:cNvPr id="2" name="Title 1">
             <a:extLst>
               <a:ext uri="{FF2B5EF4-FFF2-40B4-BE49-F238E27FC236}">
-                <a16:creationId xmlns:a16="http://schemas.microsoft.com/office/drawing/2014/main" xmlns="" id="{A6BA76B3-D03C-4451-8EB4-18D3076077B3}"/>
+                <a16:creationId xmlns:a16="http://schemas.microsoft.com/office/drawing/2014/main" id="{A6BA76B3-D03C-4451-8EB4-18D3076077B3}"/>
               </a:ext>
             </a:extLst>
           </p:cNvPr>
@@ -12432,7 +12869,7 @@
           <p:cNvPr id="5" name="Slide Number Placeholder 4">
             <a:extLst>
               <a:ext uri="{FF2B5EF4-FFF2-40B4-BE49-F238E27FC236}">
-                <a16:creationId xmlns:a16="http://schemas.microsoft.com/office/drawing/2014/main" xmlns="" id="{3619E243-D955-4AE4-B703-304B0F84084C}"/>
+                <a16:creationId xmlns:a16="http://schemas.microsoft.com/office/drawing/2014/main" id="{3619E243-D955-4AE4-B703-304B0F84084C}"/>
               </a:ext>
             </a:extLst>
           </p:cNvPr>
@@ -12462,7 +12899,7 @@
           <p:cNvPr id="18" name="Slide Number Placeholder 7">
             <a:extLst>
               <a:ext uri="{FF2B5EF4-FFF2-40B4-BE49-F238E27FC236}">
-                <a16:creationId xmlns:a16="http://schemas.microsoft.com/office/drawing/2014/main" xmlns="" id="{8FFAE491-9D2F-4D42-B8B3-F32C8E97E684}"/>
+                <a16:creationId xmlns:a16="http://schemas.microsoft.com/office/drawing/2014/main" id="{8FFAE491-9D2F-4D42-B8B3-F32C8E97E684}"/>
               </a:ext>
             </a:extLst>
           </p:cNvPr>
@@ -12616,7 +13053,7 @@
           <p:cNvPr id="12" name="Table 11">
             <a:extLst>
               <a:ext uri="{FF2B5EF4-FFF2-40B4-BE49-F238E27FC236}">
-                <a16:creationId xmlns:a16="http://schemas.microsoft.com/office/drawing/2014/main" xmlns="" id="{0C92B4E7-6150-4433-ABE7-8AD8C40B3665}"/>
+                <a16:creationId xmlns:a16="http://schemas.microsoft.com/office/drawing/2014/main" id="{0C92B4E7-6150-4433-ABE7-8AD8C40B3665}"/>
               </a:ext>
             </a:extLst>
           </p:cNvPr>
@@ -12626,7 +13063,7 @@
           <p:nvPr>
             <p:extLst>
               <p:ext uri="{D42A27DB-BD31-4B8C-83A1-F6EECF244321}">
-                <p14:modId xmlns:p14="http://schemas.microsoft.com/office/powerpoint/2010/main" xmlns="" val="1326108041"/>
+                <p14:modId xmlns:p14="http://schemas.microsoft.com/office/powerpoint/2010/main" val="1326108041"/>
               </p:ext>
             </p:extLst>
           </p:nvPr>
@@ -12643,14 +13080,14 @@
                 <a:gridCol w="1659937">
                   <a:extLst>
                     <a:ext uri="{9D8B030D-6E8A-4147-A177-3AD203B41FA5}">
-                      <a16:colId xmlns:a16="http://schemas.microsoft.com/office/drawing/2014/main" xmlns="" val="1876669442"/>
+                      <a16:colId xmlns:a16="http://schemas.microsoft.com/office/drawing/2014/main" val="1876669442"/>
                     </a:ext>
                   </a:extLst>
                 </a:gridCol>
                 <a:gridCol w="2604560">
                   <a:extLst>
                     <a:ext uri="{9D8B030D-6E8A-4147-A177-3AD203B41FA5}">
-                      <a16:colId xmlns:a16="http://schemas.microsoft.com/office/drawing/2014/main" xmlns="" val="265902871"/>
+                      <a16:colId xmlns:a16="http://schemas.microsoft.com/office/drawing/2014/main" val="265902871"/>
                     </a:ext>
                   </a:extLst>
                 </a:gridCol>
@@ -12770,7 +13207,7 @@
                 </a:tc>
                 <a:extLst>
                   <a:ext uri="{0D108BD9-81ED-4DB2-BD59-A6C34878D82A}">
-                    <a16:rowId xmlns:a16="http://schemas.microsoft.com/office/drawing/2014/main" xmlns="" val="786482064"/>
+                    <a16:rowId xmlns:a16="http://schemas.microsoft.com/office/drawing/2014/main" val="786482064"/>
                   </a:ext>
                 </a:extLst>
               </a:tr>
@@ -12898,7 +13335,7 @@
                 </a:tc>
                 <a:extLst>
                   <a:ext uri="{0D108BD9-81ED-4DB2-BD59-A6C34878D82A}">
-                    <a16:rowId xmlns:a16="http://schemas.microsoft.com/office/drawing/2014/main" xmlns="" val="3397446950"/>
+                    <a16:rowId xmlns:a16="http://schemas.microsoft.com/office/drawing/2014/main" val="3397446950"/>
                   </a:ext>
                 </a:extLst>
               </a:tr>
@@ -13026,7 +13463,7 @@
                 </a:tc>
                 <a:extLst>
                   <a:ext uri="{0D108BD9-81ED-4DB2-BD59-A6C34878D82A}">
-                    <a16:rowId xmlns:a16="http://schemas.microsoft.com/office/drawing/2014/main" xmlns="" val="2968851561"/>
+                    <a16:rowId xmlns:a16="http://schemas.microsoft.com/office/drawing/2014/main" val="2968851561"/>
                   </a:ext>
                 </a:extLst>
               </a:tr>
@@ -13154,7 +13591,7 @@
                 </a:tc>
                 <a:extLst>
                   <a:ext uri="{0D108BD9-81ED-4DB2-BD59-A6C34878D82A}">
-                    <a16:rowId xmlns:a16="http://schemas.microsoft.com/office/drawing/2014/main" xmlns="" val="238265988"/>
+                    <a16:rowId xmlns:a16="http://schemas.microsoft.com/office/drawing/2014/main" val="238265988"/>
                   </a:ext>
                 </a:extLst>
               </a:tr>
@@ -13282,7 +13719,7 @@
                 </a:tc>
                 <a:extLst>
                   <a:ext uri="{0D108BD9-81ED-4DB2-BD59-A6C34878D82A}">
-                    <a16:rowId xmlns:a16="http://schemas.microsoft.com/office/drawing/2014/main" xmlns="" val="3526388436"/>
+                    <a16:rowId xmlns:a16="http://schemas.microsoft.com/office/drawing/2014/main" val="3526388436"/>
                   </a:ext>
                 </a:extLst>
               </a:tr>
@@ -13410,7 +13847,7 @@
                 </a:tc>
                 <a:extLst>
                   <a:ext uri="{0D108BD9-81ED-4DB2-BD59-A6C34878D82A}">
-                    <a16:rowId xmlns:a16="http://schemas.microsoft.com/office/drawing/2014/main" xmlns="" val="1353632176"/>
+                    <a16:rowId xmlns:a16="http://schemas.microsoft.com/office/drawing/2014/main" val="1353632176"/>
                   </a:ext>
                 </a:extLst>
               </a:tr>
@@ -13538,7 +13975,7 @@
                 </a:tc>
                 <a:extLst>
                   <a:ext uri="{0D108BD9-81ED-4DB2-BD59-A6C34878D82A}">
-                    <a16:rowId xmlns:a16="http://schemas.microsoft.com/office/drawing/2014/main" xmlns="" val="1495981978"/>
+                    <a16:rowId xmlns:a16="http://schemas.microsoft.com/office/drawing/2014/main" val="1495981978"/>
                   </a:ext>
                 </a:extLst>
               </a:tr>
@@ -13666,7 +14103,7 @@
                 </a:tc>
                 <a:extLst>
                   <a:ext uri="{0D108BD9-81ED-4DB2-BD59-A6C34878D82A}">
-                    <a16:rowId xmlns:a16="http://schemas.microsoft.com/office/drawing/2014/main" xmlns="" val="26251627"/>
+                    <a16:rowId xmlns:a16="http://schemas.microsoft.com/office/drawing/2014/main" val="26251627"/>
                   </a:ext>
                 </a:extLst>
               </a:tr>
@@ -13794,7 +14231,7 @@
                 </a:tc>
                 <a:extLst>
                   <a:ext uri="{0D108BD9-81ED-4DB2-BD59-A6C34878D82A}">
-                    <a16:rowId xmlns:a16="http://schemas.microsoft.com/office/drawing/2014/main" xmlns="" val="46695360"/>
+                    <a16:rowId xmlns:a16="http://schemas.microsoft.com/office/drawing/2014/main" val="46695360"/>
                   </a:ext>
                 </a:extLst>
               </a:tr>
@@ -13922,7 +14359,7 @@
                 </a:tc>
                 <a:extLst>
                   <a:ext uri="{0D108BD9-81ED-4DB2-BD59-A6C34878D82A}">
-                    <a16:rowId xmlns:a16="http://schemas.microsoft.com/office/drawing/2014/main" xmlns="" val="1671264062"/>
+                    <a16:rowId xmlns:a16="http://schemas.microsoft.com/office/drawing/2014/main" val="1671264062"/>
                   </a:ext>
                 </a:extLst>
               </a:tr>
@@ -14050,7 +14487,7 @@
                 </a:tc>
                 <a:extLst>
                   <a:ext uri="{0D108BD9-81ED-4DB2-BD59-A6C34878D82A}">
-                    <a16:rowId xmlns:a16="http://schemas.microsoft.com/office/drawing/2014/main" xmlns="" val="4006448037"/>
+                    <a16:rowId xmlns:a16="http://schemas.microsoft.com/office/drawing/2014/main" val="4006448037"/>
                   </a:ext>
                 </a:extLst>
               </a:tr>
@@ -14178,7 +14615,7 @@
                 </a:tc>
                 <a:extLst>
                   <a:ext uri="{0D108BD9-81ED-4DB2-BD59-A6C34878D82A}">
-                    <a16:rowId xmlns:a16="http://schemas.microsoft.com/office/drawing/2014/main" xmlns="" val="509101075"/>
+                    <a16:rowId xmlns:a16="http://schemas.microsoft.com/office/drawing/2014/main" val="509101075"/>
                   </a:ext>
                 </a:extLst>
               </a:tr>
@@ -14306,7 +14743,7 @@
                 </a:tc>
                 <a:extLst>
                   <a:ext uri="{0D108BD9-81ED-4DB2-BD59-A6C34878D82A}">
-                    <a16:rowId xmlns:a16="http://schemas.microsoft.com/office/drawing/2014/main" xmlns="" val="502437883"/>
+                    <a16:rowId xmlns:a16="http://schemas.microsoft.com/office/drawing/2014/main" val="502437883"/>
                   </a:ext>
                 </a:extLst>
               </a:tr>
@@ -14434,7 +14871,7 @@
                 </a:tc>
                 <a:extLst>
                   <a:ext uri="{0D108BD9-81ED-4DB2-BD59-A6C34878D82A}">
-                    <a16:rowId xmlns:a16="http://schemas.microsoft.com/office/drawing/2014/main" xmlns="" val="2011469568"/>
+                    <a16:rowId xmlns:a16="http://schemas.microsoft.com/office/drawing/2014/main" val="2011469568"/>
                   </a:ext>
                 </a:extLst>
               </a:tr>
@@ -14562,7 +14999,7 @@
                 </a:tc>
                 <a:extLst>
                   <a:ext uri="{0D108BD9-81ED-4DB2-BD59-A6C34878D82A}">
-                    <a16:rowId xmlns:a16="http://schemas.microsoft.com/office/drawing/2014/main" xmlns="" val="3884692195"/>
+                    <a16:rowId xmlns:a16="http://schemas.microsoft.com/office/drawing/2014/main" val="3884692195"/>
                   </a:ext>
                 </a:extLst>
               </a:tr>
@@ -14690,7 +15127,7 @@
                 </a:tc>
                 <a:extLst>
                   <a:ext uri="{0D108BD9-81ED-4DB2-BD59-A6C34878D82A}">
-                    <a16:rowId xmlns:a16="http://schemas.microsoft.com/office/drawing/2014/main" xmlns="" val="3118160005"/>
+                    <a16:rowId xmlns:a16="http://schemas.microsoft.com/office/drawing/2014/main" val="3118160005"/>
                   </a:ext>
                 </a:extLst>
               </a:tr>
@@ -14703,7 +15140,7 @@
           <p:cNvPr id="26" name="Content Placeholder 3">
             <a:extLst>
               <a:ext uri="{FF2B5EF4-FFF2-40B4-BE49-F238E27FC236}">
-                <a16:creationId xmlns:a16="http://schemas.microsoft.com/office/drawing/2014/main" xmlns="" id="{28CA9608-433B-4096-9EA6-BD0001AC1453}"/>
+                <a16:creationId xmlns:a16="http://schemas.microsoft.com/office/drawing/2014/main" id="{28CA9608-433B-4096-9EA6-BD0001AC1453}"/>
               </a:ext>
             </a:extLst>
           </p:cNvPr>
@@ -14742,7 +15179,7 @@
           <p:cNvPr id="49" name="Group 48">
             <a:extLst>
               <a:ext uri="{FF2B5EF4-FFF2-40B4-BE49-F238E27FC236}">
-                <a16:creationId xmlns:a16="http://schemas.microsoft.com/office/drawing/2014/main" xmlns="" id="{A256922E-B583-4AA4-95F2-FF70627B9562}"/>
+                <a16:creationId xmlns:a16="http://schemas.microsoft.com/office/drawing/2014/main" id="{A256922E-B583-4AA4-95F2-FF70627B9562}"/>
               </a:ext>
             </a:extLst>
           </p:cNvPr>
@@ -14762,7 +15199,7 @@
             <p:cNvPr id="42" name="Picture 41">
               <a:extLst>
                 <a:ext uri="{FF2B5EF4-FFF2-40B4-BE49-F238E27FC236}">
-                  <a16:creationId xmlns:a16="http://schemas.microsoft.com/office/drawing/2014/main" xmlns="" id="{CDD96C4F-5BE1-43BA-8DB6-5FEE2B3EB6E6}"/>
+                  <a16:creationId xmlns:a16="http://schemas.microsoft.com/office/drawing/2014/main" id="{CDD96C4F-5BE1-43BA-8DB6-5FEE2B3EB6E6}"/>
                 </a:ext>
               </a:extLst>
             </p:cNvPr>
@@ -14792,7 +15229,7 @@
             <p:cNvPr id="44" name="Picture 43">
               <a:extLst>
                 <a:ext uri="{FF2B5EF4-FFF2-40B4-BE49-F238E27FC236}">
-                  <a16:creationId xmlns:a16="http://schemas.microsoft.com/office/drawing/2014/main" xmlns="" id="{B5C3D809-3A9F-48E4-B7BC-DE3CB599A47A}"/>
+                  <a16:creationId xmlns:a16="http://schemas.microsoft.com/office/drawing/2014/main" id="{B5C3D809-3A9F-48E4-B7BC-DE3CB599A47A}"/>
                 </a:ext>
               </a:extLst>
             </p:cNvPr>
@@ -14823,7 +15260,7 @@
           <p:cNvPr id="54" name="Group 53">
             <a:extLst>
               <a:ext uri="{FF2B5EF4-FFF2-40B4-BE49-F238E27FC236}">
-                <a16:creationId xmlns:a16="http://schemas.microsoft.com/office/drawing/2014/main" xmlns="" id="{BCF30871-21B3-48E6-AF0A-B1C7AEA0486C}"/>
+                <a16:creationId xmlns:a16="http://schemas.microsoft.com/office/drawing/2014/main" id="{BCF30871-21B3-48E6-AF0A-B1C7AEA0486C}"/>
               </a:ext>
             </a:extLst>
           </p:cNvPr>
@@ -14843,7 +15280,7 @@
             <p:cNvPr id="48" name="Picture 47">
               <a:extLst>
                 <a:ext uri="{FF2B5EF4-FFF2-40B4-BE49-F238E27FC236}">
-                  <a16:creationId xmlns:a16="http://schemas.microsoft.com/office/drawing/2014/main" xmlns="" id="{98955F26-E032-4414-AC41-08B23C83E1B1}"/>
+                  <a16:creationId xmlns:a16="http://schemas.microsoft.com/office/drawing/2014/main" id="{98955F26-E032-4414-AC41-08B23C83E1B1}"/>
                 </a:ext>
               </a:extLst>
             </p:cNvPr>
@@ -14873,7 +15310,7 @@
             <p:cNvPr id="51" name="Picture 50">
               <a:extLst>
                 <a:ext uri="{FF2B5EF4-FFF2-40B4-BE49-F238E27FC236}">
-                  <a16:creationId xmlns:a16="http://schemas.microsoft.com/office/drawing/2014/main" xmlns="" id="{2211F5CE-FF82-4CB3-8978-232A634C806A}"/>
+                  <a16:creationId xmlns:a16="http://schemas.microsoft.com/office/drawing/2014/main" id="{2211F5CE-FF82-4CB3-8978-232A634C806A}"/>
                 </a:ext>
               </a:extLst>
             </p:cNvPr>
@@ -14904,7 +15341,7 @@
           <p:cNvPr id="57" name="Group 56">
             <a:extLst>
               <a:ext uri="{FF2B5EF4-FFF2-40B4-BE49-F238E27FC236}">
-                <a16:creationId xmlns:a16="http://schemas.microsoft.com/office/drawing/2014/main" xmlns="" id="{C6FDC599-09A6-494A-B5F3-2818D8EDFA39}"/>
+                <a16:creationId xmlns:a16="http://schemas.microsoft.com/office/drawing/2014/main" id="{C6FDC599-09A6-494A-B5F3-2818D8EDFA39}"/>
               </a:ext>
             </a:extLst>
           </p:cNvPr>
@@ -14924,7 +15361,7 @@
             <p:cNvPr id="53" name="Picture 52">
               <a:extLst>
                 <a:ext uri="{FF2B5EF4-FFF2-40B4-BE49-F238E27FC236}">
-                  <a16:creationId xmlns:a16="http://schemas.microsoft.com/office/drawing/2014/main" xmlns="" id="{955F8024-CF14-4879-A987-8E06EEC20502}"/>
+                  <a16:creationId xmlns:a16="http://schemas.microsoft.com/office/drawing/2014/main" id="{955F8024-CF14-4879-A987-8E06EEC20502}"/>
                 </a:ext>
               </a:extLst>
             </p:cNvPr>
@@ -14954,7 +15391,7 @@
             <p:cNvPr id="56" name="Picture 55">
               <a:extLst>
                 <a:ext uri="{FF2B5EF4-FFF2-40B4-BE49-F238E27FC236}">
-                  <a16:creationId xmlns:a16="http://schemas.microsoft.com/office/drawing/2014/main" xmlns="" id="{A4968ABD-F50F-442D-9DE5-B89CC3F83911}"/>
+                  <a16:creationId xmlns:a16="http://schemas.microsoft.com/office/drawing/2014/main" id="{A4968ABD-F50F-442D-9DE5-B89CC3F83911}"/>
                 </a:ext>
               </a:extLst>
             </p:cNvPr>
@@ -14985,7 +15422,7 @@
           <p:cNvPr id="58" name="Oval 57">
             <a:extLst>
               <a:ext uri="{FF2B5EF4-FFF2-40B4-BE49-F238E27FC236}">
-                <a16:creationId xmlns:a16="http://schemas.microsoft.com/office/drawing/2014/main" xmlns="" id="{D6934066-C814-4DA2-9079-F35A6D24E678}"/>
+                <a16:creationId xmlns:a16="http://schemas.microsoft.com/office/drawing/2014/main" id="{D6934066-C814-4DA2-9079-F35A6D24E678}"/>
               </a:ext>
             </a:extLst>
           </p:cNvPr>
@@ -15037,7 +15474,7 @@
           <p:cNvPr id="59" name="Oval 58">
             <a:extLst>
               <a:ext uri="{FF2B5EF4-FFF2-40B4-BE49-F238E27FC236}">
-                <a16:creationId xmlns:a16="http://schemas.microsoft.com/office/drawing/2014/main" xmlns="" id="{703BAF30-4110-4251-8C09-1EA7F295A048}"/>
+                <a16:creationId xmlns:a16="http://schemas.microsoft.com/office/drawing/2014/main" id="{703BAF30-4110-4251-8C09-1EA7F295A048}"/>
               </a:ext>
             </a:extLst>
           </p:cNvPr>
@@ -15089,7 +15526,7 @@
           <p:cNvPr id="63" name="Oval 62">
             <a:extLst>
               <a:ext uri="{FF2B5EF4-FFF2-40B4-BE49-F238E27FC236}">
-                <a16:creationId xmlns:a16="http://schemas.microsoft.com/office/drawing/2014/main" xmlns="" id="{0DF3AAE4-0A13-4EDF-99B0-9D3D89847E9C}"/>
+                <a16:creationId xmlns:a16="http://schemas.microsoft.com/office/drawing/2014/main" id="{0DF3AAE4-0A13-4EDF-99B0-9D3D89847E9C}"/>
               </a:ext>
             </a:extLst>
           </p:cNvPr>
@@ -15141,7 +15578,7 @@
           <p:cNvPr id="64" name="Oval 63">
             <a:extLst>
               <a:ext uri="{FF2B5EF4-FFF2-40B4-BE49-F238E27FC236}">
-                <a16:creationId xmlns:a16="http://schemas.microsoft.com/office/drawing/2014/main" xmlns="" id="{1A669D65-5CF6-4087-9C1F-64196C203439}"/>
+                <a16:creationId xmlns:a16="http://schemas.microsoft.com/office/drawing/2014/main" id="{1A669D65-5CF6-4087-9C1F-64196C203439}"/>
               </a:ext>
             </a:extLst>
           </p:cNvPr>
@@ -15193,7 +15630,7 @@
           <p:cNvPr id="68" name="Picture 67">
             <a:extLst>
               <a:ext uri="{FF2B5EF4-FFF2-40B4-BE49-F238E27FC236}">
-                <a16:creationId xmlns:a16="http://schemas.microsoft.com/office/drawing/2014/main" xmlns="" id="{4866FD42-FD7C-4EFD-9490-FCE0EF499369}"/>
+                <a16:creationId xmlns:a16="http://schemas.microsoft.com/office/drawing/2014/main" id="{4866FD42-FD7C-4EFD-9490-FCE0EF499369}"/>
               </a:ext>
             </a:extLst>
           </p:cNvPr>
@@ -15223,10 +15660,10 @@
           <p:cNvPr id="21" name="Straight Connector 20">
             <a:extLst>
               <a:ext uri="{FF2B5EF4-FFF2-40B4-BE49-F238E27FC236}">
-                <a16:creationId xmlns:a16="http://schemas.microsoft.com/office/drawing/2014/main" xmlns="" id="{6BB95237-D011-401C-95B1-5A19EA228178}"/>
+                <a16:creationId xmlns:a16="http://schemas.microsoft.com/office/drawing/2014/main" id="{6BB95237-D011-401C-95B1-5A19EA228178}"/>
               </a:ext>
               <a:ext uri="{C183D7F6-B498-43B3-948B-1728B52AA6E4}">
-                <adec:decorative xmlns:adec="http://schemas.microsoft.com/office/drawing/2017/decorative" xmlns="" val="1"/>
+                <adec:decorative xmlns:adec="http://schemas.microsoft.com/office/drawing/2017/decorative" val="1"/>
               </a:ext>
             </a:extLst>
           </p:cNvPr>
@@ -15269,7 +15706,7 @@
           <p:cNvPr id="27" name="Content Placeholder 3">
             <a:extLst>
               <a:ext uri="{FF2B5EF4-FFF2-40B4-BE49-F238E27FC236}">
-                <a16:creationId xmlns:a16="http://schemas.microsoft.com/office/drawing/2014/main" xmlns="" id="{68A35ECC-5465-4390-A8E9-0D23E5452C9E}"/>
+                <a16:creationId xmlns:a16="http://schemas.microsoft.com/office/drawing/2014/main" id="{68A35ECC-5465-4390-A8E9-0D23E5452C9E}"/>
               </a:ext>
             </a:extLst>
           </p:cNvPr>
@@ -15490,7 +15927,7 @@
           <p:cNvPr id="28" name="Content Placeholder 3">
             <a:extLst>
               <a:ext uri="{FF2B5EF4-FFF2-40B4-BE49-F238E27FC236}">
-                <a16:creationId xmlns:a16="http://schemas.microsoft.com/office/drawing/2014/main" xmlns="" id="{10990B43-D99C-461B-A9DD-6AD9790AC309}"/>
+                <a16:creationId xmlns:a16="http://schemas.microsoft.com/office/drawing/2014/main" id="{10990B43-D99C-461B-A9DD-6AD9790AC309}"/>
               </a:ext>
             </a:extLst>
           </p:cNvPr>
@@ -15711,7 +16148,7 @@
           <p:cNvPr id="29" name="Content Placeholder 3">
             <a:extLst>
               <a:ext uri="{FF2B5EF4-FFF2-40B4-BE49-F238E27FC236}">
-                <a16:creationId xmlns:a16="http://schemas.microsoft.com/office/drawing/2014/main" xmlns="" id="{986661CA-815A-4EBB-AD48-9854CD5ACF32}"/>
+                <a16:creationId xmlns:a16="http://schemas.microsoft.com/office/drawing/2014/main" id="{986661CA-815A-4EBB-AD48-9854CD5ACF32}"/>
               </a:ext>
             </a:extLst>
           </p:cNvPr>
@@ -15930,7 +16367,7 @@
     </p:spTree>
     <p:extLst>
       <p:ext uri="{BB962C8B-B14F-4D97-AF65-F5344CB8AC3E}">
-        <p14:creationId xmlns:p14="http://schemas.microsoft.com/office/powerpoint/2010/main" xmlns="" val="3482574865"/>
+        <p14:creationId xmlns:p14="http://schemas.microsoft.com/office/powerpoint/2010/main" val="3482574865"/>
       </p:ext>
     </p:extLst>
   </p:cSld>
@@ -15962,7 +16399,7 @@
           <p:cNvPr id="5" name="Slide Number Placeholder 4">
             <a:extLst>
               <a:ext uri="{FF2B5EF4-FFF2-40B4-BE49-F238E27FC236}">
-                <a16:creationId xmlns:a16="http://schemas.microsoft.com/office/drawing/2014/main" xmlns="" id="{3619E243-D955-4AE4-B703-304B0F84084C}"/>
+                <a16:creationId xmlns:a16="http://schemas.microsoft.com/office/drawing/2014/main" id="{3619E243-D955-4AE4-B703-304B0F84084C}"/>
               </a:ext>
             </a:extLst>
           </p:cNvPr>
@@ -15992,7 +16429,7 @@
           <p:cNvPr id="8" name="Slide Number Placeholder 7">
             <a:extLst>
               <a:ext uri="{FF2B5EF4-FFF2-40B4-BE49-F238E27FC236}">
-                <a16:creationId xmlns:a16="http://schemas.microsoft.com/office/drawing/2014/main" xmlns="" id="{0236769E-456C-43C6-A61C-40F4605FF104}"/>
+                <a16:creationId xmlns:a16="http://schemas.microsoft.com/office/drawing/2014/main" id="{0236769E-456C-43C6-A61C-40F4605FF104}"/>
               </a:ext>
             </a:extLst>
           </p:cNvPr>
@@ -16146,7 +16583,7 @@
           <p:cNvPr id="9" name="Title 1">
             <a:extLst>
               <a:ext uri="{FF2B5EF4-FFF2-40B4-BE49-F238E27FC236}">
-                <a16:creationId xmlns:a16="http://schemas.microsoft.com/office/drawing/2014/main" xmlns="" id="{E48FA59A-DB7D-4710-8F64-BC1D5081BD78}"/>
+                <a16:creationId xmlns:a16="http://schemas.microsoft.com/office/drawing/2014/main" id="{E48FA59A-DB7D-4710-8F64-BC1D5081BD78}"/>
               </a:ext>
             </a:extLst>
           </p:cNvPr>
@@ -16179,7 +16616,7 @@
           <p:cNvPr id="6" name="TextBox 5">
             <a:extLst>
               <a:ext uri="{FF2B5EF4-FFF2-40B4-BE49-F238E27FC236}">
-                <a16:creationId xmlns:a16="http://schemas.microsoft.com/office/drawing/2014/main" xmlns="" id="{670BF1CA-2543-421C-96D2-7F350F6134B6}"/>
+                <a16:creationId xmlns:a16="http://schemas.microsoft.com/office/drawing/2014/main" id="{670BF1CA-2543-421C-96D2-7F350F6134B6}"/>
               </a:ext>
             </a:extLst>
           </p:cNvPr>
@@ -16211,7 +16648,7 @@
           <p:cNvPr id="23" name="Picture 22">
             <a:extLst>
               <a:ext uri="{FF2B5EF4-FFF2-40B4-BE49-F238E27FC236}">
-                <a16:creationId xmlns:a16="http://schemas.microsoft.com/office/drawing/2014/main" xmlns="" id="{F53331A6-6440-41AC-9DBC-DB1CE2FAA676}"/>
+                <a16:creationId xmlns:a16="http://schemas.microsoft.com/office/drawing/2014/main" id="{F53331A6-6440-41AC-9DBC-DB1CE2FAA676}"/>
               </a:ext>
             </a:extLst>
           </p:cNvPr>
@@ -16241,7 +16678,7 @@
           <p:cNvPr id="25" name="Picture 24">
             <a:extLst>
               <a:ext uri="{FF2B5EF4-FFF2-40B4-BE49-F238E27FC236}">
-                <a16:creationId xmlns:a16="http://schemas.microsoft.com/office/drawing/2014/main" xmlns="" id="{FC72A46A-89C1-4E1D-B008-3FC7ADCA4541}"/>
+                <a16:creationId xmlns:a16="http://schemas.microsoft.com/office/drawing/2014/main" id="{FC72A46A-89C1-4E1D-B008-3FC7ADCA4541}"/>
               </a:ext>
             </a:extLst>
           </p:cNvPr>
@@ -16271,7 +16708,7 @@
           <p:cNvPr id="27" name="Picture 26">
             <a:extLst>
               <a:ext uri="{FF2B5EF4-FFF2-40B4-BE49-F238E27FC236}">
-                <a16:creationId xmlns:a16="http://schemas.microsoft.com/office/drawing/2014/main" xmlns="" id="{0296572B-D6B6-4FB0-8B35-9E784A9DFB1E}"/>
+                <a16:creationId xmlns:a16="http://schemas.microsoft.com/office/drawing/2014/main" id="{0296572B-D6B6-4FB0-8B35-9E784A9DFB1E}"/>
               </a:ext>
             </a:extLst>
           </p:cNvPr>
@@ -16301,7 +16738,7 @@
           <p:cNvPr id="29" name="Picture 28">
             <a:extLst>
               <a:ext uri="{FF2B5EF4-FFF2-40B4-BE49-F238E27FC236}">
-                <a16:creationId xmlns:a16="http://schemas.microsoft.com/office/drawing/2014/main" xmlns="" id="{A0435FE2-C704-4212-B6BA-8F2664973950}"/>
+                <a16:creationId xmlns:a16="http://schemas.microsoft.com/office/drawing/2014/main" id="{A0435FE2-C704-4212-B6BA-8F2664973950}"/>
               </a:ext>
             </a:extLst>
           </p:cNvPr>
@@ -16331,7 +16768,7 @@
           <p:cNvPr id="31" name="Picture 30">
             <a:extLst>
               <a:ext uri="{FF2B5EF4-FFF2-40B4-BE49-F238E27FC236}">
-                <a16:creationId xmlns:a16="http://schemas.microsoft.com/office/drawing/2014/main" xmlns="" id="{E5BBC4F1-B3C2-4AC7-B1CA-B35500183320}"/>
+                <a16:creationId xmlns:a16="http://schemas.microsoft.com/office/drawing/2014/main" id="{E5BBC4F1-B3C2-4AC7-B1CA-B35500183320}"/>
               </a:ext>
             </a:extLst>
           </p:cNvPr>
@@ -16361,7 +16798,7 @@
           <p:cNvPr id="33" name="Picture 32">
             <a:extLst>
               <a:ext uri="{FF2B5EF4-FFF2-40B4-BE49-F238E27FC236}">
-                <a16:creationId xmlns:a16="http://schemas.microsoft.com/office/drawing/2014/main" xmlns="" id="{AD7B9FA3-D7B7-4CFB-ABD1-066EB43AD9F7}"/>
+                <a16:creationId xmlns:a16="http://schemas.microsoft.com/office/drawing/2014/main" id="{AD7B9FA3-D7B7-4CFB-ABD1-066EB43AD9F7}"/>
               </a:ext>
             </a:extLst>
           </p:cNvPr>
@@ -16391,10 +16828,10 @@
           <p:cNvPr id="34" name="Straight Connector 33">
             <a:extLst>
               <a:ext uri="{FF2B5EF4-FFF2-40B4-BE49-F238E27FC236}">
-                <a16:creationId xmlns:a16="http://schemas.microsoft.com/office/drawing/2014/main" xmlns="" id="{A2969C37-9D22-48E3-AE9F-E6528D6D8EAA}"/>
+                <a16:creationId xmlns:a16="http://schemas.microsoft.com/office/drawing/2014/main" id="{A2969C37-9D22-48E3-AE9F-E6528D6D8EAA}"/>
               </a:ext>
               <a:ext uri="{C183D7F6-B498-43B3-948B-1728B52AA6E4}">
-                <adec:decorative xmlns:adec="http://schemas.microsoft.com/office/drawing/2017/decorative" xmlns="" val="1"/>
+                <adec:decorative xmlns:adec="http://schemas.microsoft.com/office/drawing/2017/decorative" val="1"/>
               </a:ext>
             </a:extLst>
           </p:cNvPr>
@@ -16437,7 +16874,7 @@
           <p:cNvPr id="36" name="Content Placeholder 3">
             <a:extLst>
               <a:ext uri="{FF2B5EF4-FFF2-40B4-BE49-F238E27FC236}">
-                <a16:creationId xmlns:a16="http://schemas.microsoft.com/office/drawing/2014/main" xmlns="" id="{0D28850F-1799-44FB-B2A4-A786BB518E45}"/>
+                <a16:creationId xmlns:a16="http://schemas.microsoft.com/office/drawing/2014/main" id="{0D28850F-1799-44FB-B2A4-A786BB518E45}"/>
               </a:ext>
             </a:extLst>
           </p:cNvPr>
@@ -16658,7 +17095,7 @@
           <p:cNvPr id="37" name="Content Placeholder 3">
             <a:extLst>
               <a:ext uri="{FF2B5EF4-FFF2-40B4-BE49-F238E27FC236}">
-                <a16:creationId xmlns:a16="http://schemas.microsoft.com/office/drawing/2014/main" xmlns="" id="{878FE281-3159-4FD6-B882-1E3663078BE1}"/>
+                <a16:creationId xmlns:a16="http://schemas.microsoft.com/office/drawing/2014/main" id="{878FE281-3159-4FD6-B882-1E3663078BE1}"/>
               </a:ext>
             </a:extLst>
           </p:cNvPr>
@@ -16879,7 +17316,7 @@
           <p:cNvPr id="38" name="Content Placeholder 3">
             <a:extLst>
               <a:ext uri="{FF2B5EF4-FFF2-40B4-BE49-F238E27FC236}">
-                <a16:creationId xmlns:a16="http://schemas.microsoft.com/office/drawing/2014/main" xmlns="" id="{33A762FE-CD5B-46AB-83AA-508B74D1E20B}"/>
+                <a16:creationId xmlns:a16="http://schemas.microsoft.com/office/drawing/2014/main" id="{33A762FE-CD5B-46AB-83AA-508B74D1E20B}"/>
               </a:ext>
             </a:extLst>
           </p:cNvPr>
@@ -17098,7 +17535,7 @@
     </p:spTree>
     <p:extLst>
       <p:ext uri="{BB962C8B-B14F-4D97-AF65-F5344CB8AC3E}">
-        <p14:creationId xmlns:p14="http://schemas.microsoft.com/office/powerpoint/2010/main" xmlns="" val="1526961389"/>
+        <p14:creationId xmlns:p14="http://schemas.microsoft.com/office/powerpoint/2010/main" val="1526961389"/>
       </p:ext>
     </p:extLst>
   </p:cSld>
@@ -17130,7 +17567,7 @@
           <p:cNvPr id="5" name="Slide Number Placeholder 4">
             <a:extLst>
               <a:ext uri="{FF2B5EF4-FFF2-40B4-BE49-F238E27FC236}">
-                <a16:creationId xmlns:a16="http://schemas.microsoft.com/office/drawing/2014/main" xmlns="" id="{3619E243-D955-4AE4-B703-304B0F84084C}"/>
+                <a16:creationId xmlns:a16="http://schemas.microsoft.com/office/drawing/2014/main" id="{3619E243-D955-4AE4-B703-304B0F84084C}"/>
               </a:ext>
             </a:extLst>
           </p:cNvPr>
@@ -17160,7 +17597,7 @@
           <p:cNvPr id="8" name="Slide Number Placeholder 7">
             <a:extLst>
               <a:ext uri="{FF2B5EF4-FFF2-40B4-BE49-F238E27FC236}">
-                <a16:creationId xmlns:a16="http://schemas.microsoft.com/office/drawing/2014/main" xmlns="" id="{0236769E-456C-43C6-A61C-40F4605FF104}"/>
+                <a16:creationId xmlns:a16="http://schemas.microsoft.com/office/drawing/2014/main" id="{0236769E-456C-43C6-A61C-40F4605FF104}"/>
               </a:ext>
             </a:extLst>
           </p:cNvPr>
@@ -17314,7 +17751,7 @@
           <p:cNvPr id="9" name="Title 1">
             <a:extLst>
               <a:ext uri="{FF2B5EF4-FFF2-40B4-BE49-F238E27FC236}">
-                <a16:creationId xmlns:a16="http://schemas.microsoft.com/office/drawing/2014/main" xmlns="" id="{E48FA59A-DB7D-4710-8F64-BC1D5081BD78}"/>
+                <a16:creationId xmlns:a16="http://schemas.microsoft.com/office/drawing/2014/main" id="{E48FA59A-DB7D-4710-8F64-BC1D5081BD78}"/>
               </a:ext>
             </a:extLst>
           </p:cNvPr>
@@ -17347,7 +17784,7 @@
           <p:cNvPr id="6" name="TextBox 5">
             <a:extLst>
               <a:ext uri="{FF2B5EF4-FFF2-40B4-BE49-F238E27FC236}">
-                <a16:creationId xmlns:a16="http://schemas.microsoft.com/office/drawing/2014/main" xmlns="" id="{670BF1CA-2543-421C-96D2-7F350F6134B6}"/>
+                <a16:creationId xmlns:a16="http://schemas.microsoft.com/office/drawing/2014/main" id="{670BF1CA-2543-421C-96D2-7F350F6134B6}"/>
               </a:ext>
             </a:extLst>
           </p:cNvPr>
@@ -17379,7 +17816,7 @@
           <p:cNvPr id="11" name="Content Placeholder 3">
             <a:extLst>
               <a:ext uri="{FF2B5EF4-FFF2-40B4-BE49-F238E27FC236}">
-                <a16:creationId xmlns:a16="http://schemas.microsoft.com/office/drawing/2014/main" xmlns="" id="{D5AA547A-F650-443F-896D-9E738C82E914}"/>
+                <a16:creationId xmlns:a16="http://schemas.microsoft.com/office/drawing/2014/main" id="{D5AA547A-F650-443F-896D-9E738C82E914}"/>
               </a:ext>
             </a:extLst>
           </p:cNvPr>
@@ -17425,7 +17862,7 @@
           <p:cNvPr id="13" name="Picture 12">
             <a:extLst>
               <a:ext uri="{FF2B5EF4-FFF2-40B4-BE49-F238E27FC236}">
-                <a16:creationId xmlns:a16="http://schemas.microsoft.com/office/drawing/2014/main" xmlns="" id="{E1CE9B4F-EFAD-4207-88E1-7AA2D0C742A2}"/>
+                <a16:creationId xmlns:a16="http://schemas.microsoft.com/office/drawing/2014/main" id="{E1CE9B4F-EFAD-4207-88E1-7AA2D0C742A2}"/>
               </a:ext>
             </a:extLst>
           </p:cNvPr>
@@ -17455,7 +17892,7 @@
           <p:cNvPr id="15" name="Picture 14">
             <a:extLst>
               <a:ext uri="{FF2B5EF4-FFF2-40B4-BE49-F238E27FC236}">
-                <a16:creationId xmlns:a16="http://schemas.microsoft.com/office/drawing/2014/main" xmlns="" id="{4FF2F658-4199-448B-9B5F-086D75EB3108}"/>
+                <a16:creationId xmlns:a16="http://schemas.microsoft.com/office/drawing/2014/main" id="{4FF2F658-4199-448B-9B5F-086D75EB3108}"/>
               </a:ext>
             </a:extLst>
           </p:cNvPr>
@@ -17485,7 +17922,7 @@
           <p:cNvPr id="16" name="Oval 15">
             <a:extLst>
               <a:ext uri="{FF2B5EF4-FFF2-40B4-BE49-F238E27FC236}">
-                <a16:creationId xmlns:a16="http://schemas.microsoft.com/office/drawing/2014/main" xmlns="" id="{98B5438F-DF49-42B0-9EC0-49EF5EB832AD}"/>
+                <a16:creationId xmlns:a16="http://schemas.microsoft.com/office/drawing/2014/main" id="{98B5438F-DF49-42B0-9EC0-49EF5EB832AD}"/>
               </a:ext>
             </a:extLst>
           </p:cNvPr>
@@ -17537,7 +17974,7 @@
           <p:cNvPr id="19" name="Picture 18">
             <a:extLst>
               <a:ext uri="{FF2B5EF4-FFF2-40B4-BE49-F238E27FC236}">
-                <a16:creationId xmlns:a16="http://schemas.microsoft.com/office/drawing/2014/main" xmlns="" id="{F905CAE8-9FD1-4ACF-9011-52074C65BA3B}"/>
+                <a16:creationId xmlns:a16="http://schemas.microsoft.com/office/drawing/2014/main" id="{F905CAE8-9FD1-4ACF-9011-52074C65BA3B}"/>
               </a:ext>
             </a:extLst>
           </p:cNvPr>
@@ -17567,7 +18004,7 @@
           <p:cNvPr id="22" name="Picture 21">
             <a:extLst>
               <a:ext uri="{FF2B5EF4-FFF2-40B4-BE49-F238E27FC236}">
-                <a16:creationId xmlns:a16="http://schemas.microsoft.com/office/drawing/2014/main" xmlns="" id="{6B2FA535-CB4B-4FAF-B484-851058BF086E}"/>
+                <a16:creationId xmlns:a16="http://schemas.microsoft.com/office/drawing/2014/main" id="{6B2FA535-CB4B-4FAF-B484-851058BF086E}"/>
               </a:ext>
             </a:extLst>
           </p:cNvPr>
@@ -17597,7 +18034,7 @@
           <p:cNvPr id="24" name="Title 1">
             <a:extLst>
               <a:ext uri="{FF2B5EF4-FFF2-40B4-BE49-F238E27FC236}">
-                <a16:creationId xmlns:a16="http://schemas.microsoft.com/office/drawing/2014/main" xmlns="" id="{0D754BF6-BF8E-4687-9865-09EAB5DC7CFD}"/>
+                <a16:creationId xmlns:a16="http://schemas.microsoft.com/office/drawing/2014/main" id="{0D754BF6-BF8E-4687-9865-09EAB5DC7CFD}"/>
               </a:ext>
             </a:extLst>
           </p:cNvPr>
@@ -17654,7 +18091,7 @@
           <p:cNvPr id="25" name="Content Placeholder 3">
             <a:extLst>
               <a:ext uri="{FF2B5EF4-FFF2-40B4-BE49-F238E27FC236}">
-                <a16:creationId xmlns:a16="http://schemas.microsoft.com/office/drawing/2014/main" xmlns="" id="{A61E7D75-1A09-49CD-BDEB-0C9A4215174F}"/>
+                <a16:creationId xmlns:a16="http://schemas.microsoft.com/office/drawing/2014/main" id="{A61E7D75-1A09-49CD-BDEB-0C9A4215174F}"/>
               </a:ext>
             </a:extLst>
           </p:cNvPr>
@@ -17877,7 +18314,7 @@
           <p:cNvPr id="27" name="Picture 26">
             <a:extLst>
               <a:ext uri="{FF2B5EF4-FFF2-40B4-BE49-F238E27FC236}">
-                <a16:creationId xmlns:a16="http://schemas.microsoft.com/office/drawing/2014/main" xmlns="" id="{239E92B1-9139-46CF-8D08-1FC1B1CA2783}"/>
+                <a16:creationId xmlns:a16="http://schemas.microsoft.com/office/drawing/2014/main" id="{239E92B1-9139-46CF-8D08-1FC1B1CA2783}"/>
               </a:ext>
             </a:extLst>
           </p:cNvPr>
@@ -17907,10 +18344,10 @@
           <p:cNvPr id="29" name="Straight Connector 28">
             <a:extLst>
               <a:ext uri="{FF2B5EF4-FFF2-40B4-BE49-F238E27FC236}">
-                <a16:creationId xmlns:a16="http://schemas.microsoft.com/office/drawing/2014/main" xmlns="" id="{66866B60-CB42-412F-B062-D17EE9410A7E}"/>
+                <a16:creationId xmlns:a16="http://schemas.microsoft.com/office/drawing/2014/main" id="{66866B60-CB42-412F-B062-D17EE9410A7E}"/>
               </a:ext>
               <a:ext uri="{C183D7F6-B498-43B3-948B-1728B52AA6E4}">
-                <adec:decorative xmlns:adec="http://schemas.microsoft.com/office/drawing/2017/decorative" xmlns="" val="1"/>
+                <adec:decorative xmlns:adec="http://schemas.microsoft.com/office/drawing/2017/decorative" val="1"/>
               </a:ext>
             </a:extLst>
           </p:cNvPr>
@@ -17953,7 +18390,7 @@
           <p:cNvPr id="30" name="Content Placeholder 3">
             <a:extLst>
               <a:ext uri="{FF2B5EF4-FFF2-40B4-BE49-F238E27FC236}">
-                <a16:creationId xmlns:a16="http://schemas.microsoft.com/office/drawing/2014/main" xmlns="" id="{D52A9914-D0DC-4339-8F19-A95AD16B3BBE}"/>
+                <a16:creationId xmlns:a16="http://schemas.microsoft.com/office/drawing/2014/main" id="{D52A9914-D0DC-4339-8F19-A95AD16B3BBE}"/>
               </a:ext>
             </a:extLst>
           </p:cNvPr>
@@ -18172,7 +18609,7 @@
     </p:spTree>
     <p:extLst>
       <p:ext uri="{BB962C8B-B14F-4D97-AF65-F5344CB8AC3E}">
-        <p14:creationId xmlns:p14="http://schemas.microsoft.com/office/powerpoint/2010/main" xmlns="" val="2845700815"/>
+        <p14:creationId xmlns:p14="http://schemas.microsoft.com/office/powerpoint/2010/main" val="2845700815"/>
       </p:ext>
     </p:extLst>
   </p:cSld>
@@ -18204,7 +18641,7 @@
           <p:cNvPr id="2" name="Slide Number Placeholder 1">
             <a:extLst>
               <a:ext uri="{FF2B5EF4-FFF2-40B4-BE49-F238E27FC236}">
-                <a16:creationId xmlns:a16="http://schemas.microsoft.com/office/drawing/2014/main" xmlns="" id="{16BF22C9-9DC8-43E8-B3E8-CD041AA94AC9}"/>
+                <a16:creationId xmlns:a16="http://schemas.microsoft.com/office/drawing/2014/main" id="{16BF22C9-9DC8-43E8-B3E8-CD041AA94AC9}"/>
               </a:ext>
             </a:extLst>
           </p:cNvPr>
@@ -18234,7 +18671,7 @@
           <p:cNvPr id="4" name="TextBox 3">
             <a:extLst>
               <a:ext uri="{FF2B5EF4-FFF2-40B4-BE49-F238E27FC236}">
-                <a16:creationId xmlns:a16="http://schemas.microsoft.com/office/drawing/2014/main" xmlns="" id="{75715AFF-E512-4821-A4C0-57DAFDAC2209}"/>
+                <a16:creationId xmlns:a16="http://schemas.microsoft.com/office/drawing/2014/main" id="{75715AFF-E512-4821-A4C0-57DAFDAC2209}"/>
               </a:ext>
             </a:extLst>
           </p:cNvPr>
@@ -18287,7 +18724,7 @@
           <p:cNvPr id="5" name="TextBox 4">
             <a:extLst>
               <a:ext uri="{FF2B5EF4-FFF2-40B4-BE49-F238E27FC236}">
-                <a16:creationId xmlns:a16="http://schemas.microsoft.com/office/drawing/2014/main" xmlns="" id="{355DA77E-2D37-47DE-AC0E-1B2363CBBB4D}"/>
+                <a16:creationId xmlns:a16="http://schemas.microsoft.com/office/drawing/2014/main" id="{355DA77E-2D37-47DE-AC0E-1B2363CBBB4D}"/>
               </a:ext>
             </a:extLst>
           </p:cNvPr>
@@ -18635,7 +19072,7 @@
           <p:cNvPr id="1026" name="Picture 2">
             <a:extLst>
               <a:ext uri="{FF2B5EF4-FFF2-40B4-BE49-F238E27FC236}">
-                <a16:creationId xmlns:a16="http://schemas.microsoft.com/office/drawing/2014/main" xmlns="" id="{8AA19932-93F3-430A-BF0C-6B904F225C29}"/>
+                <a16:creationId xmlns:a16="http://schemas.microsoft.com/office/drawing/2014/main" id="{8AA19932-93F3-430A-BF0C-6B904F225C29}"/>
               </a:ext>
             </a:extLst>
           </p:cNvPr>
@@ -18648,7 +19085,7 @@
           <a:blip r:embed="rId2">
             <a:extLst>
               <a:ext uri="{28A0092B-C50C-407E-A947-70E740481C1C}">
-                <a14:useLocalDpi xmlns:a14="http://schemas.microsoft.com/office/drawing/2010/main" xmlns="" val="0"/>
+                <a14:useLocalDpi xmlns:a14="http://schemas.microsoft.com/office/drawing/2010/main" val="0"/>
               </a:ext>
             </a:extLst>
           </a:blip>
@@ -18668,7 +19105,7 @@
           <a:noFill/>
           <a:extLst>
             <a:ext uri="{909E8E84-426E-40DD-AFC4-6F175D3DCCD1}">
-              <a14:hiddenFill xmlns:a14="http://schemas.microsoft.com/office/drawing/2010/main" xmlns="">
+              <a14:hiddenFill xmlns:a14="http://schemas.microsoft.com/office/drawing/2010/main">
                 <a:solidFill>
                   <a:srgbClr val="FFFFFF"/>
                 </a:solidFill>
@@ -18682,7 +19119,7 @@
           <p:cNvPr id="6" name="Rectangle 3">
             <a:extLst>
               <a:ext uri="{FF2B5EF4-FFF2-40B4-BE49-F238E27FC236}">
-                <a16:creationId xmlns:a16="http://schemas.microsoft.com/office/drawing/2014/main" xmlns="" id="{A8FFB588-8322-430F-B6C6-02F8AE930103}"/>
+                <a16:creationId xmlns:a16="http://schemas.microsoft.com/office/drawing/2014/main" id="{A8FFB588-8322-430F-B6C6-02F8AE930103}"/>
               </a:ext>
             </a:extLst>
           </p:cNvPr>
@@ -18708,7 +19145,7 @@
           <a:effectLst/>
           <a:extLst>
             <a:ext uri="{91240B29-F687-4F45-9708-019B960494DF}">
-              <a14:hiddenLine xmlns:a14="http://schemas.microsoft.com/office/drawing/2010/main" xmlns="" w="9525">
+              <a14:hiddenLine xmlns:a14="http://schemas.microsoft.com/office/drawing/2010/main" w="9525">
                 <a:solidFill>
                   <a:schemeClr val="tx1"/>
                 </a:solidFill>
@@ -18718,7 +19155,7 @@
               </a14:hiddenLine>
             </a:ext>
             <a:ext uri="{AF507438-7753-43E0-B8FC-AC1667EBCBE1}">
-              <a14:hiddenEffects xmlns:a14="http://schemas.microsoft.com/office/drawing/2010/main" xmlns="">
+              <a14:hiddenEffects xmlns:a14="http://schemas.microsoft.com/office/drawing/2010/main">
                 <a:effectLst>
                   <a:outerShdw dist="35921" dir="2700000" algn="ctr" rotWithShape="0">
                     <a:schemeClr val="bg2"/>
@@ -19071,7 +19508,7 @@
           <p:cNvPr id="7" name="Slide Number Placeholder 7">
             <a:extLst>
               <a:ext uri="{FF2B5EF4-FFF2-40B4-BE49-F238E27FC236}">
-                <a16:creationId xmlns:a16="http://schemas.microsoft.com/office/drawing/2014/main" xmlns="" id="{42313B9F-057A-4433-80B1-ED7395791A63}"/>
+                <a16:creationId xmlns:a16="http://schemas.microsoft.com/office/drawing/2014/main" id="{42313B9F-057A-4433-80B1-ED7395791A63}"/>
               </a:ext>
             </a:extLst>
           </p:cNvPr>
@@ -19223,7 +19660,7 @@
     </p:spTree>
     <p:extLst>
       <p:ext uri="{BB962C8B-B14F-4D97-AF65-F5344CB8AC3E}">
-        <p14:creationId xmlns:p14="http://schemas.microsoft.com/office/powerpoint/2010/main" xmlns="" val="2057684991"/>
+        <p14:creationId xmlns:p14="http://schemas.microsoft.com/office/powerpoint/2010/main" val="2057684991"/>
       </p:ext>
     </p:extLst>
   </p:cSld>
@@ -19255,7 +19692,7 @@
           <p:cNvPr id="2" name="Slide Number Placeholder 1">
             <a:extLst>
               <a:ext uri="{FF2B5EF4-FFF2-40B4-BE49-F238E27FC236}">
-                <a16:creationId xmlns:a16="http://schemas.microsoft.com/office/drawing/2014/main" xmlns="" id="{AFB15717-A03D-4CCF-966B-3D22DA72EA32}"/>
+                <a16:creationId xmlns:a16="http://schemas.microsoft.com/office/drawing/2014/main" id="{AFB15717-A03D-4CCF-966B-3D22DA72EA32}"/>
               </a:ext>
             </a:extLst>
           </p:cNvPr>
@@ -19285,7 +19722,7 @@
           <p:cNvPr id="4" name="Picture 3">
             <a:extLst>
               <a:ext uri="{FF2B5EF4-FFF2-40B4-BE49-F238E27FC236}">
-                <a16:creationId xmlns:a16="http://schemas.microsoft.com/office/drawing/2014/main" xmlns="" id="{4C91F91F-55C9-44EE-A85D-240FCC243341}"/>
+                <a16:creationId xmlns:a16="http://schemas.microsoft.com/office/drawing/2014/main" id="{4C91F91F-55C9-44EE-A85D-240FCC243341}"/>
               </a:ext>
             </a:extLst>
           </p:cNvPr>
@@ -19315,7 +19752,7 @@
           <p:cNvPr id="8" name="Picture 7">
             <a:extLst>
               <a:ext uri="{FF2B5EF4-FFF2-40B4-BE49-F238E27FC236}">
-                <a16:creationId xmlns:a16="http://schemas.microsoft.com/office/drawing/2014/main" xmlns="" id="{1B33C79B-D0CA-4F61-981F-7C0518C0F631}"/>
+                <a16:creationId xmlns:a16="http://schemas.microsoft.com/office/drawing/2014/main" id="{1B33C79B-D0CA-4F61-981F-7C0518C0F631}"/>
               </a:ext>
             </a:extLst>
           </p:cNvPr>
@@ -19345,7 +19782,7 @@
           <p:cNvPr id="10" name="Picture 9">
             <a:extLst>
               <a:ext uri="{FF2B5EF4-FFF2-40B4-BE49-F238E27FC236}">
-                <a16:creationId xmlns:a16="http://schemas.microsoft.com/office/drawing/2014/main" xmlns="" id="{BD67DF74-C640-4980-8718-0831C2ED42C3}"/>
+                <a16:creationId xmlns:a16="http://schemas.microsoft.com/office/drawing/2014/main" id="{BD67DF74-C640-4980-8718-0831C2ED42C3}"/>
               </a:ext>
             </a:extLst>
           </p:cNvPr>
@@ -19375,7 +19812,7 @@
           <p:cNvPr id="12" name="Picture 11">
             <a:extLst>
               <a:ext uri="{FF2B5EF4-FFF2-40B4-BE49-F238E27FC236}">
-                <a16:creationId xmlns:a16="http://schemas.microsoft.com/office/drawing/2014/main" xmlns="" id="{9AB2FD7E-E3DC-4B9E-8062-C52E4945B389}"/>
+                <a16:creationId xmlns:a16="http://schemas.microsoft.com/office/drawing/2014/main" id="{9AB2FD7E-E3DC-4B9E-8062-C52E4945B389}"/>
               </a:ext>
             </a:extLst>
           </p:cNvPr>
@@ -19405,7 +19842,7 @@
           <p:cNvPr id="14" name="Picture 13">
             <a:extLst>
               <a:ext uri="{FF2B5EF4-FFF2-40B4-BE49-F238E27FC236}">
-                <a16:creationId xmlns:a16="http://schemas.microsoft.com/office/drawing/2014/main" xmlns="" id="{CD178CE3-4CD5-47A6-901E-E790AC2AE0C7}"/>
+                <a16:creationId xmlns:a16="http://schemas.microsoft.com/office/drawing/2014/main" id="{CD178CE3-4CD5-47A6-901E-E790AC2AE0C7}"/>
               </a:ext>
             </a:extLst>
           </p:cNvPr>
@@ -19435,7 +19872,7 @@
           <p:cNvPr id="9" name="Slide Number Placeholder 7">
             <a:extLst>
               <a:ext uri="{FF2B5EF4-FFF2-40B4-BE49-F238E27FC236}">
-                <a16:creationId xmlns:a16="http://schemas.microsoft.com/office/drawing/2014/main" xmlns="" id="{ACDA56EA-7368-4D9E-A81E-130F0AD041C6}"/>
+                <a16:creationId xmlns:a16="http://schemas.microsoft.com/office/drawing/2014/main" id="{ACDA56EA-7368-4D9E-A81E-130F0AD041C6}"/>
               </a:ext>
             </a:extLst>
           </p:cNvPr>
@@ -19589,7 +20026,7 @@
           <p:cNvPr id="11" name="Title 1">
             <a:extLst>
               <a:ext uri="{FF2B5EF4-FFF2-40B4-BE49-F238E27FC236}">
-                <a16:creationId xmlns:a16="http://schemas.microsoft.com/office/drawing/2014/main" xmlns="" id="{8A3A0F85-C8CB-427B-9BD3-B9433C6A20ED}"/>
+                <a16:creationId xmlns:a16="http://schemas.microsoft.com/office/drawing/2014/main" id="{8A3A0F85-C8CB-427B-9BD3-B9433C6A20ED}"/>
               </a:ext>
             </a:extLst>
           </p:cNvPr>
@@ -19644,7 +20081,7 @@
     </p:spTree>
     <p:extLst>
       <p:ext uri="{BB962C8B-B14F-4D97-AF65-F5344CB8AC3E}">
-        <p14:creationId xmlns:p14="http://schemas.microsoft.com/office/powerpoint/2010/main" xmlns="" val="1203794036"/>
+        <p14:creationId xmlns:p14="http://schemas.microsoft.com/office/powerpoint/2010/main" val="1203794036"/>
       </p:ext>
     </p:extLst>
   </p:cSld>
@@ -19676,7 +20113,7 @@
           <p:cNvPr id="2" name="Slide Number Placeholder 1">
             <a:extLst>
               <a:ext uri="{FF2B5EF4-FFF2-40B4-BE49-F238E27FC236}">
-                <a16:creationId xmlns:a16="http://schemas.microsoft.com/office/drawing/2014/main" xmlns="" id="{6407C489-92E6-45FA-AE67-FEDBB0F1DD65}"/>
+                <a16:creationId xmlns:a16="http://schemas.microsoft.com/office/drawing/2014/main" id="{6407C489-92E6-45FA-AE67-FEDBB0F1DD65}"/>
               </a:ext>
             </a:extLst>
           </p:cNvPr>
@@ -19706,7 +20143,7 @@
           <p:cNvPr id="4" name="Picture 3">
             <a:extLst>
               <a:ext uri="{FF2B5EF4-FFF2-40B4-BE49-F238E27FC236}">
-                <a16:creationId xmlns:a16="http://schemas.microsoft.com/office/drawing/2014/main" xmlns="" id="{93C16F60-860D-4AF1-BCD8-0BF92B99FE89}"/>
+                <a16:creationId xmlns:a16="http://schemas.microsoft.com/office/drawing/2014/main" id="{93C16F60-860D-4AF1-BCD8-0BF92B99FE89}"/>
               </a:ext>
             </a:extLst>
           </p:cNvPr>
@@ -19736,7 +20173,7 @@
           <p:cNvPr id="5" name="Picture 4">
             <a:extLst>
               <a:ext uri="{FF2B5EF4-FFF2-40B4-BE49-F238E27FC236}">
-                <a16:creationId xmlns:a16="http://schemas.microsoft.com/office/drawing/2014/main" xmlns="" id="{C665E6E7-3F93-4F2F-BEC8-0962A47F18FB}"/>
+                <a16:creationId xmlns:a16="http://schemas.microsoft.com/office/drawing/2014/main" id="{C665E6E7-3F93-4F2F-BEC8-0962A47F18FB}"/>
               </a:ext>
             </a:extLst>
           </p:cNvPr>
@@ -19766,7 +20203,7 @@
           <p:cNvPr id="6" name="Slide Number Placeholder 7">
             <a:extLst>
               <a:ext uri="{FF2B5EF4-FFF2-40B4-BE49-F238E27FC236}">
-                <a16:creationId xmlns:a16="http://schemas.microsoft.com/office/drawing/2014/main" xmlns="" id="{7BBAD219-61F9-4688-B4A8-171F54996B30}"/>
+                <a16:creationId xmlns:a16="http://schemas.microsoft.com/office/drawing/2014/main" id="{7BBAD219-61F9-4688-B4A8-171F54996B30}"/>
               </a:ext>
             </a:extLst>
           </p:cNvPr>
@@ -19920,7 +20357,7 @@
           <p:cNvPr id="7" name="Title 1">
             <a:extLst>
               <a:ext uri="{FF2B5EF4-FFF2-40B4-BE49-F238E27FC236}">
-                <a16:creationId xmlns:a16="http://schemas.microsoft.com/office/drawing/2014/main" xmlns="" id="{F379E157-F74D-45F8-9FD8-299B742F5BB1}"/>
+                <a16:creationId xmlns:a16="http://schemas.microsoft.com/office/drawing/2014/main" id="{F379E157-F74D-45F8-9FD8-299B742F5BB1}"/>
               </a:ext>
             </a:extLst>
           </p:cNvPr>
@@ -19975,7 +20412,7 @@
     </p:spTree>
     <p:extLst>
       <p:ext uri="{BB962C8B-B14F-4D97-AF65-F5344CB8AC3E}">
-        <p14:creationId xmlns:p14="http://schemas.microsoft.com/office/powerpoint/2010/main" xmlns="" val="4149763613"/>
+        <p14:creationId xmlns:p14="http://schemas.microsoft.com/office/powerpoint/2010/main" val="4149763613"/>
       </p:ext>
     </p:extLst>
   </p:cSld>
@@ -20073,20 +20510,12 @@
               <a:buChar char="q"/>
             </a:pPr>
             <a:r>
-              <a:rPr lang="en-US" sz="1600" dirty="0" smtClean="0"/>
-              <a:t>     The</a:t>
-            </a:r>
-            <a:r>
               <a:rPr lang="en-US" sz="1600" dirty="0"/>
-              <a:t> CUME_DIST() is a </a:t>
-            </a:r>
-            <a:r>
-              <a:rPr lang="en-US" sz="1600" b="1" dirty="0" smtClean="0"/>
-              <a:t>window </a:t>
+              <a:t>     The CUME_DIST() is a </a:t>
             </a:r>
             <a:r>
               <a:rPr lang="en-US" sz="1600" b="1" dirty="0"/>
-              <a:t>function</a:t>
+              <a:t>window function</a:t>
             </a:r>
             <a:r>
               <a:rPr lang="en-US" sz="1600" dirty="0"/>
@@ -20094,23 +20523,11 @@
             </a:r>
             <a:r>
               <a:rPr lang="en-US" sz="1600" b="1" dirty="0"/>
-              <a:t>cumulative </a:t>
-            </a:r>
-            <a:r>
-              <a:rPr lang="en-US" sz="1600" b="1" dirty="0" smtClean="0"/>
-              <a:t>distribution</a:t>
-            </a:r>
-            <a:r>
-              <a:rPr lang="en-US" sz="1600" dirty="0" smtClean="0"/>
-              <a:t> of </a:t>
+              <a:t>cumulative distribution</a:t>
             </a:r>
             <a:r>
               <a:rPr lang="en-US" sz="1600" dirty="0"/>
-              <a:t>a value within a set of values. It represents the number of rows with values less than or equal to that row’s value divided by the total number of </a:t>
-            </a:r>
-            <a:r>
-              <a:rPr lang="en-US" sz="1600" dirty="0" smtClean="0"/>
-              <a:t>rows.</a:t>
+              <a:t> of a value within a set of values. It represents the number of rows with values less than or equal to that row’s value divided by the total number of rows.</a:t>
             </a:r>
           </a:p>
           <a:p>
@@ -20119,18 +20536,17 @@
               <a:buChar char="q"/>
             </a:pPr>
             <a:r>
-              <a:rPr lang="en-US" sz="1600" dirty="0" smtClean="0"/>
+              <a:rPr lang="en-US" sz="1600" dirty="0"/>
               <a:t>     The returned value of the CUME_DIST() function is greater than zero and less than or equal one </a:t>
             </a:r>
             <a:r>
-              <a:rPr lang="en-US" sz="1600" b="1" dirty="0" smtClean="0"/>
+              <a:rPr lang="en-US" sz="1600" b="1" dirty="0"/>
               <a:t>(0 &lt; CUME_DIST() &lt;= 1). </a:t>
             </a:r>
             <a:r>
-              <a:rPr lang="en-US" sz="1600" dirty="0" smtClean="0"/>
+              <a:rPr lang="en-US" sz="1600" dirty="0"/>
               <a:t>The repeated column values receive the same CUME_DIST() value.</a:t>
             </a:r>
-            <a:endParaRPr lang="en-US" sz="1600" dirty="0"/>
           </a:p>
         </p:txBody>
       </p:sp>
@@ -20156,44 +20572,43 @@
           <a:lstStyle/>
           <a:p>
             <a:r>
-              <a:rPr lang="en-US" dirty="0" smtClean="0"/>
+              <a:rPr lang="en-US" dirty="0"/>
               <a:t>CUME_DIST() OVER (</a:t>
             </a:r>
           </a:p>
           <a:p>
             <a:r>
-              <a:rPr lang="en-US" dirty="0" smtClean="0"/>
+              <a:rPr lang="en-US" dirty="0"/>
               <a:t>	PARTITION BY </a:t>
             </a:r>
             <a:r>
-              <a:rPr lang="en-US" dirty="0" err="1" smtClean="0"/>
+              <a:rPr lang="en-US" dirty="0" err="1"/>
               <a:t>expr</a:t>
             </a:r>
             <a:r>
-              <a:rPr lang="en-US" dirty="0" smtClean="0"/>
+              <a:rPr lang="en-US" dirty="0"/>
               <a:t>, ...</a:t>
             </a:r>
           </a:p>
           <a:p>
             <a:r>
-              <a:rPr lang="en-US" dirty="0" smtClean="0"/>
+              <a:rPr lang="en-US" dirty="0"/>
               <a:t>	ORDER BY </a:t>
             </a:r>
             <a:r>
-              <a:rPr lang="en-US" dirty="0" err="1" smtClean="0"/>
+              <a:rPr lang="en-US" dirty="0" err="1"/>
               <a:t>expr</a:t>
             </a:r>
             <a:r>
-              <a:rPr lang="en-US" dirty="0" smtClean="0"/>
+              <a:rPr lang="en-US" dirty="0"/>
               <a:t> [ASC | DESC], ...</a:t>
             </a:r>
           </a:p>
           <a:p>
             <a:r>
-              <a:rPr lang="en-US" dirty="0" smtClean="0"/>
+              <a:rPr lang="en-US" dirty="0"/>
               <a:t>)</a:t>
             </a:r>
-            <a:endParaRPr lang="en-US" dirty="0"/>
           </a:p>
         </p:txBody>
       </p:sp>
@@ -20220,10 +20635,9 @@
           <a:lstStyle/>
           <a:p>
             <a:r>
-              <a:rPr lang="en-US" dirty="0" smtClean="0"/>
+              <a:rPr lang="en-US" dirty="0"/>
               <a:t>SYNTAX</a:t>
             </a:r>
-            <a:endParaRPr lang="en-US" dirty="0"/>
           </a:p>
         </p:txBody>
       </p:sp>
@@ -20274,12 +20688,8 @@
               <a:buChar char="q"/>
             </a:pPr>
             <a:r>
-              <a:rPr lang="en-US" sz="1600" dirty="0" smtClean="0"/>
-              <a:t>      In </a:t>
-            </a:r>
-            <a:r>
               <a:rPr lang="en-US" sz="1600" dirty="0"/>
-              <a:t>this syntax, the  </a:t>
+              <a:t>      In this syntax, the  </a:t>
             </a:r>
             <a:r>
               <a:rPr lang="en-US" sz="1600" b="1" dirty="0"/>
@@ -20302,12 +20712,8 @@
               <a:buChar char="q"/>
             </a:pPr>
             <a:r>
-              <a:rPr lang="en-US" sz="1600" dirty="0" smtClean="0"/>
-              <a:t>     The</a:t>
-            </a:r>
-            <a:r>
               <a:rPr lang="en-US" sz="1600" dirty="0"/>
-              <a:t> </a:t>
+              <a:t>     The </a:t>
             </a:r>
             <a:r>
               <a:rPr lang="en-US" sz="1600" b="1" dirty="0"/>
@@ -20404,7 +20810,7 @@
               </a:spcBef>
             </a:pPr>
             <a:r>
-              <a:rPr lang="en-US" sz="4300" b="1" dirty="0" err="1" smtClean="0">
+              <a:rPr lang="en-US" sz="4300" b="1" dirty="0" err="1">
                 <a:solidFill>
                   <a:schemeClr val="accent2">
                     <a:lumMod val="50000"/>
@@ -20417,7 +20823,7 @@
               <a:t>cume_dist</a:t>
             </a:r>
             <a:r>
-              <a:rPr lang="en-US" sz="4300" b="1" dirty="0" smtClean="0">
+              <a:rPr lang="en-US" sz="4300" b="1" dirty="0">
                 <a:solidFill>
                   <a:schemeClr val="accent2">
                     <a:lumMod val="50000"/>
@@ -20429,16 +20835,160 @@
               </a:rPr>
               <a:t>()</a:t>
             </a:r>
-            <a:endParaRPr lang="en-US" sz="4300" b="1" dirty="0">
-              <a:solidFill>
+          </a:p>
+        </p:txBody>
+      </p:sp>
+      <p:sp>
+        <p:nvSpPr>
+          <p:cNvPr id="10" name="Slide Number Placeholder 7">
+            <a:extLst>
+              <a:ext uri="{FF2B5EF4-FFF2-40B4-BE49-F238E27FC236}">
+                <a16:creationId xmlns:a16="http://schemas.microsoft.com/office/drawing/2014/main" id="{F6E98C88-30F0-429D-AA85-2D2FB49CFDCD}"/>
+              </a:ext>
+            </a:extLst>
+          </p:cNvPr>
+          <p:cNvSpPr txBox="1">
+            <a:spLocks/>
+          </p:cNvSpPr>
+          <p:nvPr/>
+        </p:nvSpPr>
+        <p:spPr>
+          <a:xfrm>
+            <a:off x="7806812" y="6689019"/>
+            <a:ext cx="3785419" cy="155729"/>
+          </a:xfrm>
+          <a:prstGeom prst="rect">
+            <a:avLst/>
+          </a:prstGeom>
+          <a:gradFill>
+            <a:gsLst>
+              <a:gs pos="87598">
+                <a:schemeClr val="accent5">
+                  <a:lumMod val="75000"/>
+                </a:schemeClr>
+              </a:gs>
+              <a:gs pos="0">
+                <a:schemeClr val="accent4">
+                  <a:lumMod val="60000"/>
+                  <a:lumOff val="40000"/>
+                </a:schemeClr>
+              </a:gs>
+              <a:gs pos="47000">
                 <a:schemeClr val="accent2">
-                  <a:lumMod val="50000"/>
+                  <a:lumMod val="75000"/>
+                  <a:shade val="67500"/>
+                  <a:satMod val="115000"/>
                 </a:schemeClr>
-              </a:solidFill>
-              <a:latin typeface="+mj-lt"/>
-              <a:ea typeface="+mj-ea"/>
-              <a:cs typeface="+mj-cs"/>
-            </a:endParaRPr>
+              </a:gs>
+              <a:gs pos="100000">
+                <a:schemeClr val="accent1"/>
+              </a:gs>
+            </a:gsLst>
+            <a:lin ang="10800000" scaled="0"/>
+          </a:gradFill>
+        </p:spPr>
+        <p:txBody>
+          <a:bodyPr vert="horz" lIns="0" tIns="0" rIns="72000" bIns="0" rtlCol="0" anchor="ctr"/>
+          <a:lstStyle>
+            <a:defPPr>
+              <a:defRPr lang="en-US"/>
+            </a:defPPr>
+            <a:lvl1pPr marL="0" algn="r" defTabSz="914400" rtl="0" eaLnBrk="1" latinLnBrk="0" hangingPunct="1">
+              <a:defRPr sz="1200" kern="1200">
+                <a:solidFill>
+                  <a:schemeClr val="bg1"/>
+                </a:solidFill>
+                <a:latin typeface="+mj-lt"/>
+                <a:ea typeface="+mn-ea"/>
+                <a:cs typeface="+mn-cs"/>
+              </a:defRPr>
+            </a:lvl1pPr>
+            <a:lvl2pPr marL="457200" algn="l" defTabSz="914400" rtl="0" eaLnBrk="1" latinLnBrk="0" hangingPunct="1">
+              <a:defRPr sz="1800" kern="1200">
+                <a:solidFill>
+                  <a:schemeClr val="tx1"/>
+                </a:solidFill>
+                <a:latin typeface="+mn-lt"/>
+                <a:ea typeface="+mn-ea"/>
+                <a:cs typeface="+mn-cs"/>
+              </a:defRPr>
+            </a:lvl2pPr>
+            <a:lvl3pPr marL="914400" algn="l" defTabSz="914400" rtl="0" eaLnBrk="1" latinLnBrk="0" hangingPunct="1">
+              <a:defRPr sz="1800" kern="1200">
+                <a:solidFill>
+                  <a:schemeClr val="tx1"/>
+                </a:solidFill>
+                <a:latin typeface="+mn-lt"/>
+                <a:ea typeface="+mn-ea"/>
+                <a:cs typeface="+mn-cs"/>
+              </a:defRPr>
+            </a:lvl3pPr>
+            <a:lvl4pPr marL="1371600" algn="l" defTabSz="914400" rtl="0" eaLnBrk="1" latinLnBrk="0" hangingPunct="1">
+              <a:defRPr sz="1800" kern="1200">
+                <a:solidFill>
+                  <a:schemeClr val="tx1"/>
+                </a:solidFill>
+                <a:latin typeface="+mn-lt"/>
+                <a:ea typeface="+mn-ea"/>
+                <a:cs typeface="+mn-cs"/>
+              </a:defRPr>
+            </a:lvl4pPr>
+            <a:lvl5pPr marL="1828800" algn="l" defTabSz="914400" rtl="0" eaLnBrk="1" latinLnBrk="0" hangingPunct="1">
+              <a:defRPr sz="1800" kern="1200">
+                <a:solidFill>
+                  <a:schemeClr val="tx1"/>
+                </a:solidFill>
+                <a:latin typeface="+mn-lt"/>
+                <a:ea typeface="+mn-ea"/>
+                <a:cs typeface="+mn-cs"/>
+              </a:defRPr>
+            </a:lvl5pPr>
+            <a:lvl6pPr marL="2286000" algn="l" defTabSz="914400" rtl="0" eaLnBrk="1" latinLnBrk="0" hangingPunct="1">
+              <a:defRPr sz="1800" kern="1200">
+                <a:solidFill>
+                  <a:schemeClr val="tx1"/>
+                </a:solidFill>
+                <a:latin typeface="+mn-lt"/>
+                <a:ea typeface="+mn-ea"/>
+                <a:cs typeface="+mn-cs"/>
+              </a:defRPr>
+            </a:lvl6pPr>
+            <a:lvl7pPr marL="2743200" algn="l" defTabSz="914400" rtl="0" eaLnBrk="1" latinLnBrk="0" hangingPunct="1">
+              <a:defRPr sz="1800" kern="1200">
+                <a:solidFill>
+                  <a:schemeClr val="tx1"/>
+                </a:solidFill>
+                <a:latin typeface="+mn-lt"/>
+                <a:ea typeface="+mn-ea"/>
+                <a:cs typeface="+mn-cs"/>
+              </a:defRPr>
+            </a:lvl7pPr>
+            <a:lvl8pPr marL="3200400" algn="l" defTabSz="914400" rtl="0" eaLnBrk="1" latinLnBrk="0" hangingPunct="1">
+              <a:defRPr sz="1800" kern="1200">
+                <a:solidFill>
+                  <a:schemeClr val="tx1"/>
+                </a:solidFill>
+                <a:latin typeface="+mn-lt"/>
+                <a:ea typeface="+mn-ea"/>
+                <a:cs typeface="+mn-cs"/>
+              </a:defRPr>
+            </a:lvl8pPr>
+            <a:lvl9pPr marL="3657600" algn="l" defTabSz="914400" rtl="0" eaLnBrk="1" latinLnBrk="0" hangingPunct="1">
+              <a:defRPr sz="1800" kern="1200">
+                <a:solidFill>
+                  <a:schemeClr val="tx1"/>
+                </a:solidFill>
+                <a:latin typeface="+mn-lt"/>
+                <a:ea typeface="+mn-ea"/>
+                <a:cs typeface="+mn-cs"/>
+              </a:defRPr>
+            </a:lvl9pPr>
+          </a:lstStyle>
+          <a:p>
+            <a:r>
+              <a:rPr lang="en-US" dirty="0"/>
+              <a:t>PES Data Science Presentation</a:t>
+            </a:r>
           </a:p>
         </p:txBody>
       </p:sp>
@@ -20447,13 +20997,6 @@
   <p:clrMapOvr>
     <a:masterClrMapping/>
   </p:clrMapOvr>
-  <p:timing>
-    <p:tnLst>
-      <p:par>
-        <p:cTn id="1" dur="indefinite" restart="never" nodeType="tmRoot"/>
-      </p:par>
-    </p:tnLst>
-  </p:timing>
 </p:sld>
 </file>
 
@@ -20682,7 +21225,7 @@
   <a:extraClrSchemeLst/>
   <a:extLst>
     <a:ext uri="{05A4C25C-085E-4340-85A3-A5531E510DB2}">
-      <thm15:themeFamily xmlns:thm15="http://schemas.microsoft.com/office/thememl/2012/main" xmlns="" name="TF78043420_Science fair presentation_RVA_v3.potx" id="{29D4BD8F-7488-49D9-BFBB-7DF8C2B0292D}" vid="{799E8309-D02B-4451-A1B1-915D5FF07E1C}"/>
+      <thm15:themeFamily xmlns:thm15="http://schemas.microsoft.com/office/thememl/2012/main" name="TF78043420_Science fair presentation_RVA_v3.potx" id="{29D4BD8F-7488-49D9-BFBB-7DF8C2B0292D}" vid="{799E8309-D02B-4451-A1B1-915D5FF07E1C}"/>
     </a:ext>
   </a:extLst>
 </a:theme>
@@ -20977,7 +21520,7 @@
   <a:extraClrSchemeLst/>
   <a:extLst>
     <a:ext uri="{05A4C25C-085E-4340-85A3-A5531E510DB2}">
-      <thm15:themeFamily xmlns:thm15="http://schemas.microsoft.com/office/thememl/2012/main" xmlns="" name="Office Theme" id="{62F939B6-93AF-4DB8-9C6B-D6C7DFDC589F}" vid="{4A3C46E8-61CC-4603-A589-7422A47A8E4A}"/>
+      <thm15:themeFamily xmlns:thm15="http://schemas.microsoft.com/office/thememl/2012/main" name="Office Theme" id="{62F939B6-93AF-4DB8-9C6B-D6C7DFDC589F}" vid="{4A3C46E8-61CC-4603-A589-7422A47A8E4A}"/>
     </a:ext>
   </a:extLst>
 </a:theme>
@@ -21272,7 +21815,7 @@
   <a:extraClrSchemeLst/>
   <a:extLst>
     <a:ext uri="{05A4C25C-085E-4340-85A3-A5531E510DB2}">
-      <thm15:themeFamily xmlns:thm15="http://schemas.microsoft.com/office/thememl/2012/main" xmlns="" name="Office Theme" id="{62F939B6-93AF-4DB8-9C6B-D6C7DFDC589F}" vid="{4A3C46E8-61CC-4603-A589-7422A47A8E4A}"/>
+      <thm15:themeFamily xmlns:thm15="http://schemas.microsoft.com/office/thememl/2012/main" name="Office Theme" id="{62F939B6-93AF-4DB8-9C6B-D6C7DFDC589F}" vid="{4A3C46E8-61CC-4603-A589-7422A47A8E4A}"/>
     </a:ext>
   </a:extLst>
 </a:theme>

</xml_diff>

<commit_message>
new file:   medicine/dense_rank.sql 	modified:   presentation/medicine.pptx
</commit_message>
<xml_diff>
--- a/presentation/medicine.pptx
+++ b/presentation/medicine.pptx
@@ -5,10 +5,10 @@
     <p:sldMasterId id="2147483648" r:id="rId1"/>
   </p:sldMasterIdLst>
   <p:notesMasterIdLst>
-    <p:notesMasterId r:id="rId15"/>
+    <p:notesMasterId r:id="rId17"/>
   </p:notesMasterIdLst>
   <p:handoutMasterIdLst>
-    <p:handoutMasterId r:id="rId16"/>
+    <p:handoutMasterId r:id="rId18"/>
   </p:handoutMasterIdLst>
   <p:sldIdLst>
     <p:sldId id="257" r:id="rId2"/>
@@ -23,7 +23,9 @@
     <p:sldId id="278" r:id="rId11"/>
     <p:sldId id="279" r:id="rId12"/>
     <p:sldId id="280" r:id="rId13"/>
-    <p:sldId id="265" r:id="rId14"/>
+    <p:sldId id="281" r:id="rId14"/>
+    <p:sldId id="282" r:id="rId15"/>
+    <p:sldId id="265" r:id="rId16"/>
   </p:sldIdLst>
   <p:sldSz cx="12192000" cy="6858000"/>
   <p:notesSz cx="6858000" cy="9144000"/>
@@ -9742,6 +9744,800 @@
 </file>
 
 <file path=ppt/slides/slide13.xml><?xml version="1.0" encoding="utf-8"?>
+<p:sld xmlns:a="http://schemas.openxmlformats.org/drawingml/2006/main" xmlns:r="http://schemas.openxmlformats.org/officeDocument/2006/relationships" xmlns:p="http://schemas.openxmlformats.org/presentationml/2006/main">
+  <p:cSld>
+    <p:spTree>
+      <p:nvGrpSpPr>
+        <p:cNvPr id="1" name=""/>
+        <p:cNvGrpSpPr/>
+        <p:nvPr/>
+      </p:nvGrpSpPr>
+      <p:grpSpPr>
+        <a:xfrm>
+          <a:off x="0" y="0"/>
+          <a:ext cx="0" cy="0"/>
+          <a:chOff x="0" y="0"/>
+          <a:chExt cx="0" cy="0"/>
+        </a:xfrm>
+      </p:grpSpPr>
+      <p:sp>
+        <p:nvSpPr>
+          <p:cNvPr id="6" name="Rounded Rectangle 5"/>
+          <p:cNvSpPr/>
+          <p:nvPr/>
+        </p:nvSpPr>
+        <p:spPr>
+          <a:xfrm>
+            <a:off x="3662276" y="3143779"/>
+            <a:ext cx="6240693" cy="1416157"/>
+          </a:xfrm>
+          <a:prstGeom prst="roundRect">
+            <a:avLst/>
+          </a:prstGeom>
+          <a:solidFill>
+            <a:schemeClr val="accent3">
+              <a:lumMod val="40000"/>
+              <a:lumOff val="60000"/>
+            </a:schemeClr>
+          </a:solidFill>
+        </p:spPr>
+        <p:style>
+          <a:lnRef idx="1">
+            <a:schemeClr val="accent5"/>
+          </a:lnRef>
+          <a:fillRef idx="2">
+            <a:schemeClr val="accent5"/>
+          </a:fillRef>
+          <a:effectRef idx="1">
+            <a:schemeClr val="accent5"/>
+          </a:effectRef>
+          <a:fontRef idx="minor">
+            <a:schemeClr val="dk1"/>
+          </a:fontRef>
+        </p:style>
+        <p:txBody>
+          <a:bodyPr lIns="121914" tIns="60957" rIns="121914" bIns="60957" rtlCol="0" anchor="ctr"/>
+          <a:lstStyle/>
+          <a:p>
+            <a:pPr algn="ctr"/>
+            <a:endParaRPr lang="en-US"/>
+          </a:p>
+        </p:txBody>
+      </p:sp>
+      <p:sp>
+        <p:nvSpPr>
+          <p:cNvPr id="4" name="TextBox 3"/>
+          <p:cNvSpPr txBox="1"/>
+          <p:nvPr/>
+        </p:nvSpPr>
+        <p:spPr>
+          <a:xfrm>
+            <a:off x="335360" y="1246477"/>
+            <a:ext cx="11521280" cy="1169545"/>
+          </a:xfrm>
+          <a:prstGeom prst="rect">
+            <a:avLst/>
+          </a:prstGeom>
+          <a:noFill/>
+        </p:spPr>
+        <p:txBody>
+          <a:bodyPr wrap="square" lIns="121914" tIns="60957" rIns="121914" bIns="60957" rtlCol="0">
+            <a:spAutoFit/>
+          </a:bodyPr>
+          <a:lstStyle/>
+          <a:p>
+            <a:pPr algn="just">
+              <a:buFont typeface="Wingdings" pitchFamily="2" charset="2"/>
+              <a:buChar char="q"/>
+            </a:pPr>
+            <a:r>
+              <a:rPr lang="en-US" sz="1600" dirty="0"/>
+              <a:t>The DENSE_RANK() is a window function that assigns a rank to each row within a partition or result set with no gaps in ranking values.</a:t>
+            </a:r>
+          </a:p>
+          <a:p>
+            <a:pPr algn="just">
+              <a:buFont typeface="Wingdings" pitchFamily="2" charset="2"/>
+              <a:buChar char="q"/>
+            </a:pPr>
+            <a:r>
+              <a:rPr lang="en-US" dirty="0"/>
+              <a:t>The rank of a row is increased by one from the number of distinct rank values which come before the row.</a:t>
+            </a:r>
+            <a:r>
+              <a:rPr lang="en-US" sz="1600" dirty="0"/>
+              <a:t>.</a:t>
+            </a:r>
+          </a:p>
+        </p:txBody>
+      </p:sp>
+      <p:sp>
+        <p:nvSpPr>
+          <p:cNvPr id="5" name="Rectangle 4"/>
+          <p:cNvSpPr/>
+          <p:nvPr/>
+        </p:nvSpPr>
+        <p:spPr>
+          <a:xfrm>
+            <a:off x="3758285" y="3254271"/>
+            <a:ext cx="6096000" cy="1231100"/>
+          </a:xfrm>
+          <a:prstGeom prst="rect">
+            <a:avLst/>
+          </a:prstGeom>
+        </p:spPr>
+        <p:txBody>
+          <a:bodyPr lIns="121914" tIns="60957" rIns="121914" bIns="60957">
+            <a:spAutoFit/>
+          </a:bodyPr>
+          <a:lstStyle/>
+          <a:p>
+            <a:r>
+              <a:rPr lang="en-US" dirty="0"/>
+              <a:t>DENSE_RANK() OVER ( PARTITION BY &lt;expression&gt;[{,&lt;expression&gt;...}] ORDER BY &lt;expression&gt; [ASC|DESC], [{,&lt;expression&gt;...}] )</a:t>
+            </a:r>
+          </a:p>
+        </p:txBody>
+      </p:sp>
+      <p:sp>
+        <p:nvSpPr>
+          <p:cNvPr id="7" name="TextBox 6"/>
+          <p:cNvSpPr txBox="1"/>
+          <p:nvPr/>
+        </p:nvSpPr>
+        <p:spPr>
+          <a:xfrm>
+            <a:off x="1358022" y="3605416"/>
+            <a:ext cx="1082977" cy="400103"/>
+          </a:xfrm>
+          <a:prstGeom prst="rect">
+            <a:avLst/>
+          </a:prstGeom>
+          <a:noFill/>
+        </p:spPr>
+        <p:txBody>
+          <a:bodyPr wrap="none" lIns="121914" tIns="60957" rIns="121914" bIns="60957" rtlCol="0">
+            <a:spAutoFit/>
+          </a:bodyPr>
+          <a:lstStyle/>
+          <a:p>
+            <a:r>
+              <a:rPr lang="en-US" dirty="0"/>
+              <a:t>SYNTAX</a:t>
+            </a:r>
+          </a:p>
+        </p:txBody>
+      </p:sp>
+      <p:sp>
+        <p:nvSpPr>
+          <p:cNvPr id="11265" name="Rectangle 1"/>
+          <p:cNvSpPr>
+            <a:spLocks noChangeArrowheads="1"/>
+          </p:cNvSpPr>
+          <p:nvPr/>
+        </p:nvSpPr>
+        <p:spPr bwMode="auto">
+          <a:xfrm>
+            <a:off x="335361" y="4866452"/>
+            <a:ext cx="11617291" cy="1107990"/>
+          </a:xfrm>
+          <a:prstGeom prst="rect">
+            <a:avLst/>
+          </a:prstGeom>
+          <a:solidFill>
+            <a:srgbClr val="FFFFFF"/>
+          </a:solidFill>
+          <a:ln w="9525">
+            <a:noFill/>
+            <a:miter lim="800000"/>
+            <a:headEnd/>
+            <a:tailEnd/>
+          </a:ln>
+          <a:effectLst/>
+        </p:spPr>
+        <p:txBody>
+          <a:bodyPr vert="horz" wrap="square" lIns="121914" tIns="60957" rIns="121914" bIns="60957" numCol="1" anchor="ctr" anchorCtr="0" compatLnSpc="1">
+            <a:prstTxWarp prst="textNoShape">
+              <a:avLst/>
+            </a:prstTxWarp>
+            <a:spAutoFit/>
+          </a:bodyPr>
+          <a:lstStyle/>
+          <a:p>
+            <a:pPr algn="just" defTabSz="1219140" fontAlgn="base">
+              <a:spcBef>
+                <a:spcPct val="0"/>
+              </a:spcBef>
+              <a:spcAft>
+                <a:spcPct val="0"/>
+              </a:spcAft>
+              <a:buFont typeface="Wingdings" pitchFamily="2" charset="2"/>
+              <a:buChar char="q"/>
+            </a:pPr>
+            <a:r>
+              <a:rPr lang="en-US" sz="1600" dirty="0"/>
+              <a:t> First, the PARTITION BY clause divides the result sets produced by the FROM clause into partitions. The DENSE_RANK() function is applied to each partition.</a:t>
+            </a:r>
+          </a:p>
+          <a:p>
+            <a:pPr algn="just" defTabSz="1219140" fontAlgn="base">
+              <a:spcBef>
+                <a:spcPct val="0"/>
+              </a:spcBef>
+              <a:spcAft>
+                <a:spcPct val="0"/>
+              </a:spcAft>
+              <a:buFont typeface="Wingdings" pitchFamily="2" charset="2"/>
+              <a:buChar char="q"/>
+            </a:pPr>
+            <a:r>
+              <a:rPr lang="en-US" sz="1600" dirty="0"/>
+              <a:t> Second, the ORDER BY  clause specifies the order of rows in each partition on which the DENSE_RANK() function operates.</a:t>
+            </a:r>
+          </a:p>
+        </p:txBody>
+      </p:sp>
+      <p:sp>
+        <p:nvSpPr>
+          <p:cNvPr id="9" name="Right Arrow 8"/>
+          <p:cNvSpPr/>
+          <p:nvPr/>
+        </p:nvSpPr>
+        <p:spPr>
+          <a:xfrm flipV="1">
+            <a:off x="2702169" y="3701134"/>
+            <a:ext cx="672075" cy="246743"/>
+          </a:xfrm>
+          <a:prstGeom prst="rightArrow">
+            <a:avLst/>
+          </a:prstGeom>
+          <a:solidFill>
+            <a:schemeClr val="accent3">
+              <a:lumMod val="40000"/>
+              <a:lumOff val="60000"/>
+            </a:schemeClr>
+          </a:solidFill>
+        </p:spPr>
+        <p:style>
+          <a:lnRef idx="0">
+            <a:schemeClr val="accent5"/>
+          </a:lnRef>
+          <a:fillRef idx="3">
+            <a:schemeClr val="accent5"/>
+          </a:fillRef>
+          <a:effectRef idx="3">
+            <a:schemeClr val="accent5"/>
+          </a:effectRef>
+          <a:fontRef idx="minor">
+            <a:schemeClr val="lt1"/>
+          </a:fontRef>
+        </p:style>
+        <p:txBody>
+          <a:bodyPr lIns="121914" tIns="60957" rIns="121914" bIns="60957" rtlCol="0" anchor="ctr"/>
+          <a:lstStyle/>
+          <a:p>
+            <a:pPr algn="ctr"/>
+            <a:endParaRPr lang="en-US"/>
+          </a:p>
+        </p:txBody>
+      </p:sp>
+      <p:sp>
+        <p:nvSpPr>
+          <p:cNvPr id="8" name="Title 1"/>
+          <p:cNvSpPr txBox="1">
+            <a:spLocks/>
+          </p:cNvSpPr>
+          <p:nvPr/>
+        </p:nvSpPr>
+        <p:spPr>
+          <a:xfrm>
+            <a:off x="2137225" y="300335"/>
+            <a:ext cx="7772400" cy="643096"/>
+          </a:xfrm>
+          <a:prstGeom prst="rect">
+            <a:avLst/>
+          </a:prstGeom>
+        </p:spPr>
+        <p:txBody>
+          <a:bodyPr vert="horz" lIns="0" tIns="0" rIns="0" bIns="0" rtlCol="0" anchor="t">
+            <a:noAutofit/>
+          </a:bodyPr>
+          <a:lstStyle/>
+          <a:p>
+            <a:pPr algn="ctr" defTabSz="914377">
+              <a:lnSpc>
+                <a:spcPct val="90000"/>
+              </a:lnSpc>
+              <a:spcBef>
+                <a:spcPct val="0"/>
+              </a:spcBef>
+            </a:pPr>
+            <a:r>
+              <a:rPr lang="en-US" sz="4300" b="1" dirty="0" err="1">
+                <a:solidFill>
+                  <a:schemeClr val="accent2">
+                    <a:lumMod val="50000"/>
+                  </a:schemeClr>
+                </a:solidFill>
+                <a:latin typeface="+mj-lt"/>
+                <a:ea typeface="+mj-ea"/>
+                <a:cs typeface="+mj-cs"/>
+              </a:rPr>
+              <a:t>Dense_rank</a:t>
+            </a:r>
+            <a:r>
+              <a:rPr lang="en-US" sz="4300" b="1" dirty="0">
+                <a:solidFill>
+                  <a:schemeClr val="accent2">
+                    <a:lumMod val="50000"/>
+                  </a:schemeClr>
+                </a:solidFill>
+                <a:latin typeface="+mj-lt"/>
+                <a:ea typeface="+mj-ea"/>
+                <a:cs typeface="+mj-cs"/>
+              </a:rPr>
+              <a:t>()</a:t>
+            </a:r>
+          </a:p>
+        </p:txBody>
+      </p:sp>
+      <p:sp>
+        <p:nvSpPr>
+          <p:cNvPr id="10" name="Slide Number Placeholder 7">
+            <a:extLst>
+              <a:ext uri="{FF2B5EF4-FFF2-40B4-BE49-F238E27FC236}">
+                <a16:creationId xmlns:a16="http://schemas.microsoft.com/office/drawing/2014/main" id="{F6E98C88-30F0-429D-AA85-2D2FB49CFDCD}"/>
+              </a:ext>
+            </a:extLst>
+          </p:cNvPr>
+          <p:cNvSpPr txBox="1">
+            <a:spLocks/>
+          </p:cNvSpPr>
+          <p:nvPr/>
+        </p:nvSpPr>
+        <p:spPr>
+          <a:xfrm>
+            <a:off x="7806812" y="6689019"/>
+            <a:ext cx="3785419" cy="155729"/>
+          </a:xfrm>
+          <a:prstGeom prst="rect">
+            <a:avLst/>
+          </a:prstGeom>
+          <a:gradFill>
+            <a:gsLst>
+              <a:gs pos="87598">
+                <a:schemeClr val="accent5">
+                  <a:lumMod val="75000"/>
+                </a:schemeClr>
+              </a:gs>
+              <a:gs pos="0">
+                <a:schemeClr val="accent4">
+                  <a:lumMod val="60000"/>
+                  <a:lumOff val="40000"/>
+                </a:schemeClr>
+              </a:gs>
+              <a:gs pos="47000">
+                <a:schemeClr val="accent2">
+                  <a:lumMod val="75000"/>
+                  <a:shade val="67500"/>
+                  <a:satMod val="115000"/>
+                </a:schemeClr>
+              </a:gs>
+              <a:gs pos="100000">
+                <a:schemeClr val="accent1"/>
+              </a:gs>
+            </a:gsLst>
+            <a:lin ang="10800000" scaled="0"/>
+          </a:gradFill>
+        </p:spPr>
+        <p:txBody>
+          <a:bodyPr vert="horz" lIns="0" tIns="0" rIns="72000" bIns="0" rtlCol="0" anchor="ctr"/>
+          <a:lstStyle>
+            <a:defPPr>
+              <a:defRPr lang="en-US"/>
+            </a:defPPr>
+            <a:lvl1pPr marL="0" algn="r" defTabSz="914400" rtl="0" eaLnBrk="1" latinLnBrk="0" hangingPunct="1">
+              <a:defRPr sz="1200" kern="1200">
+                <a:solidFill>
+                  <a:schemeClr val="bg1"/>
+                </a:solidFill>
+                <a:latin typeface="+mj-lt"/>
+                <a:ea typeface="+mn-ea"/>
+                <a:cs typeface="+mn-cs"/>
+              </a:defRPr>
+            </a:lvl1pPr>
+            <a:lvl2pPr marL="457200" algn="l" defTabSz="914400" rtl="0" eaLnBrk="1" latinLnBrk="0" hangingPunct="1">
+              <a:defRPr sz="1800" kern="1200">
+                <a:solidFill>
+                  <a:schemeClr val="tx1"/>
+                </a:solidFill>
+                <a:latin typeface="+mn-lt"/>
+                <a:ea typeface="+mn-ea"/>
+                <a:cs typeface="+mn-cs"/>
+              </a:defRPr>
+            </a:lvl2pPr>
+            <a:lvl3pPr marL="914400" algn="l" defTabSz="914400" rtl="0" eaLnBrk="1" latinLnBrk="0" hangingPunct="1">
+              <a:defRPr sz="1800" kern="1200">
+                <a:solidFill>
+                  <a:schemeClr val="tx1"/>
+                </a:solidFill>
+                <a:latin typeface="+mn-lt"/>
+                <a:ea typeface="+mn-ea"/>
+                <a:cs typeface="+mn-cs"/>
+              </a:defRPr>
+            </a:lvl3pPr>
+            <a:lvl4pPr marL="1371600" algn="l" defTabSz="914400" rtl="0" eaLnBrk="1" latinLnBrk="0" hangingPunct="1">
+              <a:defRPr sz="1800" kern="1200">
+                <a:solidFill>
+                  <a:schemeClr val="tx1"/>
+                </a:solidFill>
+                <a:latin typeface="+mn-lt"/>
+                <a:ea typeface="+mn-ea"/>
+                <a:cs typeface="+mn-cs"/>
+              </a:defRPr>
+            </a:lvl4pPr>
+            <a:lvl5pPr marL="1828800" algn="l" defTabSz="914400" rtl="0" eaLnBrk="1" latinLnBrk="0" hangingPunct="1">
+              <a:defRPr sz="1800" kern="1200">
+                <a:solidFill>
+                  <a:schemeClr val="tx1"/>
+                </a:solidFill>
+                <a:latin typeface="+mn-lt"/>
+                <a:ea typeface="+mn-ea"/>
+                <a:cs typeface="+mn-cs"/>
+              </a:defRPr>
+            </a:lvl5pPr>
+            <a:lvl6pPr marL="2286000" algn="l" defTabSz="914400" rtl="0" eaLnBrk="1" latinLnBrk="0" hangingPunct="1">
+              <a:defRPr sz="1800" kern="1200">
+                <a:solidFill>
+                  <a:schemeClr val="tx1"/>
+                </a:solidFill>
+                <a:latin typeface="+mn-lt"/>
+                <a:ea typeface="+mn-ea"/>
+                <a:cs typeface="+mn-cs"/>
+              </a:defRPr>
+            </a:lvl6pPr>
+            <a:lvl7pPr marL="2743200" algn="l" defTabSz="914400" rtl="0" eaLnBrk="1" latinLnBrk="0" hangingPunct="1">
+              <a:defRPr sz="1800" kern="1200">
+                <a:solidFill>
+                  <a:schemeClr val="tx1"/>
+                </a:solidFill>
+                <a:latin typeface="+mn-lt"/>
+                <a:ea typeface="+mn-ea"/>
+                <a:cs typeface="+mn-cs"/>
+              </a:defRPr>
+            </a:lvl7pPr>
+            <a:lvl8pPr marL="3200400" algn="l" defTabSz="914400" rtl="0" eaLnBrk="1" latinLnBrk="0" hangingPunct="1">
+              <a:defRPr sz="1800" kern="1200">
+                <a:solidFill>
+                  <a:schemeClr val="tx1"/>
+                </a:solidFill>
+                <a:latin typeface="+mn-lt"/>
+                <a:ea typeface="+mn-ea"/>
+                <a:cs typeface="+mn-cs"/>
+              </a:defRPr>
+            </a:lvl8pPr>
+            <a:lvl9pPr marL="3657600" algn="l" defTabSz="914400" rtl="0" eaLnBrk="1" latinLnBrk="0" hangingPunct="1">
+              <a:defRPr sz="1800" kern="1200">
+                <a:solidFill>
+                  <a:schemeClr val="tx1"/>
+                </a:solidFill>
+                <a:latin typeface="+mn-lt"/>
+                <a:ea typeface="+mn-ea"/>
+                <a:cs typeface="+mn-cs"/>
+              </a:defRPr>
+            </a:lvl9pPr>
+          </a:lstStyle>
+          <a:p>
+            <a:r>
+              <a:rPr lang="en-US" dirty="0"/>
+              <a:t>PES Data Science Presentation</a:t>
+            </a:r>
+          </a:p>
+        </p:txBody>
+      </p:sp>
+    </p:spTree>
+    <p:extLst>
+      <p:ext uri="{BB962C8B-B14F-4D97-AF65-F5344CB8AC3E}">
+        <p14:creationId xmlns:p14="http://schemas.microsoft.com/office/powerpoint/2010/main" val="2082223056"/>
+      </p:ext>
+    </p:extLst>
+  </p:cSld>
+  <p:clrMapOvr>
+    <a:masterClrMapping/>
+  </p:clrMapOvr>
+</p:sld>
+</file>
+
+<file path=ppt/slides/slide14.xml><?xml version="1.0" encoding="utf-8"?>
+<p:sld xmlns:a="http://schemas.openxmlformats.org/drawingml/2006/main" xmlns:r="http://schemas.openxmlformats.org/officeDocument/2006/relationships" xmlns:p="http://schemas.openxmlformats.org/presentationml/2006/main">
+  <p:cSld>
+    <p:spTree>
+      <p:nvGrpSpPr>
+        <p:cNvPr id="1" name=""/>
+        <p:cNvGrpSpPr/>
+        <p:nvPr/>
+      </p:nvGrpSpPr>
+      <p:grpSpPr>
+        <a:xfrm>
+          <a:off x="0" y="0"/>
+          <a:ext cx="0" cy="0"/>
+          <a:chOff x="0" y="0"/>
+          <a:chExt cx="0" cy="0"/>
+        </a:xfrm>
+      </p:grpSpPr>
+      <p:sp>
+        <p:nvSpPr>
+          <p:cNvPr id="12" name="Text Placeholder 7"/>
+          <p:cNvSpPr>
+            <a:spLocks noGrp="1"/>
+          </p:cNvSpPr>
+          <p:nvPr>
+            <p:ph type="body" sz="quarter" idx="12"/>
+          </p:nvPr>
+        </p:nvSpPr>
+        <p:spPr>
+          <a:xfrm>
+            <a:off x="693828" y="473385"/>
+            <a:ext cx="11207885" cy="455531"/>
+          </a:xfrm>
+          <a:ln w="28575">
+            <a:noFill/>
+          </a:ln>
+        </p:spPr>
+        <p:txBody>
+          <a:bodyPr/>
+          <a:lstStyle/>
+          <a:p>
+            <a:r>
+              <a:rPr lang="en-US" dirty="0">
+                <a:solidFill>
+                  <a:schemeClr val="tx2">
+                    <a:lumMod val="50000"/>
+                  </a:schemeClr>
+                </a:solidFill>
+              </a:rPr>
+              <a:t>Find Patient appointments:</a:t>
+            </a:r>
+          </a:p>
+          <a:p>
+            <a:endParaRPr lang="en-US" dirty="0">
+              <a:solidFill>
+                <a:schemeClr val="tx2">
+                  <a:lumMod val="50000"/>
+                </a:schemeClr>
+              </a:solidFill>
+            </a:endParaRPr>
+          </a:p>
+        </p:txBody>
+      </p:sp>
+      <p:sp>
+        <p:nvSpPr>
+          <p:cNvPr id="5" name="Slide Number Placeholder 7">
+            <a:extLst>
+              <a:ext uri="{FF2B5EF4-FFF2-40B4-BE49-F238E27FC236}">
+                <a16:creationId xmlns:a16="http://schemas.microsoft.com/office/drawing/2014/main" id="{10280916-1D7D-4356-817E-0F96958B8403}"/>
+              </a:ext>
+            </a:extLst>
+          </p:cNvPr>
+          <p:cNvSpPr txBox="1">
+            <a:spLocks/>
+          </p:cNvSpPr>
+          <p:nvPr/>
+        </p:nvSpPr>
+        <p:spPr>
+          <a:xfrm>
+            <a:off x="7806812" y="6689019"/>
+            <a:ext cx="3785419" cy="155729"/>
+          </a:xfrm>
+          <a:prstGeom prst="rect">
+            <a:avLst/>
+          </a:prstGeom>
+          <a:gradFill>
+            <a:gsLst>
+              <a:gs pos="87598">
+                <a:schemeClr val="accent5">
+                  <a:lumMod val="75000"/>
+                </a:schemeClr>
+              </a:gs>
+              <a:gs pos="0">
+                <a:schemeClr val="accent4">
+                  <a:lumMod val="60000"/>
+                  <a:lumOff val="40000"/>
+                </a:schemeClr>
+              </a:gs>
+              <a:gs pos="47000">
+                <a:schemeClr val="accent2">
+                  <a:lumMod val="75000"/>
+                  <a:shade val="67500"/>
+                  <a:satMod val="115000"/>
+                </a:schemeClr>
+              </a:gs>
+              <a:gs pos="100000">
+                <a:schemeClr val="accent1"/>
+              </a:gs>
+            </a:gsLst>
+            <a:lin ang="10800000" scaled="0"/>
+          </a:gradFill>
+        </p:spPr>
+        <p:txBody>
+          <a:bodyPr vert="horz" lIns="0" tIns="0" rIns="72000" bIns="0" rtlCol="0" anchor="ctr"/>
+          <a:lstStyle>
+            <a:defPPr>
+              <a:defRPr lang="en-US"/>
+            </a:defPPr>
+            <a:lvl1pPr marL="0" algn="r" defTabSz="914400" rtl="0" eaLnBrk="1" latinLnBrk="0" hangingPunct="1">
+              <a:defRPr sz="1200" kern="1200">
+                <a:solidFill>
+                  <a:schemeClr val="bg1"/>
+                </a:solidFill>
+                <a:latin typeface="+mj-lt"/>
+                <a:ea typeface="+mn-ea"/>
+                <a:cs typeface="+mn-cs"/>
+              </a:defRPr>
+            </a:lvl1pPr>
+            <a:lvl2pPr marL="457200" algn="l" defTabSz="914400" rtl="0" eaLnBrk="1" latinLnBrk="0" hangingPunct="1">
+              <a:defRPr sz="1800" kern="1200">
+                <a:solidFill>
+                  <a:schemeClr val="tx1"/>
+                </a:solidFill>
+                <a:latin typeface="+mn-lt"/>
+                <a:ea typeface="+mn-ea"/>
+                <a:cs typeface="+mn-cs"/>
+              </a:defRPr>
+            </a:lvl2pPr>
+            <a:lvl3pPr marL="914400" algn="l" defTabSz="914400" rtl="0" eaLnBrk="1" latinLnBrk="0" hangingPunct="1">
+              <a:defRPr sz="1800" kern="1200">
+                <a:solidFill>
+                  <a:schemeClr val="tx1"/>
+                </a:solidFill>
+                <a:latin typeface="+mn-lt"/>
+                <a:ea typeface="+mn-ea"/>
+                <a:cs typeface="+mn-cs"/>
+              </a:defRPr>
+            </a:lvl3pPr>
+            <a:lvl4pPr marL="1371600" algn="l" defTabSz="914400" rtl="0" eaLnBrk="1" latinLnBrk="0" hangingPunct="1">
+              <a:defRPr sz="1800" kern="1200">
+                <a:solidFill>
+                  <a:schemeClr val="tx1"/>
+                </a:solidFill>
+                <a:latin typeface="+mn-lt"/>
+                <a:ea typeface="+mn-ea"/>
+                <a:cs typeface="+mn-cs"/>
+              </a:defRPr>
+            </a:lvl4pPr>
+            <a:lvl5pPr marL="1828800" algn="l" defTabSz="914400" rtl="0" eaLnBrk="1" latinLnBrk="0" hangingPunct="1">
+              <a:defRPr sz="1800" kern="1200">
+                <a:solidFill>
+                  <a:schemeClr val="tx1"/>
+                </a:solidFill>
+                <a:latin typeface="+mn-lt"/>
+                <a:ea typeface="+mn-ea"/>
+                <a:cs typeface="+mn-cs"/>
+              </a:defRPr>
+            </a:lvl5pPr>
+            <a:lvl6pPr marL="2286000" algn="l" defTabSz="914400" rtl="0" eaLnBrk="1" latinLnBrk="0" hangingPunct="1">
+              <a:defRPr sz="1800" kern="1200">
+                <a:solidFill>
+                  <a:schemeClr val="tx1"/>
+                </a:solidFill>
+                <a:latin typeface="+mn-lt"/>
+                <a:ea typeface="+mn-ea"/>
+                <a:cs typeface="+mn-cs"/>
+              </a:defRPr>
+            </a:lvl6pPr>
+            <a:lvl7pPr marL="2743200" algn="l" defTabSz="914400" rtl="0" eaLnBrk="1" latinLnBrk="0" hangingPunct="1">
+              <a:defRPr sz="1800" kern="1200">
+                <a:solidFill>
+                  <a:schemeClr val="tx1"/>
+                </a:solidFill>
+                <a:latin typeface="+mn-lt"/>
+                <a:ea typeface="+mn-ea"/>
+                <a:cs typeface="+mn-cs"/>
+              </a:defRPr>
+            </a:lvl7pPr>
+            <a:lvl8pPr marL="3200400" algn="l" defTabSz="914400" rtl="0" eaLnBrk="1" latinLnBrk="0" hangingPunct="1">
+              <a:defRPr sz="1800" kern="1200">
+                <a:solidFill>
+                  <a:schemeClr val="tx1"/>
+                </a:solidFill>
+                <a:latin typeface="+mn-lt"/>
+                <a:ea typeface="+mn-ea"/>
+                <a:cs typeface="+mn-cs"/>
+              </a:defRPr>
+            </a:lvl8pPr>
+            <a:lvl9pPr marL="3657600" algn="l" defTabSz="914400" rtl="0" eaLnBrk="1" latinLnBrk="0" hangingPunct="1">
+              <a:defRPr sz="1800" kern="1200">
+                <a:solidFill>
+                  <a:schemeClr val="tx1"/>
+                </a:solidFill>
+                <a:latin typeface="+mn-lt"/>
+                <a:ea typeface="+mn-ea"/>
+                <a:cs typeface="+mn-cs"/>
+              </a:defRPr>
+            </a:lvl9pPr>
+          </a:lstStyle>
+          <a:p>
+            <a:r>
+              <a:rPr lang="en-US" dirty="0"/>
+              <a:t>PES Data Science Presentation</a:t>
+            </a:r>
+          </a:p>
+        </p:txBody>
+      </p:sp>
+      <p:pic>
+        <p:nvPicPr>
+          <p:cNvPr id="2" name="Picture 1">
+            <a:extLst>
+              <a:ext uri="{FF2B5EF4-FFF2-40B4-BE49-F238E27FC236}">
+                <a16:creationId xmlns:a16="http://schemas.microsoft.com/office/drawing/2014/main" id="{99991482-EBB1-44F9-BC2D-E9D7B62C7F0B}"/>
+              </a:ext>
+            </a:extLst>
+          </p:cNvPr>
+          <p:cNvPicPr>
+            <a:picLocks noChangeAspect="1"/>
+          </p:cNvPicPr>
+          <p:nvPr/>
+        </p:nvPicPr>
+        <p:blipFill>
+          <a:blip r:embed="rId2"/>
+          <a:stretch>
+            <a:fillRect/>
+          </a:stretch>
+        </p:blipFill>
+        <p:spPr>
+          <a:xfrm>
+            <a:off x="2970435" y="1018871"/>
+            <a:ext cx="4552950" cy="1609725"/>
+          </a:xfrm>
+          <a:prstGeom prst="rect">
+            <a:avLst/>
+          </a:prstGeom>
+        </p:spPr>
+      </p:pic>
+      <p:pic>
+        <p:nvPicPr>
+          <p:cNvPr id="3" name="Picture 2">
+            <a:extLst>
+              <a:ext uri="{FF2B5EF4-FFF2-40B4-BE49-F238E27FC236}">
+                <a16:creationId xmlns:a16="http://schemas.microsoft.com/office/drawing/2014/main" id="{96434CED-D381-4E87-9B35-659B33A112FD}"/>
+              </a:ext>
+            </a:extLst>
+          </p:cNvPr>
+          <p:cNvPicPr>
+            <a:picLocks noChangeAspect="1"/>
+          </p:cNvPicPr>
+          <p:nvPr/>
+        </p:nvPicPr>
+        <p:blipFill>
+          <a:blip r:embed="rId3"/>
+          <a:stretch>
+            <a:fillRect/>
+          </a:stretch>
+        </p:blipFill>
+        <p:spPr>
+          <a:xfrm>
+            <a:off x="2970435" y="2555934"/>
+            <a:ext cx="4629150" cy="3105150"/>
+          </a:xfrm>
+          <a:prstGeom prst="rect">
+            <a:avLst/>
+          </a:prstGeom>
+        </p:spPr>
+      </p:pic>
+    </p:spTree>
+    <p:extLst>
+      <p:ext uri="{BB962C8B-B14F-4D97-AF65-F5344CB8AC3E}">
+        <p14:creationId xmlns:p14="http://schemas.microsoft.com/office/powerpoint/2010/main" val="2942448711"/>
+      </p:ext>
+    </p:extLst>
+  </p:cSld>
+  <p:clrMapOvr>
+    <a:masterClrMapping/>
+  </p:clrMapOvr>
+</p:sld>
+</file>
+
+<file path=ppt/slides/slide15.xml><?xml version="1.0" encoding="utf-8"?>
 <p:sld xmlns:a="http://schemas.openxmlformats.org/drawingml/2006/main" xmlns:r="http://schemas.openxmlformats.org/officeDocument/2006/relationships" xmlns:p="http://schemas.openxmlformats.org/presentationml/2006/main">
   <p:cSld>
     <p:spTree>

</xml_diff>